<commit_message>
Overview about windows and functions
</commit_message>
<xml_diff>
--- a/Design plan.pptx
+++ b/Design plan.pptx
@@ -7,8 +7,11 @@
   <p:sldIdLst>
     <p:sldId id="256" r:id="rId2"/>
     <p:sldId id="260" r:id="rId3"/>
-    <p:sldId id="257" r:id="rId4"/>
-    <p:sldId id="261" r:id="rId5"/>
+    <p:sldId id="265" r:id="rId4"/>
+    <p:sldId id="257" r:id="rId5"/>
+    <p:sldId id="262" r:id="rId6"/>
+    <p:sldId id="264" r:id="rId7"/>
+    <p:sldId id="263" r:id="rId8"/>
   </p:sldIdLst>
   <p:sldSz cx="12192000" cy="6858000"/>
   <p:notesSz cx="6858000" cy="9144000"/>
@@ -3551,6 +3554,110 @@
           <p:cNvPr id="2" name="Titel 1">
             <a:extLst>
               <a:ext uri="{FF2B5EF4-FFF2-40B4-BE49-F238E27FC236}">
+                <a16:creationId xmlns:a16="http://schemas.microsoft.com/office/drawing/2014/main" id="{31A17F6B-DC84-470C-9999-56EBF04ABBA0}"/>
+              </a:ext>
+            </a:extLst>
+          </p:cNvPr>
+          <p:cNvSpPr>
+            <a:spLocks noGrp="1"/>
+          </p:cNvSpPr>
+          <p:nvPr>
+            <p:ph type="title"/>
+          </p:nvPr>
+        </p:nvSpPr>
+        <p:spPr/>
+        <p:txBody>
+          <a:bodyPr/>
+          <a:lstStyle/>
+          <a:p>
+            <a:r>
+              <a:rPr lang="de-DE" dirty="0"/>
+              <a:t>Übersicht</a:t>
+            </a:r>
+          </a:p>
+        </p:txBody>
+      </p:sp>
+      <p:sp>
+        <p:nvSpPr>
+          <p:cNvPr id="3" name="Inhaltsplatzhalter 2">
+            <a:extLst>
+              <a:ext uri="{FF2B5EF4-FFF2-40B4-BE49-F238E27FC236}">
+                <a16:creationId xmlns:a16="http://schemas.microsoft.com/office/drawing/2014/main" id="{A02D6463-A891-4AE0-9913-94B7EABEA8E4}"/>
+              </a:ext>
+            </a:extLst>
+          </p:cNvPr>
+          <p:cNvSpPr>
+            <a:spLocks noGrp="1"/>
+          </p:cNvSpPr>
+          <p:nvPr>
+            <p:ph idx="1"/>
+          </p:nvPr>
+        </p:nvSpPr>
+        <p:spPr/>
+        <p:txBody>
+          <a:bodyPr/>
+          <a:lstStyle/>
+          <a:p>
+            <a:r>
+              <a:rPr lang="de-DE" dirty="0"/>
+              <a:t>Main Page</a:t>
+            </a:r>
+          </a:p>
+          <a:p>
+            <a:r>
+              <a:rPr lang="de-DE" dirty="0"/>
+              <a:t>Button Prüfung hinzufügen</a:t>
+            </a:r>
+          </a:p>
+          <a:p>
+            <a:r>
+              <a:rPr lang="de-DE" dirty="0"/>
+              <a:t>Button Prüfung 1</a:t>
+            </a:r>
+          </a:p>
+          <a:p>
+            <a:r>
+              <a:rPr lang="de-DE" dirty="0"/>
+              <a:t>Button allgemeine Einstellungen</a:t>
+            </a:r>
+          </a:p>
+        </p:txBody>
+      </p:sp>
+    </p:spTree>
+    <p:extLst>
+      <p:ext uri="{BB962C8B-B14F-4D97-AF65-F5344CB8AC3E}">
+        <p14:creationId xmlns:p14="http://schemas.microsoft.com/office/powerpoint/2010/main" val="361103032"/>
+      </p:ext>
+    </p:extLst>
+  </p:cSld>
+  <p:clrMapOvr>
+    <a:masterClrMapping/>
+  </p:clrMapOvr>
+</p:sld>
+</file>
+
+<file path=ppt/slides/slide4.xml><?xml version="1.0" encoding="utf-8"?>
+<p:sld xmlns:a="http://schemas.openxmlformats.org/drawingml/2006/main" xmlns:r="http://schemas.openxmlformats.org/officeDocument/2006/relationships" xmlns:p="http://schemas.openxmlformats.org/presentationml/2006/main">
+  <p:cSld>
+    <p:spTree>
+      <p:nvGrpSpPr>
+        <p:cNvPr id="1" name=""/>
+        <p:cNvGrpSpPr/>
+        <p:nvPr/>
+      </p:nvGrpSpPr>
+      <p:grpSpPr>
+        <a:xfrm>
+          <a:off x="0" y="0"/>
+          <a:ext cx="0" cy="0"/>
+          <a:chOff x="0" y="0"/>
+          <a:chExt cx="0" cy="0"/>
+        </a:xfrm>
+      </p:grpSpPr>
+      <p:sp>
+        <p:nvSpPr>
+          <p:cNvPr id="2" name="Titel 1">
+            <a:extLst>
+              <a:ext uri="{FF2B5EF4-FFF2-40B4-BE49-F238E27FC236}">
                 <a16:creationId xmlns:a16="http://schemas.microsoft.com/office/drawing/2014/main" id="{6334C8DA-8CC1-433B-9298-AAFBF636E749}"/>
               </a:ext>
             </a:extLst>
@@ -3610,8 +3717,49 @@
               <a:buChar char="•"/>
             </a:pPr>
             <a:r>
+              <a:rPr lang="de-DE" dirty="0" err="1"/>
+              <a:t>Functions</a:t>
+            </a:r>
+            <a:endParaRPr lang="de-DE" dirty="0"/>
+          </a:p>
+          <a:p>
+            <a:pPr marL="742950" lvl="1" indent="-285750">
+              <a:buFont typeface="Arial" panose="020B0604020202020204" pitchFamily="34" charset="0"/>
+              <a:buChar char="•"/>
+            </a:pPr>
+            <a:r>
               <a:rPr lang="de-DE" dirty="0"/>
-              <a:t>Test</a:t>
+              <a:t>Buttons</a:t>
+            </a:r>
+          </a:p>
+          <a:p>
+            <a:pPr marL="1200150" lvl="2" indent="-285750">
+              <a:buFont typeface="Arial" panose="020B0604020202020204" pitchFamily="34" charset="0"/>
+              <a:buChar char="•"/>
+            </a:pPr>
+            <a:r>
+              <a:rPr lang="de-DE" dirty="0"/>
+              <a:t>Allgemeine Einstellungen</a:t>
+            </a:r>
+          </a:p>
+          <a:p>
+            <a:pPr marL="1200150" lvl="2" indent="-285750">
+              <a:buFont typeface="Arial" panose="020B0604020202020204" pitchFamily="34" charset="0"/>
+              <a:buChar char="•"/>
+            </a:pPr>
+            <a:r>
+              <a:rPr lang="de-DE" dirty="0"/>
+              <a:t>Prüfung 1</a:t>
+            </a:r>
+          </a:p>
+          <a:p>
+            <a:pPr marL="1200150" lvl="2" indent="-285750">
+              <a:buFont typeface="Arial" panose="020B0604020202020204" pitchFamily="34" charset="0"/>
+              <a:buChar char="•"/>
+            </a:pPr>
+            <a:r>
+              <a:rPr lang="de-DE" dirty="0"/>
+              <a:t>Prüfung hinzufügen</a:t>
             </a:r>
           </a:p>
           <a:p>
@@ -3728,8 +3876,8 @@
           </p:nvSpPr>
           <p:spPr>
             <a:xfrm>
-              <a:off x="3947587" y="1524436"/>
-              <a:ext cx="1648876" cy="338554"/>
+              <a:off x="3994003" y="1524436"/>
+              <a:ext cx="1210418" cy="338554"/>
             </a:xfrm>
             <a:prstGeom prst="rect">
               <a:avLst/>
@@ -3996,8 +4144,8 @@
           </p:nvSpPr>
           <p:spPr>
             <a:xfrm>
-              <a:off x="3360062" y="6525641"/>
-              <a:ext cx="2579278" cy="369332"/>
+              <a:off x="3320428" y="6525641"/>
+              <a:ext cx="2036936" cy="369332"/>
             </a:xfrm>
             <a:prstGeom prst="rect">
               <a:avLst/>
@@ -4070,7 +4218,7 @@
           </p:nvSpPr>
           <p:spPr>
             <a:xfrm>
-              <a:off x="2957964" y="2614048"/>
+              <a:off x="2944770" y="2628602"/>
               <a:ext cx="324000" cy="324000"/>
             </a:xfrm>
             <a:prstGeom prst="ellipse">
@@ -4126,7 +4274,7 @@
           </p:nvSpPr>
           <p:spPr>
             <a:xfrm>
-              <a:off x="2957964" y="3104090"/>
+              <a:off x="2949940" y="3143294"/>
               <a:ext cx="324000" cy="324000"/>
             </a:xfrm>
             <a:prstGeom prst="ellipse">
@@ -4182,7 +4330,7 @@
           </p:nvSpPr>
           <p:spPr>
             <a:xfrm>
-              <a:off x="2980052" y="2622925"/>
+              <a:off x="2973605" y="2624373"/>
               <a:ext cx="266330" cy="338554"/>
             </a:xfrm>
             <a:prstGeom prst="rect">
@@ -4217,7 +4365,7 @@
           </p:nvSpPr>
           <p:spPr>
             <a:xfrm>
-              <a:off x="2925057" y="3104090"/>
+              <a:off x="2925057" y="3132969"/>
               <a:ext cx="435005" cy="338554"/>
             </a:xfrm>
             <a:prstGeom prst="rect">
@@ -4252,7 +4400,7 @@
           </p:nvSpPr>
           <p:spPr>
             <a:xfrm>
-              <a:off x="5316047" y="2560463"/>
+              <a:off x="5330814" y="2583270"/>
               <a:ext cx="265649" cy="369332"/>
             </a:xfrm>
             <a:prstGeom prst="rect">
@@ -4322,7 +4470,7 @@
           </p:nvSpPr>
           <p:spPr>
             <a:xfrm>
-              <a:off x="4916236" y="2568716"/>
+              <a:off x="4942948" y="2583703"/>
               <a:ext cx="301686" cy="369332"/>
             </a:xfrm>
             <a:prstGeom prst="rect">
@@ -4357,7 +4505,7 @@
           </p:nvSpPr>
           <p:spPr>
             <a:xfrm>
-              <a:off x="4626841" y="2566150"/>
+              <a:off x="4626841" y="2583270"/>
               <a:ext cx="45719" cy="369332"/>
             </a:xfrm>
             <a:prstGeom prst="rect">
@@ -4392,7 +4540,7 @@
           </p:nvSpPr>
           <p:spPr>
             <a:xfrm>
-              <a:off x="4902735" y="3097962"/>
+              <a:off x="4942948" y="3097962"/>
               <a:ext cx="301686" cy="369332"/>
             </a:xfrm>
             <a:prstGeom prst="rect">
@@ -4427,7 +4575,7 @@
           </p:nvSpPr>
           <p:spPr>
             <a:xfrm>
-              <a:off x="5280010" y="3106915"/>
+              <a:off x="5316047" y="3097962"/>
               <a:ext cx="301686" cy="369332"/>
             </a:xfrm>
             <a:prstGeom prst="rect">
@@ -4462,7 +4610,7 @@
 </p:sld>
 </file>
 
-<file path=ppt/slides/slide4.xml><?xml version="1.0" encoding="utf-8"?>
+<file path=ppt/slides/slide5.xml><?xml version="1.0" encoding="utf-8"?>
 <p:sld xmlns:a="http://schemas.openxmlformats.org/drawingml/2006/main" xmlns:r="http://schemas.openxmlformats.org/officeDocument/2006/relationships" xmlns:p="http://schemas.openxmlformats.org/presentationml/2006/main">
   <p:cSld>
     <p:spTree>
@@ -4498,18 +4646,18 @@
         <p:spPr>
           <a:xfrm>
             <a:off x="839788" y="457200"/>
-            <a:ext cx="3932237" cy="531812"/>
+            <a:ext cx="4656137" cy="531812"/>
           </a:xfrm>
         </p:spPr>
         <p:txBody>
           <a:bodyPr>
-            <a:normAutofit fontScale="90000"/>
+            <a:normAutofit/>
           </a:bodyPr>
           <a:lstStyle/>
           <a:p>
             <a:r>
               <a:rPr lang="de-DE" dirty="0"/>
-              <a:t>Prüfung Button Fenster</a:t>
+              <a:t>Button Prüfung hinzufügen</a:t>
             </a:r>
           </a:p>
         </p:txBody>
@@ -4546,7 +4694,128 @@
             </a:pPr>
             <a:r>
               <a:rPr lang="de-DE" dirty="0"/>
-              <a:t>Test</a:t>
+              <a:t>Neues Fenster</a:t>
+            </a:r>
+          </a:p>
+          <a:p>
+            <a:pPr marL="285750" indent="-285750">
+              <a:buFont typeface="Arial" panose="020B0604020202020204" pitchFamily="34" charset="0"/>
+              <a:buChar char="•"/>
+            </a:pPr>
+            <a:r>
+              <a:rPr lang="de-DE" dirty="0" err="1"/>
+              <a:t>Functions</a:t>
+            </a:r>
+            <a:endParaRPr lang="de-DE" dirty="0"/>
+          </a:p>
+          <a:p>
+            <a:pPr marL="742950" lvl="1" indent="-285750">
+              <a:buFont typeface="Arial" panose="020B0604020202020204" pitchFamily="34" charset="0"/>
+              <a:buChar char="•"/>
+            </a:pPr>
+            <a:r>
+              <a:rPr lang="de-DE" dirty="0"/>
+              <a:t>Input</a:t>
+            </a:r>
+          </a:p>
+          <a:p>
+            <a:pPr marL="1200150" lvl="2" indent="-285750">
+              <a:buFont typeface="Arial" panose="020B0604020202020204" pitchFamily="34" charset="0"/>
+              <a:buChar char="•"/>
+            </a:pPr>
+            <a:r>
+              <a:rPr lang="de-DE" dirty="0"/>
+              <a:t>Namen der Prüfung</a:t>
+            </a:r>
+          </a:p>
+          <a:p>
+            <a:pPr marL="1200150" lvl="2" indent="-285750">
+              <a:buFont typeface="Arial" panose="020B0604020202020204" pitchFamily="34" charset="0"/>
+              <a:buChar char="•"/>
+            </a:pPr>
+            <a:r>
+              <a:rPr lang="de-DE" dirty="0"/>
+              <a:t>Prüfungsdatum</a:t>
+            </a:r>
+          </a:p>
+          <a:p>
+            <a:pPr marL="1200150" lvl="2" indent="-285750">
+              <a:buFont typeface="Arial" panose="020B0604020202020204" pitchFamily="34" charset="0"/>
+              <a:buChar char="•"/>
+            </a:pPr>
+            <a:r>
+              <a:rPr lang="de-DE" dirty="0"/>
+              <a:t>Anzahl der zu erledigenden Aufgaben</a:t>
+            </a:r>
+          </a:p>
+          <a:p>
+            <a:pPr marL="742950" lvl="1" indent="-285750">
+              <a:buFont typeface="Arial" panose="020B0604020202020204" pitchFamily="34" charset="0"/>
+              <a:buChar char="•"/>
+            </a:pPr>
+            <a:r>
+              <a:rPr lang="de-DE" dirty="0"/>
+              <a:t>Buttons</a:t>
+            </a:r>
+          </a:p>
+          <a:p>
+            <a:pPr marL="1200150" lvl="2" indent="-285750">
+              <a:buFont typeface="Arial" panose="020B0604020202020204" pitchFamily="34" charset="0"/>
+              <a:buChar char="•"/>
+            </a:pPr>
+            <a:r>
+              <a:rPr lang="de-DE" dirty="0"/>
+              <a:t>Zurückfunktion</a:t>
+            </a:r>
+          </a:p>
+          <a:p>
+            <a:pPr marL="1200150" lvl="2" indent="-285750">
+              <a:buFont typeface="Arial" panose="020B0604020202020204" pitchFamily="34" charset="0"/>
+              <a:buChar char="•"/>
+            </a:pPr>
+            <a:r>
+              <a:rPr lang="de-DE" dirty="0"/>
+              <a:t>Prüfung bestätigen</a:t>
+            </a:r>
+          </a:p>
+          <a:p>
+            <a:pPr marL="285750" indent="-285750">
+              <a:buFont typeface="Arial" panose="020B0604020202020204" pitchFamily="34" charset="0"/>
+              <a:buChar char="•"/>
+            </a:pPr>
+            <a:r>
+              <a:rPr lang="de-DE" dirty="0"/>
+              <a:t>Labels</a:t>
+            </a:r>
+          </a:p>
+          <a:p>
+            <a:pPr marL="742950" lvl="1" indent="-285750">
+              <a:buFont typeface="Arial" panose="020B0604020202020204" pitchFamily="34" charset="0"/>
+              <a:buChar char="•"/>
+            </a:pPr>
+            <a:r>
+              <a:rPr lang="de-DE" dirty="0"/>
+              <a:t>Icons</a:t>
+            </a:r>
+          </a:p>
+          <a:p>
+            <a:pPr marL="742950" lvl="1" indent="-285750">
+              <a:buFont typeface="Arial" panose="020B0604020202020204" pitchFamily="34" charset="0"/>
+              <a:buChar char="•"/>
+            </a:pPr>
+            <a:r>
+              <a:rPr lang="de-DE" dirty="0"/>
+              <a:t>Beschriftung aller Inputs</a:t>
+            </a:r>
+          </a:p>
+          <a:p>
+            <a:pPr marL="742950" lvl="1" indent="-285750">
+              <a:buFont typeface="Arial" panose="020B0604020202020204" pitchFamily="34" charset="0"/>
+              <a:buChar char="•"/>
+            </a:pPr>
+            <a:r>
+              <a:rPr lang="de-DE" dirty="0"/>
+              <a:t>…</a:t>
             </a:r>
           </a:p>
           <a:p>
@@ -4572,7 +4841,7 @@
         </p:nvGrpSpPr>
         <p:grpSpPr>
           <a:xfrm>
-            <a:off x="7699484" y="69574"/>
+            <a:off x="7682974" y="69574"/>
             <a:ext cx="3551583" cy="6718852"/>
             <a:chOff x="2497169" y="1108332"/>
             <a:chExt cx="3551583" cy="6718852"/>
@@ -4663,8 +4932,8 @@
           </p:nvSpPr>
           <p:spPr>
             <a:xfrm>
-              <a:off x="4025685" y="1517222"/>
-              <a:ext cx="1648876" cy="338554"/>
+              <a:off x="3994003" y="1524436"/>
+              <a:ext cx="1210418" cy="338554"/>
             </a:xfrm>
             <a:prstGeom prst="rect">
               <a:avLst/>
@@ -4684,76 +4953,6 @@
             </a:p>
           </p:txBody>
         </p:sp>
-        <p:sp>
-          <p:nvSpPr>
-            <p:cNvPr id="15" name="Textfeld 14">
-              <a:extLst>
-                <a:ext uri="{FF2B5EF4-FFF2-40B4-BE49-F238E27FC236}">
-                  <a16:creationId xmlns:a16="http://schemas.microsoft.com/office/drawing/2014/main" id="{E8195513-EC03-4BBB-85BB-E3B68E8E1670}"/>
-                </a:ext>
-              </a:extLst>
-            </p:cNvPr>
-            <p:cNvSpPr txBox="1"/>
-            <p:nvPr/>
-          </p:nvSpPr>
-          <p:spPr>
-            <a:xfrm>
-              <a:off x="3366032" y="2614048"/>
-              <a:ext cx="992904" cy="338554"/>
-            </a:xfrm>
-            <a:prstGeom prst="rect">
-              <a:avLst/>
-            </a:prstGeom>
-            <a:noFill/>
-          </p:spPr>
-          <p:txBody>
-            <a:bodyPr wrap="square" rtlCol="0">
-              <a:spAutoFit/>
-            </a:bodyPr>
-            <a:lstStyle/>
-            <a:p>
-              <a:r>
-                <a:rPr lang="de-DE" sz="1600" dirty="0"/>
-                <a:t>Prüfung 1</a:t>
-              </a:r>
-            </a:p>
-          </p:txBody>
-        </p:sp>
-        <p:sp>
-          <p:nvSpPr>
-            <p:cNvPr id="16" name="Textfeld 15">
-              <a:extLst>
-                <a:ext uri="{FF2B5EF4-FFF2-40B4-BE49-F238E27FC236}">
-                  <a16:creationId xmlns:a16="http://schemas.microsoft.com/office/drawing/2014/main" id="{843C554E-E64A-498F-BB18-DD1E4017BE79}"/>
-                </a:ext>
-              </a:extLst>
-            </p:cNvPr>
-            <p:cNvSpPr txBox="1"/>
-            <p:nvPr/>
-          </p:nvSpPr>
-          <p:spPr>
-            <a:xfrm>
-              <a:off x="3360062" y="3132969"/>
-              <a:ext cx="998874" cy="338554"/>
-            </a:xfrm>
-            <a:prstGeom prst="rect">
-              <a:avLst/>
-            </a:prstGeom>
-            <a:noFill/>
-          </p:spPr>
-          <p:txBody>
-            <a:bodyPr wrap="square" rtlCol="0">
-              <a:spAutoFit/>
-            </a:bodyPr>
-            <a:lstStyle/>
-            <a:p>
-              <a:r>
-                <a:rPr lang="de-DE" sz="1600" dirty="0"/>
-                <a:t>Prüfung 2</a:t>
-              </a:r>
-            </a:p>
-          </p:txBody>
-        </p:sp>
         <p:pic>
           <p:nvPicPr>
             <p:cNvPr id="17" name="Grafik 16" descr="Bücher">
@@ -4785,7 +4984,7 @@
           </p:blipFill>
           <p:spPr>
             <a:xfrm>
-              <a:off x="4579682" y="2152510"/>
+              <a:off x="3334060" y="4471854"/>
               <a:ext cx="270441" cy="270441"/>
             </a:xfrm>
             <a:prstGeom prst="rect">
@@ -4824,7 +5023,7 @@
           </p:blipFill>
           <p:spPr>
             <a:xfrm>
-              <a:off x="4916236" y="2096950"/>
+              <a:off x="3303049" y="4916515"/>
               <a:ext cx="364288" cy="364288"/>
             </a:xfrm>
             <a:prstGeom prst="rect">
@@ -4871,58 +5070,223 @@
             </a:prstGeom>
           </p:spPr>
         </p:pic>
-        <p:sp>
-          <p:nvSpPr>
-            <p:cNvPr id="24" name="Rechteck: abgerundete Ecken 23">
+        <p:pic>
+          <p:nvPicPr>
+            <p:cNvPr id="26" name="Grafik 25" descr="Liste">
               <a:extLst>
                 <a:ext uri="{FF2B5EF4-FFF2-40B4-BE49-F238E27FC236}">
-                  <a16:creationId xmlns:a16="http://schemas.microsoft.com/office/drawing/2014/main" id="{96EF937E-EB20-43FC-A05B-FB26C8594883}"/>
+                  <a16:creationId xmlns:a16="http://schemas.microsoft.com/office/drawing/2014/main" id="{D25F34EA-812E-4323-9A9A-1C83BD80A7A7}"/>
                 </a:ext>
               </a:extLst>
             </p:cNvPr>
-            <p:cNvSpPr/>
+            <p:cNvPicPr>
+              <a:picLocks noChangeAspect="1"/>
+            </p:cNvPicPr>
             <p:nvPr/>
-          </p:nvSpPr>
+          </p:nvPicPr>
+          <p:blipFill>
+            <a:blip r:embed="rId9">
+              <a:extLst>
+                <a:ext uri="{28A0092B-C50C-407E-A947-70E740481C1C}">
+                  <a14:useLocalDpi xmlns:a14="http://schemas.microsoft.com/office/drawing/2010/main" val="0"/>
+                </a:ext>
+                <a:ext uri="{96DAC541-7B7A-43D3-8B79-37D633B846F1}">
+                  <asvg:svgBlip xmlns:asvg="http://schemas.microsoft.com/office/drawing/2016/SVG/main" r:embed="rId10"/>
+                </a:ext>
+              </a:extLst>
+            </a:blip>
+            <a:stretch>
+              <a:fillRect/>
+            </a:stretch>
+          </p:blipFill>
           <p:spPr>
             <a:xfrm>
-              <a:off x="3360062" y="6558183"/>
-              <a:ext cx="1957669" cy="336790"/>
+              <a:off x="3303049" y="5455024"/>
+              <a:ext cx="332462" cy="306826"/>
             </a:xfrm>
-            <a:prstGeom prst="roundRect">
+            <a:prstGeom prst="rect">
               <a:avLst/>
             </a:prstGeom>
           </p:spPr>
-          <p:style>
-            <a:lnRef idx="2">
-              <a:schemeClr val="accent1">
-                <a:shade val="50000"/>
-              </a:schemeClr>
-            </a:lnRef>
-            <a:fillRef idx="1">
-              <a:schemeClr val="accent1"/>
-            </a:fillRef>
-            <a:effectRef idx="0">
-              <a:schemeClr val="accent1"/>
-            </a:effectRef>
-            <a:fontRef idx="minor">
-              <a:schemeClr val="lt1"/>
-            </a:fontRef>
-          </p:style>
-          <p:txBody>
-            <a:bodyPr rtlCol="0" anchor="ctr"/>
-            <a:lstStyle/>
-            <a:p>
-              <a:pPr algn="ctr"/>
-              <a:endParaRPr lang="de-DE"/>
-            </a:p>
-          </p:txBody>
-        </p:sp>
+        </p:pic>
+      </p:grpSp>
+    </p:spTree>
+    <p:extLst>
+      <p:ext uri="{BB962C8B-B14F-4D97-AF65-F5344CB8AC3E}">
+        <p14:creationId xmlns:p14="http://schemas.microsoft.com/office/powerpoint/2010/main" val="150605777"/>
+      </p:ext>
+    </p:extLst>
+  </p:cSld>
+  <p:clrMapOvr>
+    <a:masterClrMapping/>
+  </p:clrMapOvr>
+</p:sld>
+</file>
+
+<file path=ppt/slides/slide6.xml><?xml version="1.0" encoding="utf-8"?>
+<p:sld xmlns:a="http://schemas.openxmlformats.org/drawingml/2006/main" xmlns:r="http://schemas.openxmlformats.org/officeDocument/2006/relationships" xmlns:p="http://schemas.openxmlformats.org/presentationml/2006/main">
+  <p:cSld>
+    <p:spTree>
+      <p:nvGrpSpPr>
+        <p:cNvPr id="1" name=""/>
+        <p:cNvGrpSpPr/>
+        <p:nvPr/>
+      </p:nvGrpSpPr>
+      <p:grpSpPr>
+        <a:xfrm>
+          <a:off x="0" y="0"/>
+          <a:ext cx="0" cy="0"/>
+          <a:chOff x="0" y="0"/>
+          <a:chExt cx="0" cy="0"/>
+        </a:xfrm>
+      </p:grpSpPr>
+      <p:sp>
+        <p:nvSpPr>
+          <p:cNvPr id="2" name="Titel 1">
+            <a:extLst>
+              <a:ext uri="{FF2B5EF4-FFF2-40B4-BE49-F238E27FC236}">
+                <a16:creationId xmlns:a16="http://schemas.microsoft.com/office/drawing/2014/main" id="{6334C8DA-8CC1-433B-9298-AAFBF636E749}"/>
+              </a:ext>
+            </a:extLst>
+          </p:cNvPr>
+          <p:cNvSpPr>
+            <a:spLocks noGrp="1"/>
+          </p:cNvSpPr>
+          <p:nvPr>
+            <p:ph type="title"/>
+          </p:nvPr>
+        </p:nvSpPr>
+        <p:spPr>
+          <a:xfrm>
+            <a:off x="839788" y="457200"/>
+            <a:ext cx="4656137" cy="531812"/>
+          </a:xfrm>
+        </p:spPr>
+        <p:txBody>
+          <a:bodyPr>
+            <a:normAutofit/>
+          </a:bodyPr>
+          <a:lstStyle/>
+          <a:p>
+            <a:r>
+              <a:rPr lang="de-DE" dirty="0"/>
+              <a:t>Button Prüfung 1</a:t>
+            </a:r>
+          </a:p>
+        </p:txBody>
+      </p:sp>
+      <p:sp>
+        <p:nvSpPr>
+          <p:cNvPr id="4" name="Textplatzhalter 3">
+            <a:extLst>
+              <a:ext uri="{FF2B5EF4-FFF2-40B4-BE49-F238E27FC236}">
+                <a16:creationId xmlns:a16="http://schemas.microsoft.com/office/drawing/2014/main" id="{ADA8C5A8-81F8-4CA8-97E7-912C5395D1E9}"/>
+              </a:ext>
+            </a:extLst>
+          </p:cNvPr>
+          <p:cNvSpPr>
+            <a:spLocks noGrp="1"/>
+          </p:cNvSpPr>
+          <p:nvPr>
+            <p:ph type="body" sz="half" idx="2"/>
+          </p:nvPr>
+        </p:nvSpPr>
+        <p:spPr>
+          <a:xfrm>
+            <a:off x="839788" y="989012"/>
+            <a:ext cx="4284662" cy="4879976"/>
+          </a:xfrm>
+        </p:spPr>
+        <p:txBody>
+          <a:bodyPr/>
+          <a:lstStyle/>
+          <a:p>
+            <a:pPr marL="285750" indent="-285750">
+              <a:buFont typeface="Arial" panose="020B0604020202020204" pitchFamily="34" charset="0"/>
+              <a:buChar char="•"/>
+            </a:pPr>
+            <a:r>
+              <a:rPr lang="de-DE" dirty="0"/>
+              <a:t>Dasselbe Fenster wie Prüfung hinzufügen?</a:t>
+            </a:r>
+          </a:p>
+          <a:p>
+            <a:pPr marL="742950" lvl="1" indent="-285750">
+              <a:buFont typeface="Arial" panose="020B0604020202020204" pitchFamily="34" charset="0"/>
+              <a:buChar char="•"/>
+            </a:pPr>
+            <a:endParaRPr lang="de-DE" dirty="0"/>
+          </a:p>
+          <a:p>
+            <a:pPr marL="285750" indent="-285750">
+              <a:buFont typeface="Arial" panose="020B0604020202020204" pitchFamily="34" charset="0"/>
+              <a:buChar char="•"/>
+            </a:pPr>
+            <a:endParaRPr lang="de-DE" dirty="0"/>
+          </a:p>
+        </p:txBody>
+      </p:sp>
+      <p:grpSp>
+        <p:nvGrpSpPr>
+          <p:cNvPr id="27" name="Gruppieren 26">
+            <a:extLst>
+              <a:ext uri="{FF2B5EF4-FFF2-40B4-BE49-F238E27FC236}">
+                <a16:creationId xmlns:a16="http://schemas.microsoft.com/office/drawing/2014/main" id="{D12660E2-AC32-4DDF-A617-EE47858FE3A1}"/>
+              </a:ext>
+            </a:extLst>
+          </p:cNvPr>
+          <p:cNvGrpSpPr/>
+          <p:nvPr/>
+        </p:nvGrpSpPr>
+        <p:grpSpPr>
+          <a:xfrm>
+            <a:off x="7672179" y="69574"/>
+            <a:ext cx="3551583" cy="6718852"/>
+            <a:chOff x="2497169" y="1108332"/>
+            <a:chExt cx="3551583" cy="6718852"/>
+          </a:xfrm>
+        </p:grpSpPr>
+        <p:pic>
+          <p:nvPicPr>
+            <p:cNvPr id="28" name="Bildplatzhalter 5">
+              <a:extLst>
+                <a:ext uri="{FF2B5EF4-FFF2-40B4-BE49-F238E27FC236}">
+                  <a16:creationId xmlns:a16="http://schemas.microsoft.com/office/drawing/2014/main" id="{4EE030BD-AC1E-445C-AC08-FED71C661E79}"/>
+                </a:ext>
+              </a:extLst>
+            </p:cNvPr>
+            <p:cNvPicPr>
+              <a:picLocks noChangeAspect="1"/>
+            </p:cNvPicPr>
+            <p:nvPr/>
+          </p:nvPicPr>
+          <p:blipFill rotWithShape="1">
+            <a:blip r:embed="rId2">
+              <a:extLst>
+                <a:ext uri="{28A0092B-C50C-407E-A947-70E740481C1C}">
+                  <a14:useLocalDpi xmlns:a14="http://schemas.microsoft.com/office/drawing/2010/main" val="0"/>
+                </a:ext>
+              </a:extLst>
+            </a:blip>
+            <a:srcRect l="32105" t="4630" r="31726" b="4139"/>
+            <a:stretch/>
+          </p:blipFill>
+          <p:spPr>
+            <a:xfrm>
+              <a:off x="2497169" y="1108332"/>
+              <a:ext cx="3551583" cy="6718852"/>
+            </a:xfrm>
+            <a:prstGeom prst="rect">
+              <a:avLst/>
+            </a:prstGeom>
+          </p:spPr>
+        </p:pic>
         <p:sp>
           <p:nvSpPr>
-            <p:cNvPr id="25" name="Textfeld 24">
+            <p:cNvPr id="29" name="Textfeld 28">
               <a:extLst>
                 <a:ext uri="{FF2B5EF4-FFF2-40B4-BE49-F238E27FC236}">
-                  <a16:creationId xmlns:a16="http://schemas.microsoft.com/office/drawing/2014/main" id="{47BC3FEE-C79A-45BE-B867-A133142D89C3}"/>
+                  <a16:creationId xmlns:a16="http://schemas.microsoft.com/office/drawing/2014/main" id="{C69AE604-567F-496A-821E-071087186BE7}"/>
                 </a:ext>
               </a:extLst>
             </p:cNvPr>
@@ -4931,8 +5295,8 @@
           </p:nvSpPr>
           <p:spPr>
             <a:xfrm>
-              <a:off x="3360062" y="6525641"/>
-              <a:ext cx="2579278" cy="369332"/>
+              <a:off x="2805906" y="1524436"/>
+              <a:ext cx="1326750" cy="338554"/>
             </a:xfrm>
             <a:prstGeom prst="rect">
               <a:avLst/>
@@ -4946,169 +5310,19 @@
             <a:lstStyle/>
             <a:p>
               <a:r>
-                <a:rPr lang="de-DE" dirty="0"/>
-                <a:t>Prüfung hinzufügen</a:t>
+                <a:rPr lang="de-DE" sz="1600" b="1" dirty="0" err="1"/>
+                <a:t>Examstracker</a:t>
               </a:r>
-            </a:p>
-          </p:txBody>
-        </p:sp>
-        <p:pic>
-          <p:nvPicPr>
-            <p:cNvPr id="26" name="Grafik 25" descr="Liste">
-              <a:extLst>
-                <a:ext uri="{FF2B5EF4-FFF2-40B4-BE49-F238E27FC236}">
-                  <a16:creationId xmlns:a16="http://schemas.microsoft.com/office/drawing/2014/main" id="{D25F34EA-812E-4323-9A9A-1C83BD80A7A7}"/>
-                </a:ext>
-              </a:extLst>
-            </p:cNvPr>
-            <p:cNvPicPr>
-              <a:picLocks noChangeAspect="1"/>
-            </p:cNvPicPr>
-            <p:nvPr/>
-          </p:nvPicPr>
-          <p:blipFill>
-            <a:blip r:embed="rId9">
-              <a:extLst>
-                <a:ext uri="{28A0092B-C50C-407E-A947-70E740481C1C}">
-                  <a14:useLocalDpi xmlns:a14="http://schemas.microsoft.com/office/drawing/2010/main" val="0"/>
-                </a:ext>
-                <a:ext uri="{96DAC541-7B7A-43D3-8B79-37D633B846F1}">
-                  <asvg:svgBlip xmlns:asvg="http://schemas.microsoft.com/office/drawing/2016/SVG/main" r:embed="rId10"/>
-                </a:ext>
-              </a:extLst>
-            </a:blip>
-            <a:stretch>
-              <a:fillRect/>
-            </a:stretch>
-          </p:blipFill>
-          <p:spPr>
-            <a:xfrm>
-              <a:off x="5316047" y="2134317"/>
-              <a:ext cx="332462" cy="306826"/>
-            </a:xfrm>
-            <a:prstGeom prst="rect">
-              <a:avLst/>
-            </a:prstGeom>
-          </p:spPr>
-        </p:pic>
-        <p:sp>
-          <p:nvSpPr>
-            <p:cNvPr id="33" name="Ellipse 32">
-              <a:extLst>
-                <a:ext uri="{FF2B5EF4-FFF2-40B4-BE49-F238E27FC236}">
-                  <a16:creationId xmlns:a16="http://schemas.microsoft.com/office/drawing/2014/main" id="{07808052-FA38-4325-9036-A1E2BD863D6E}"/>
-                </a:ext>
-              </a:extLst>
-            </p:cNvPr>
-            <p:cNvSpPr/>
-            <p:nvPr/>
-          </p:nvSpPr>
-          <p:spPr>
-            <a:xfrm>
-              <a:off x="2957964" y="2614048"/>
-              <a:ext cx="324000" cy="324000"/>
-            </a:xfrm>
-            <a:prstGeom prst="ellipse">
-              <a:avLst/>
-            </a:prstGeom>
-            <a:solidFill>
-              <a:schemeClr val="bg2">
-                <a:lumMod val="90000"/>
-              </a:schemeClr>
-            </a:solidFill>
-            <a:ln>
-              <a:solidFill>
-                <a:schemeClr val="bg1"/>
-              </a:solidFill>
-            </a:ln>
-          </p:spPr>
-          <p:style>
-            <a:lnRef idx="2">
-              <a:schemeClr val="accent1">
-                <a:shade val="50000"/>
-              </a:schemeClr>
-            </a:lnRef>
-            <a:fillRef idx="1">
-              <a:schemeClr val="accent1"/>
-            </a:fillRef>
-            <a:effectRef idx="0">
-              <a:schemeClr val="accent1"/>
-            </a:effectRef>
-            <a:fontRef idx="minor">
-              <a:schemeClr val="lt1"/>
-            </a:fontRef>
-          </p:style>
-          <p:txBody>
-            <a:bodyPr rtlCol="0" anchor="ctr"/>
-            <a:lstStyle/>
-            <a:p>
-              <a:pPr algn="ctr"/>
-              <a:endParaRPr lang="de-DE"/>
+              <a:endParaRPr lang="de-DE" sz="1600" b="1" dirty="0"/>
             </a:p>
           </p:txBody>
         </p:sp>
         <p:sp>
           <p:nvSpPr>
-            <p:cNvPr id="34" name="Ellipse 33">
+            <p:cNvPr id="30" name="Textfeld 29">
               <a:extLst>
                 <a:ext uri="{FF2B5EF4-FFF2-40B4-BE49-F238E27FC236}">
-                  <a16:creationId xmlns:a16="http://schemas.microsoft.com/office/drawing/2014/main" id="{2002BFD4-2F89-49DF-B1DD-E7D385538FEE}"/>
-                </a:ext>
-              </a:extLst>
-            </p:cNvPr>
-            <p:cNvSpPr/>
-            <p:nvPr/>
-          </p:nvSpPr>
-          <p:spPr>
-            <a:xfrm>
-              <a:off x="2957964" y="3104090"/>
-              <a:ext cx="324000" cy="324000"/>
-            </a:xfrm>
-            <a:prstGeom prst="ellipse">
-              <a:avLst/>
-            </a:prstGeom>
-            <a:solidFill>
-              <a:schemeClr val="bg2">
-                <a:lumMod val="90000"/>
-              </a:schemeClr>
-            </a:solidFill>
-            <a:ln>
-              <a:solidFill>
-                <a:schemeClr val="bg1"/>
-              </a:solidFill>
-            </a:ln>
-          </p:spPr>
-          <p:style>
-            <a:lnRef idx="2">
-              <a:schemeClr val="accent1">
-                <a:shade val="50000"/>
-              </a:schemeClr>
-            </a:lnRef>
-            <a:fillRef idx="1">
-              <a:schemeClr val="accent1"/>
-            </a:fillRef>
-            <a:effectRef idx="0">
-              <a:schemeClr val="accent1"/>
-            </a:effectRef>
-            <a:fontRef idx="minor">
-              <a:schemeClr val="lt1"/>
-            </a:fontRef>
-          </p:style>
-          <p:txBody>
-            <a:bodyPr rtlCol="0" anchor="ctr"/>
-            <a:lstStyle/>
-            <a:p>
-              <a:pPr algn="ctr"/>
-              <a:endParaRPr lang="de-DE"/>
-            </a:p>
-          </p:txBody>
-        </p:sp>
-        <p:sp>
-          <p:nvSpPr>
-            <p:cNvPr id="35" name="Textfeld 34">
-              <a:extLst>
-                <a:ext uri="{FF2B5EF4-FFF2-40B4-BE49-F238E27FC236}">
-                  <a16:creationId xmlns:a16="http://schemas.microsoft.com/office/drawing/2014/main" id="{4ED5F13F-28F6-4D7E-B359-F1284DF477E5}"/>
+                  <a16:creationId xmlns:a16="http://schemas.microsoft.com/office/drawing/2014/main" id="{24AA2E38-EA96-4AD1-AC7C-3029F7754E11}"/>
                 </a:ext>
               </a:extLst>
             </p:cNvPr>
@@ -5117,8 +5331,8 @@
           </p:nvSpPr>
           <p:spPr>
             <a:xfrm>
-              <a:off x="2980052" y="2622925"/>
-              <a:ext cx="266330" cy="338554"/>
+              <a:off x="3994003" y="1524436"/>
+              <a:ext cx="1210418" cy="338554"/>
             </a:xfrm>
             <a:prstGeom prst="rect">
               <a:avLst/>
@@ -5133,17 +5347,386 @@
             <a:p>
               <a:r>
                 <a:rPr lang="de-DE" sz="1600" dirty="0"/>
-                <a:t>7</a:t>
+                <a:t>Fr., 15.01.21</a:t>
               </a:r>
             </a:p>
           </p:txBody>
         </p:sp>
+        <p:pic>
+          <p:nvPicPr>
+            <p:cNvPr id="31" name="Grafik 30" descr="Bücher">
+              <a:extLst>
+                <a:ext uri="{FF2B5EF4-FFF2-40B4-BE49-F238E27FC236}">
+                  <a16:creationId xmlns:a16="http://schemas.microsoft.com/office/drawing/2014/main" id="{C3B812DA-1BE3-43F2-A246-3F7271F18BB6}"/>
+                </a:ext>
+              </a:extLst>
+            </p:cNvPr>
+            <p:cNvPicPr>
+              <a:picLocks noChangeAspect="1"/>
+            </p:cNvPicPr>
+            <p:nvPr/>
+          </p:nvPicPr>
+          <p:blipFill>
+            <a:blip r:embed="rId3">
+              <a:extLst>
+                <a:ext uri="{28A0092B-C50C-407E-A947-70E740481C1C}">
+                  <a14:useLocalDpi xmlns:a14="http://schemas.microsoft.com/office/drawing/2010/main" val="0"/>
+                </a:ext>
+                <a:ext uri="{96DAC541-7B7A-43D3-8B79-37D633B846F1}">
+                  <asvg:svgBlip xmlns:asvg="http://schemas.microsoft.com/office/drawing/2016/SVG/main" r:embed="rId4"/>
+                </a:ext>
+              </a:extLst>
+            </a:blip>
+            <a:stretch>
+              <a:fillRect/>
+            </a:stretch>
+          </p:blipFill>
+          <p:spPr>
+            <a:xfrm>
+              <a:off x="3334060" y="4471854"/>
+              <a:ext cx="270441" cy="270441"/>
+            </a:xfrm>
+            <a:prstGeom prst="rect">
+              <a:avLst/>
+            </a:prstGeom>
+          </p:spPr>
+        </p:pic>
+        <p:pic>
+          <p:nvPicPr>
+            <p:cNvPr id="42" name="Grafik 41" descr="Videokamera">
+              <a:extLst>
+                <a:ext uri="{FF2B5EF4-FFF2-40B4-BE49-F238E27FC236}">
+                  <a16:creationId xmlns:a16="http://schemas.microsoft.com/office/drawing/2014/main" id="{42D467CA-2722-4F21-852F-277FA48F7744}"/>
+                </a:ext>
+              </a:extLst>
+            </p:cNvPr>
+            <p:cNvPicPr>
+              <a:picLocks noChangeAspect="1"/>
+            </p:cNvPicPr>
+            <p:nvPr/>
+          </p:nvPicPr>
+          <p:blipFill>
+            <a:blip r:embed="rId5">
+              <a:extLst>
+                <a:ext uri="{28A0092B-C50C-407E-A947-70E740481C1C}">
+                  <a14:useLocalDpi xmlns:a14="http://schemas.microsoft.com/office/drawing/2010/main" val="0"/>
+                </a:ext>
+                <a:ext uri="{96DAC541-7B7A-43D3-8B79-37D633B846F1}">
+                  <asvg:svgBlip xmlns:asvg="http://schemas.microsoft.com/office/drawing/2016/SVG/main" r:embed="rId6"/>
+                </a:ext>
+              </a:extLst>
+            </a:blip>
+            <a:stretch>
+              <a:fillRect/>
+            </a:stretch>
+          </p:blipFill>
+          <p:spPr>
+            <a:xfrm>
+              <a:off x="3303049" y="4916515"/>
+              <a:ext cx="364288" cy="364288"/>
+            </a:xfrm>
+            <a:prstGeom prst="rect">
+              <a:avLst/>
+            </a:prstGeom>
+          </p:spPr>
+        </p:pic>
+        <p:pic>
+          <p:nvPicPr>
+            <p:cNvPr id="43" name="Grafik 42" descr="Zahnrad">
+              <a:extLst>
+                <a:ext uri="{FF2B5EF4-FFF2-40B4-BE49-F238E27FC236}">
+                  <a16:creationId xmlns:a16="http://schemas.microsoft.com/office/drawing/2014/main" id="{20914814-9B08-4C39-871C-44419FBBC055}"/>
+                </a:ext>
+              </a:extLst>
+            </p:cNvPr>
+            <p:cNvPicPr>
+              <a:picLocks noChangeAspect="1"/>
+            </p:cNvPicPr>
+            <p:nvPr/>
+          </p:nvPicPr>
+          <p:blipFill>
+            <a:blip r:embed="rId7">
+              <a:extLst>
+                <a:ext uri="{28A0092B-C50C-407E-A947-70E740481C1C}">
+                  <a14:useLocalDpi xmlns:a14="http://schemas.microsoft.com/office/drawing/2010/main" val="0"/>
+                </a:ext>
+                <a:ext uri="{96DAC541-7B7A-43D3-8B79-37D633B846F1}">
+                  <asvg:svgBlip xmlns:asvg="http://schemas.microsoft.com/office/drawing/2016/SVG/main" r:embed="rId8"/>
+                </a:ext>
+              </a:extLst>
+            </a:blip>
+            <a:stretch>
+              <a:fillRect/>
+            </a:stretch>
+          </p:blipFill>
+          <p:spPr>
+            <a:xfrm>
+              <a:off x="5158005" y="1424532"/>
+              <a:ext cx="438458" cy="438458"/>
+            </a:xfrm>
+            <a:prstGeom prst="rect">
+              <a:avLst/>
+            </a:prstGeom>
+          </p:spPr>
+        </p:pic>
+        <p:pic>
+          <p:nvPicPr>
+            <p:cNvPr id="46" name="Grafik 45" descr="Liste">
+              <a:extLst>
+                <a:ext uri="{FF2B5EF4-FFF2-40B4-BE49-F238E27FC236}">
+                  <a16:creationId xmlns:a16="http://schemas.microsoft.com/office/drawing/2014/main" id="{8C304710-E30F-4F1D-87A0-D433BBC21D50}"/>
+                </a:ext>
+              </a:extLst>
+            </p:cNvPr>
+            <p:cNvPicPr>
+              <a:picLocks noChangeAspect="1"/>
+            </p:cNvPicPr>
+            <p:nvPr/>
+          </p:nvPicPr>
+          <p:blipFill>
+            <a:blip r:embed="rId9">
+              <a:extLst>
+                <a:ext uri="{28A0092B-C50C-407E-A947-70E740481C1C}">
+                  <a14:useLocalDpi xmlns:a14="http://schemas.microsoft.com/office/drawing/2010/main" val="0"/>
+                </a:ext>
+                <a:ext uri="{96DAC541-7B7A-43D3-8B79-37D633B846F1}">
+                  <asvg:svgBlip xmlns:asvg="http://schemas.microsoft.com/office/drawing/2016/SVG/main" r:embed="rId10"/>
+                </a:ext>
+              </a:extLst>
+            </a:blip>
+            <a:stretch>
+              <a:fillRect/>
+            </a:stretch>
+          </p:blipFill>
+          <p:spPr>
+            <a:xfrm>
+              <a:off x="3303049" y="5455024"/>
+              <a:ext cx="332462" cy="306826"/>
+            </a:xfrm>
+            <a:prstGeom prst="rect">
+              <a:avLst/>
+            </a:prstGeom>
+          </p:spPr>
+        </p:pic>
+      </p:grpSp>
+    </p:spTree>
+    <p:extLst>
+      <p:ext uri="{BB962C8B-B14F-4D97-AF65-F5344CB8AC3E}">
+        <p14:creationId xmlns:p14="http://schemas.microsoft.com/office/powerpoint/2010/main" val="2736716654"/>
+      </p:ext>
+    </p:extLst>
+  </p:cSld>
+  <p:clrMapOvr>
+    <a:masterClrMapping/>
+  </p:clrMapOvr>
+</p:sld>
+</file>
+
+<file path=ppt/slides/slide7.xml><?xml version="1.0" encoding="utf-8"?>
+<p:sld xmlns:a="http://schemas.openxmlformats.org/drawingml/2006/main" xmlns:r="http://schemas.openxmlformats.org/officeDocument/2006/relationships" xmlns:p="http://schemas.openxmlformats.org/presentationml/2006/main">
+  <p:cSld>
+    <p:spTree>
+      <p:nvGrpSpPr>
+        <p:cNvPr id="1" name=""/>
+        <p:cNvGrpSpPr/>
+        <p:nvPr/>
+      </p:nvGrpSpPr>
+      <p:grpSpPr>
+        <a:xfrm>
+          <a:off x="0" y="0"/>
+          <a:ext cx="0" cy="0"/>
+          <a:chOff x="0" y="0"/>
+          <a:chExt cx="0" cy="0"/>
+        </a:xfrm>
+      </p:grpSpPr>
+      <p:sp>
+        <p:nvSpPr>
+          <p:cNvPr id="2" name="Titel 1">
+            <a:extLst>
+              <a:ext uri="{FF2B5EF4-FFF2-40B4-BE49-F238E27FC236}">
+                <a16:creationId xmlns:a16="http://schemas.microsoft.com/office/drawing/2014/main" id="{6334C8DA-8CC1-433B-9298-AAFBF636E749}"/>
+              </a:ext>
+            </a:extLst>
+          </p:cNvPr>
+          <p:cNvSpPr>
+            <a:spLocks noGrp="1"/>
+          </p:cNvSpPr>
+          <p:nvPr>
+            <p:ph type="title"/>
+          </p:nvPr>
+        </p:nvSpPr>
+        <p:spPr>
+          <a:xfrm>
+            <a:off x="839788" y="457200"/>
+            <a:ext cx="5256212" cy="531812"/>
+          </a:xfrm>
+        </p:spPr>
+        <p:txBody>
+          <a:bodyPr>
+            <a:normAutofit fontScale="90000"/>
+          </a:bodyPr>
+          <a:lstStyle/>
+          <a:p>
+            <a:r>
+              <a:rPr lang="de-DE" dirty="0"/>
+              <a:t>Button Allgemeine Einstellungen</a:t>
+            </a:r>
+          </a:p>
+        </p:txBody>
+      </p:sp>
+      <p:sp>
+        <p:nvSpPr>
+          <p:cNvPr id="4" name="Textplatzhalter 3">
+            <a:extLst>
+              <a:ext uri="{FF2B5EF4-FFF2-40B4-BE49-F238E27FC236}">
+                <a16:creationId xmlns:a16="http://schemas.microsoft.com/office/drawing/2014/main" id="{ADA8C5A8-81F8-4CA8-97E7-912C5395D1E9}"/>
+              </a:ext>
+            </a:extLst>
+          </p:cNvPr>
+          <p:cNvSpPr>
+            <a:spLocks noGrp="1"/>
+          </p:cNvSpPr>
+          <p:nvPr>
+            <p:ph type="body" sz="half" idx="2"/>
+          </p:nvPr>
+        </p:nvSpPr>
+        <p:spPr>
+          <a:xfrm>
+            <a:off x="839788" y="989012"/>
+            <a:ext cx="3932237" cy="4879976"/>
+          </a:xfrm>
+        </p:spPr>
+        <p:txBody>
+          <a:bodyPr/>
+          <a:lstStyle/>
+          <a:p>
+            <a:pPr marL="285750" indent="-285750">
+              <a:buFont typeface="Arial" panose="020B0604020202020204" pitchFamily="34" charset="0"/>
+              <a:buChar char="•"/>
+            </a:pPr>
+            <a:r>
+              <a:rPr lang="de-DE" dirty="0"/>
+              <a:t>Neues Fenster</a:t>
+            </a:r>
+          </a:p>
+          <a:p>
+            <a:pPr marL="285750" indent="-285750">
+              <a:buFont typeface="Arial" panose="020B0604020202020204" pitchFamily="34" charset="0"/>
+              <a:buChar char="•"/>
+            </a:pPr>
+            <a:r>
+              <a:rPr lang="de-DE" dirty="0" err="1"/>
+              <a:t>Functions</a:t>
+            </a:r>
+            <a:endParaRPr lang="de-DE" dirty="0"/>
+          </a:p>
+          <a:p>
+            <a:pPr marL="742950" lvl="1" indent="-285750">
+              <a:buFont typeface="Arial" panose="020B0604020202020204" pitchFamily="34" charset="0"/>
+              <a:buChar char="•"/>
+            </a:pPr>
+            <a:r>
+              <a:rPr lang="de-DE" dirty="0"/>
+              <a:t>Input</a:t>
+            </a:r>
+          </a:p>
+          <a:p>
+            <a:pPr marL="742950" lvl="1" indent="-285750">
+              <a:buFont typeface="Arial" panose="020B0604020202020204" pitchFamily="34" charset="0"/>
+              <a:buChar char="•"/>
+            </a:pPr>
+            <a:r>
+              <a:rPr lang="de-DE" dirty="0"/>
+              <a:t>Buttons</a:t>
+            </a:r>
+          </a:p>
+          <a:p>
+            <a:pPr marL="285750" indent="-285750">
+              <a:buFont typeface="Arial" panose="020B0604020202020204" pitchFamily="34" charset="0"/>
+              <a:buChar char="•"/>
+            </a:pPr>
+            <a:r>
+              <a:rPr lang="de-DE" dirty="0"/>
+              <a:t>Labels</a:t>
+            </a:r>
+          </a:p>
+          <a:p>
+            <a:pPr marL="742950" lvl="1" indent="-285750">
+              <a:buFont typeface="Arial" panose="020B0604020202020204" pitchFamily="34" charset="0"/>
+              <a:buChar char="•"/>
+            </a:pPr>
+            <a:endParaRPr lang="de-DE" dirty="0"/>
+          </a:p>
+          <a:p>
+            <a:pPr marL="285750" indent="-285750">
+              <a:buFont typeface="Arial" panose="020B0604020202020204" pitchFamily="34" charset="0"/>
+              <a:buChar char="•"/>
+            </a:pPr>
+            <a:endParaRPr lang="de-DE" dirty="0"/>
+          </a:p>
+        </p:txBody>
+      </p:sp>
+      <p:grpSp>
+        <p:nvGrpSpPr>
+          <p:cNvPr id="27" name="Gruppieren 26">
+            <a:extLst>
+              <a:ext uri="{FF2B5EF4-FFF2-40B4-BE49-F238E27FC236}">
+                <a16:creationId xmlns:a16="http://schemas.microsoft.com/office/drawing/2014/main" id="{46D71D41-2579-4818-A47F-9B4AB962A5D8}"/>
+              </a:ext>
+            </a:extLst>
+          </p:cNvPr>
+          <p:cNvGrpSpPr/>
+          <p:nvPr/>
+        </p:nvGrpSpPr>
+        <p:grpSpPr>
+          <a:xfrm>
+            <a:off x="7722979" y="69574"/>
+            <a:ext cx="3551583" cy="6718852"/>
+            <a:chOff x="2497169" y="1108332"/>
+            <a:chExt cx="3551583" cy="6718852"/>
+          </a:xfrm>
+        </p:grpSpPr>
+        <p:pic>
+          <p:nvPicPr>
+            <p:cNvPr id="28" name="Bildplatzhalter 5">
+              <a:extLst>
+                <a:ext uri="{FF2B5EF4-FFF2-40B4-BE49-F238E27FC236}">
+                  <a16:creationId xmlns:a16="http://schemas.microsoft.com/office/drawing/2014/main" id="{B1475AA2-30FC-4E50-AB9E-7B64C039BB57}"/>
+                </a:ext>
+              </a:extLst>
+            </p:cNvPr>
+            <p:cNvPicPr>
+              <a:picLocks noChangeAspect="1"/>
+            </p:cNvPicPr>
+            <p:nvPr/>
+          </p:nvPicPr>
+          <p:blipFill rotWithShape="1">
+            <a:blip r:embed="rId2">
+              <a:extLst>
+                <a:ext uri="{28A0092B-C50C-407E-A947-70E740481C1C}">
+                  <a14:useLocalDpi xmlns:a14="http://schemas.microsoft.com/office/drawing/2010/main" val="0"/>
+                </a:ext>
+              </a:extLst>
+            </a:blip>
+            <a:srcRect l="32105" t="4630" r="31726" b="4139"/>
+            <a:stretch/>
+          </p:blipFill>
+          <p:spPr>
+            <a:xfrm>
+              <a:off x="2497169" y="1108332"/>
+              <a:ext cx="3551583" cy="6718852"/>
+            </a:xfrm>
+            <a:prstGeom prst="rect">
+              <a:avLst/>
+            </a:prstGeom>
+          </p:spPr>
+        </p:pic>
         <p:sp>
           <p:nvSpPr>
-            <p:cNvPr id="36" name="Textfeld 35">
+            <p:cNvPr id="29" name="Textfeld 28">
               <a:extLst>
                 <a:ext uri="{FF2B5EF4-FFF2-40B4-BE49-F238E27FC236}">
-                  <a16:creationId xmlns:a16="http://schemas.microsoft.com/office/drawing/2014/main" id="{6D987787-D4C1-4776-9932-1641A4054E08}"/>
+                  <a16:creationId xmlns:a16="http://schemas.microsoft.com/office/drawing/2014/main" id="{16CAFE2E-D106-4067-B27B-448C6FDB4785}"/>
                 </a:ext>
               </a:extLst>
             </p:cNvPr>
@@ -5152,8 +5735,44 @@
           </p:nvSpPr>
           <p:spPr>
             <a:xfrm>
-              <a:off x="2925057" y="3104090"/>
-              <a:ext cx="435005" cy="338554"/>
+              <a:off x="2805906" y="1524436"/>
+              <a:ext cx="1326750" cy="338554"/>
+            </a:xfrm>
+            <a:prstGeom prst="rect">
+              <a:avLst/>
+            </a:prstGeom>
+            <a:noFill/>
+          </p:spPr>
+          <p:txBody>
+            <a:bodyPr wrap="square" rtlCol="0">
+              <a:spAutoFit/>
+            </a:bodyPr>
+            <a:lstStyle/>
+            <a:p>
+              <a:r>
+                <a:rPr lang="de-DE" sz="1600" b="1" dirty="0" err="1"/>
+                <a:t>Examstracker</a:t>
+              </a:r>
+              <a:endParaRPr lang="de-DE" sz="1600" b="1" dirty="0"/>
+            </a:p>
+          </p:txBody>
+        </p:sp>
+        <p:sp>
+          <p:nvSpPr>
+            <p:cNvPr id="30" name="Textfeld 29">
+              <a:extLst>
+                <a:ext uri="{FF2B5EF4-FFF2-40B4-BE49-F238E27FC236}">
+                  <a16:creationId xmlns:a16="http://schemas.microsoft.com/office/drawing/2014/main" id="{09E1B27C-882E-42E7-AB5F-6015C4FD617E}"/>
+                </a:ext>
+              </a:extLst>
+            </p:cNvPr>
+            <p:cNvSpPr txBox="1"/>
+            <p:nvPr/>
+          </p:nvSpPr>
+          <p:spPr>
+            <a:xfrm>
+              <a:off x="3994003" y="1524436"/>
+              <a:ext cx="1210418" cy="338554"/>
             </a:xfrm>
             <a:prstGeom prst="rect">
               <a:avLst/>
@@ -5168,226 +5787,90 @@
             <a:p>
               <a:r>
                 <a:rPr lang="de-DE" sz="1600" dirty="0"/>
-                <a:t>12</a:t>
+                <a:t>Fr., 15.01.21</a:t>
               </a:r>
             </a:p>
           </p:txBody>
         </p:sp>
-        <p:sp>
-          <p:nvSpPr>
-            <p:cNvPr id="37" name="Textfeld 36">
+        <p:pic>
+          <p:nvPicPr>
+            <p:cNvPr id="43" name="Grafik 42" descr="Zahnrad">
               <a:extLst>
                 <a:ext uri="{FF2B5EF4-FFF2-40B4-BE49-F238E27FC236}">
-                  <a16:creationId xmlns:a16="http://schemas.microsoft.com/office/drawing/2014/main" id="{9A903D83-F129-4542-9782-AD67225DE3DE}"/>
+                  <a16:creationId xmlns:a16="http://schemas.microsoft.com/office/drawing/2014/main" id="{61F2208A-A3F8-4A3C-A884-31971E1A859E}"/>
                 </a:ext>
               </a:extLst>
             </p:cNvPr>
-            <p:cNvSpPr txBox="1"/>
+            <p:cNvPicPr>
+              <a:picLocks noChangeAspect="1"/>
+            </p:cNvPicPr>
             <p:nvPr/>
-          </p:nvSpPr>
+          </p:nvPicPr>
+          <p:blipFill>
+            <a:blip r:embed="rId3">
+              <a:extLst>
+                <a:ext uri="{28A0092B-C50C-407E-A947-70E740481C1C}">
+                  <a14:useLocalDpi xmlns:a14="http://schemas.microsoft.com/office/drawing/2010/main" val="0"/>
+                </a:ext>
+                <a:ext uri="{96DAC541-7B7A-43D3-8B79-37D633B846F1}">
+                  <asvg:svgBlip xmlns:asvg="http://schemas.microsoft.com/office/drawing/2016/SVG/main" r:embed="rId4"/>
+                </a:ext>
+              </a:extLst>
+            </a:blip>
+            <a:stretch>
+              <a:fillRect/>
+            </a:stretch>
+          </p:blipFill>
           <p:spPr>
             <a:xfrm>
-              <a:off x="5316047" y="2560463"/>
-              <a:ext cx="265649" cy="369332"/>
+              <a:off x="5158005" y="1424532"/>
+              <a:ext cx="438458" cy="438458"/>
             </a:xfrm>
             <a:prstGeom prst="rect">
               <a:avLst/>
             </a:prstGeom>
-            <a:noFill/>
           </p:spPr>
-          <p:txBody>
-            <a:bodyPr wrap="square" rtlCol="0">
-              <a:spAutoFit/>
-            </a:bodyPr>
-            <a:lstStyle/>
-            <a:p>
-              <a:r>
-                <a:rPr lang="de-DE" dirty="0"/>
-                <a:t>3</a:t>
-              </a:r>
-            </a:p>
-          </p:txBody>
-        </p:sp>
-        <p:sp>
-          <p:nvSpPr>
-            <p:cNvPr id="38" name="Textfeld 37">
-              <a:extLst>
-                <a:ext uri="{FF2B5EF4-FFF2-40B4-BE49-F238E27FC236}">
-                  <a16:creationId xmlns:a16="http://schemas.microsoft.com/office/drawing/2014/main" id="{685229C3-4F07-4856-A34F-80719B266EE6}"/>
-                </a:ext>
-              </a:extLst>
-            </p:cNvPr>
-            <p:cNvSpPr txBox="1"/>
-            <p:nvPr/>
-          </p:nvSpPr>
-          <p:spPr>
-            <a:xfrm>
-              <a:off x="4548437" y="3097962"/>
-              <a:ext cx="301686" cy="369332"/>
-            </a:xfrm>
-            <a:prstGeom prst="rect">
-              <a:avLst/>
-            </a:prstGeom>
-            <a:noFill/>
-          </p:spPr>
-          <p:txBody>
-            <a:bodyPr wrap="none" rtlCol="0">
-              <a:spAutoFit/>
-            </a:bodyPr>
-            <a:lstStyle/>
-            <a:p>
-              <a:r>
-                <a:rPr lang="de-DE" dirty="0"/>
-                <a:t>5</a:t>
-              </a:r>
-            </a:p>
-          </p:txBody>
-        </p:sp>
-        <p:sp>
-          <p:nvSpPr>
-            <p:cNvPr id="39" name="Textfeld 38">
-              <a:extLst>
-                <a:ext uri="{FF2B5EF4-FFF2-40B4-BE49-F238E27FC236}">
-                  <a16:creationId xmlns:a16="http://schemas.microsoft.com/office/drawing/2014/main" id="{2FEB113D-3827-4608-9EDA-0756492C150D}"/>
-                </a:ext>
-              </a:extLst>
-            </p:cNvPr>
-            <p:cNvSpPr txBox="1"/>
-            <p:nvPr/>
-          </p:nvSpPr>
-          <p:spPr>
-            <a:xfrm>
-              <a:off x="4916236" y="2568716"/>
-              <a:ext cx="301686" cy="369332"/>
-            </a:xfrm>
-            <a:prstGeom prst="rect">
-              <a:avLst/>
-            </a:prstGeom>
-            <a:noFill/>
-          </p:spPr>
-          <p:txBody>
-            <a:bodyPr wrap="none" rtlCol="0">
-              <a:spAutoFit/>
-            </a:bodyPr>
-            <a:lstStyle/>
-            <a:p>
-              <a:r>
-                <a:rPr lang="de-DE" dirty="0"/>
-                <a:t>3</a:t>
-              </a:r>
-            </a:p>
-          </p:txBody>
-        </p:sp>
-        <p:sp>
-          <p:nvSpPr>
-            <p:cNvPr id="40" name="Textfeld 39">
-              <a:extLst>
-                <a:ext uri="{FF2B5EF4-FFF2-40B4-BE49-F238E27FC236}">
-                  <a16:creationId xmlns:a16="http://schemas.microsoft.com/office/drawing/2014/main" id="{5A748C76-68A3-4605-B0C9-94725566CEEA}"/>
-                </a:ext>
-              </a:extLst>
-            </p:cNvPr>
-            <p:cNvSpPr txBox="1"/>
-            <p:nvPr/>
-          </p:nvSpPr>
-          <p:spPr>
-            <a:xfrm>
-              <a:off x="4626841" y="2566150"/>
-              <a:ext cx="45719" cy="369332"/>
-            </a:xfrm>
-            <a:prstGeom prst="rect">
-              <a:avLst/>
-            </a:prstGeom>
-            <a:noFill/>
-          </p:spPr>
-          <p:txBody>
-            <a:bodyPr wrap="square" rtlCol="0">
-              <a:spAutoFit/>
-            </a:bodyPr>
-            <a:lstStyle/>
-            <a:p>
-              <a:r>
-                <a:rPr lang="de-DE" dirty="0"/>
-                <a:t>1</a:t>
-              </a:r>
-            </a:p>
-          </p:txBody>
-        </p:sp>
-        <p:sp>
-          <p:nvSpPr>
-            <p:cNvPr id="41" name="Textfeld 40">
-              <a:extLst>
-                <a:ext uri="{FF2B5EF4-FFF2-40B4-BE49-F238E27FC236}">
-                  <a16:creationId xmlns:a16="http://schemas.microsoft.com/office/drawing/2014/main" id="{50258C72-5A71-4151-BC5A-EE39B6752B52}"/>
-                </a:ext>
-              </a:extLst>
-            </p:cNvPr>
-            <p:cNvSpPr txBox="1"/>
-            <p:nvPr/>
-          </p:nvSpPr>
-          <p:spPr>
-            <a:xfrm>
-              <a:off x="4902735" y="3097962"/>
-              <a:ext cx="301686" cy="369332"/>
-            </a:xfrm>
-            <a:prstGeom prst="rect">
-              <a:avLst/>
-            </a:prstGeom>
-            <a:noFill/>
-          </p:spPr>
-          <p:txBody>
-            <a:bodyPr wrap="none" rtlCol="0">
-              <a:spAutoFit/>
-            </a:bodyPr>
-            <a:lstStyle/>
-            <a:p>
-              <a:r>
-                <a:rPr lang="de-DE" dirty="0"/>
-                <a:t>5</a:t>
-              </a:r>
-            </a:p>
-          </p:txBody>
-        </p:sp>
-        <p:sp>
-          <p:nvSpPr>
-            <p:cNvPr id="44" name="Textfeld 43">
-              <a:extLst>
-                <a:ext uri="{FF2B5EF4-FFF2-40B4-BE49-F238E27FC236}">
-                  <a16:creationId xmlns:a16="http://schemas.microsoft.com/office/drawing/2014/main" id="{A7E20937-6FF4-4D4B-8891-FF884F89504E}"/>
-                </a:ext>
-              </a:extLst>
-            </p:cNvPr>
-            <p:cNvSpPr txBox="1"/>
-            <p:nvPr/>
-          </p:nvSpPr>
-          <p:spPr>
-            <a:xfrm>
-              <a:off x="5280010" y="3106915"/>
-              <a:ext cx="301686" cy="369332"/>
-            </a:xfrm>
-            <a:prstGeom prst="rect">
-              <a:avLst/>
-            </a:prstGeom>
-            <a:noFill/>
-          </p:spPr>
-          <p:txBody>
-            <a:bodyPr wrap="none" rtlCol="0">
-              <a:spAutoFit/>
-            </a:bodyPr>
-            <a:lstStyle/>
-            <a:p>
-              <a:r>
-                <a:rPr lang="de-DE" dirty="0"/>
-                <a:t>5</a:t>
-              </a:r>
-            </a:p>
-          </p:txBody>
-        </p:sp>
+        </p:pic>
       </p:grpSp>
+      <p:sp>
+        <p:nvSpPr>
+          <p:cNvPr id="3" name="Textfeld 2">
+            <a:extLst>
+              <a:ext uri="{FF2B5EF4-FFF2-40B4-BE49-F238E27FC236}">
+                <a16:creationId xmlns:a16="http://schemas.microsoft.com/office/drawing/2014/main" id="{3760829B-68DB-43BC-887A-CAB708CFA26A}"/>
+              </a:ext>
+            </a:extLst>
+          </p:cNvPr>
+          <p:cNvSpPr txBox="1"/>
+          <p:nvPr/>
+        </p:nvSpPr>
+        <p:spPr>
+          <a:xfrm>
+            <a:off x="8100900" y="1230176"/>
+            <a:ext cx="1326750" cy="338554"/>
+          </a:xfrm>
+          <a:prstGeom prst="rect">
+            <a:avLst/>
+          </a:prstGeom>
+          <a:noFill/>
+        </p:spPr>
+        <p:txBody>
+          <a:bodyPr wrap="square" rtlCol="0">
+            <a:spAutoFit/>
+          </a:bodyPr>
+          <a:lstStyle/>
+          <a:p>
+            <a:r>
+              <a:rPr lang="de-DE" sz="1600" dirty="0"/>
+              <a:t>Einstellungen</a:t>
+            </a:r>
+          </a:p>
+        </p:txBody>
+      </p:sp>
     </p:spTree>
     <p:extLst>
       <p:ext uri="{BB962C8B-B14F-4D97-AF65-F5344CB8AC3E}">
-        <p14:creationId xmlns:p14="http://schemas.microsoft.com/office/powerpoint/2010/main" val="596936120"/>
+        <p14:creationId xmlns:p14="http://schemas.microsoft.com/office/powerpoint/2010/main" val="1836670161"/>
       </p:ext>
     </p:extLst>
   </p:cSld>

</xml_diff>

<commit_message>
Create new ppp pages: Motivationssprüche, Ideensammlung
</commit_message>
<xml_diff>
--- a/Design plan.pptx
+++ b/Design plan.pptx
@@ -12,6 +12,8 @@
     <p:sldId id="262" r:id="rId6"/>
     <p:sldId id="264" r:id="rId7"/>
     <p:sldId id="263" r:id="rId8"/>
+    <p:sldId id="267" r:id="rId9"/>
+    <p:sldId id="266" r:id="rId10"/>
   </p:sldIdLst>
   <p:sldSz cx="12192000" cy="6858000"/>
   <p:notesSz cx="6858000" cy="9144000"/>
@@ -265,7 +267,7 @@
           <a:p>
             <a:fld id="{F5A5688D-1BD8-47D4-838D-2584F5FD8232}" type="datetimeFigureOut">
               <a:rPr lang="de-DE" smtClean="0"/>
-              <a:t>15.01.2021</a:t>
+              <a:t>16.01.2021</a:t>
             </a:fld>
             <a:endParaRPr lang="de-DE"/>
           </a:p>
@@ -463,7 +465,7 @@
           <a:p>
             <a:fld id="{F5A5688D-1BD8-47D4-838D-2584F5FD8232}" type="datetimeFigureOut">
               <a:rPr lang="de-DE" smtClean="0"/>
-              <a:t>15.01.2021</a:t>
+              <a:t>16.01.2021</a:t>
             </a:fld>
             <a:endParaRPr lang="de-DE"/>
           </a:p>
@@ -671,7 +673,7 @@
           <a:p>
             <a:fld id="{F5A5688D-1BD8-47D4-838D-2584F5FD8232}" type="datetimeFigureOut">
               <a:rPr lang="de-DE" smtClean="0"/>
-              <a:t>15.01.2021</a:t>
+              <a:t>16.01.2021</a:t>
             </a:fld>
             <a:endParaRPr lang="de-DE"/>
           </a:p>
@@ -869,7 +871,7 @@
           <a:p>
             <a:fld id="{F5A5688D-1BD8-47D4-838D-2584F5FD8232}" type="datetimeFigureOut">
               <a:rPr lang="de-DE" smtClean="0"/>
-              <a:t>15.01.2021</a:t>
+              <a:t>16.01.2021</a:t>
             </a:fld>
             <a:endParaRPr lang="de-DE"/>
           </a:p>
@@ -1144,7 +1146,7 @@
           <a:p>
             <a:fld id="{F5A5688D-1BD8-47D4-838D-2584F5FD8232}" type="datetimeFigureOut">
               <a:rPr lang="de-DE" smtClean="0"/>
-              <a:t>15.01.2021</a:t>
+              <a:t>16.01.2021</a:t>
             </a:fld>
             <a:endParaRPr lang="de-DE"/>
           </a:p>
@@ -1409,7 +1411,7 @@
           <a:p>
             <a:fld id="{F5A5688D-1BD8-47D4-838D-2584F5FD8232}" type="datetimeFigureOut">
               <a:rPr lang="de-DE" smtClean="0"/>
-              <a:t>15.01.2021</a:t>
+              <a:t>16.01.2021</a:t>
             </a:fld>
             <a:endParaRPr lang="de-DE"/>
           </a:p>
@@ -1821,7 +1823,7 @@
           <a:p>
             <a:fld id="{F5A5688D-1BD8-47D4-838D-2584F5FD8232}" type="datetimeFigureOut">
               <a:rPr lang="de-DE" smtClean="0"/>
-              <a:t>15.01.2021</a:t>
+              <a:t>16.01.2021</a:t>
             </a:fld>
             <a:endParaRPr lang="de-DE"/>
           </a:p>
@@ -1962,7 +1964,7 @@
           <a:p>
             <a:fld id="{F5A5688D-1BD8-47D4-838D-2584F5FD8232}" type="datetimeFigureOut">
               <a:rPr lang="de-DE" smtClean="0"/>
-              <a:t>15.01.2021</a:t>
+              <a:t>16.01.2021</a:t>
             </a:fld>
             <a:endParaRPr lang="de-DE"/>
           </a:p>
@@ -2075,7 +2077,7 @@
           <a:p>
             <a:fld id="{F5A5688D-1BD8-47D4-838D-2584F5FD8232}" type="datetimeFigureOut">
               <a:rPr lang="de-DE" smtClean="0"/>
-              <a:t>15.01.2021</a:t>
+              <a:t>16.01.2021</a:t>
             </a:fld>
             <a:endParaRPr lang="de-DE"/>
           </a:p>
@@ -2386,7 +2388,7 @@
           <a:p>
             <a:fld id="{F5A5688D-1BD8-47D4-838D-2584F5FD8232}" type="datetimeFigureOut">
               <a:rPr lang="de-DE" smtClean="0"/>
-              <a:t>15.01.2021</a:t>
+              <a:t>16.01.2021</a:t>
             </a:fld>
             <a:endParaRPr lang="de-DE"/>
           </a:p>
@@ -2674,7 +2676,7 @@
           <a:p>
             <a:fld id="{F5A5688D-1BD8-47D4-838D-2584F5FD8232}" type="datetimeFigureOut">
               <a:rPr lang="de-DE" smtClean="0"/>
-              <a:t>15.01.2021</a:t>
+              <a:t>16.01.2021</a:t>
             </a:fld>
             <a:endParaRPr lang="de-DE"/>
           </a:p>
@@ -2915,7 +2917,7 @@
           <a:p>
             <a:fld id="{F5A5688D-1BD8-47D4-838D-2584F5FD8232}" type="datetimeFigureOut">
               <a:rPr lang="de-DE" smtClean="0"/>
-              <a:t>15.01.2021</a:t>
+              <a:t>16.01.2021</a:t>
             </a:fld>
             <a:endParaRPr lang="de-DE"/>
           </a:p>
@@ -3621,6 +3623,18 @@
               <a:t>Button allgemeine Einstellungen</a:t>
             </a:r>
           </a:p>
+          <a:p>
+            <a:r>
+              <a:rPr lang="de-DE" dirty="0"/>
+              <a:t>Motivationssprüche</a:t>
+            </a:r>
+          </a:p>
+          <a:p>
+            <a:r>
+              <a:rPr lang="de-DE" dirty="0"/>
+              <a:t>Ideensammlung</a:t>
+            </a:r>
+          </a:p>
         </p:txBody>
       </p:sp>
     </p:spTree>
@@ -5871,6 +5885,309 @@
     <p:extLst>
       <p:ext uri="{BB962C8B-B14F-4D97-AF65-F5344CB8AC3E}">
         <p14:creationId xmlns:p14="http://schemas.microsoft.com/office/powerpoint/2010/main" val="1836670161"/>
+      </p:ext>
+    </p:extLst>
+  </p:cSld>
+  <p:clrMapOvr>
+    <a:masterClrMapping/>
+  </p:clrMapOvr>
+</p:sld>
+</file>
+
+<file path=ppt/slides/slide8.xml><?xml version="1.0" encoding="utf-8"?>
+<p:sld xmlns:a="http://schemas.openxmlformats.org/drawingml/2006/main" xmlns:r="http://schemas.openxmlformats.org/officeDocument/2006/relationships" xmlns:p="http://schemas.openxmlformats.org/presentationml/2006/main">
+  <p:cSld>
+    <p:spTree>
+      <p:nvGrpSpPr>
+        <p:cNvPr id="1" name=""/>
+        <p:cNvGrpSpPr/>
+        <p:nvPr/>
+      </p:nvGrpSpPr>
+      <p:grpSpPr>
+        <a:xfrm>
+          <a:off x="0" y="0"/>
+          <a:ext cx="0" cy="0"/>
+          <a:chOff x="0" y="0"/>
+          <a:chExt cx="0" cy="0"/>
+        </a:xfrm>
+      </p:grpSpPr>
+      <p:sp>
+        <p:nvSpPr>
+          <p:cNvPr id="2" name="Titel 1">
+            <a:extLst>
+              <a:ext uri="{FF2B5EF4-FFF2-40B4-BE49-F238E27FC236}">
+                <a16:creationId xmlns:a16="http://schemas.microsoft.com/office/drawing/2014/main" id="{62C6F701-D41B-4475-A9DB-F8B4525AE063}"/>
+              </a:ext>
+            </a:extLst>
+          </p:cNvPr>
+          <p:cNvSpPr>
+            <a:spLocks noGrp="1"/>
+          </p:cNvSpPr>
+          <p:nvPr>
+            <p:ph type="title"/>
+          </p:nvPr>
+        </p:nvSpPr>
+        <p:spPr/>
+        <p:txBody>
+          <a:bodyPr/>
+          <a:lstStyle/>
+          <a:p>
+            <a:r>
+              <a:rPr lang="de-DE" dirty="0"/>
+              <a:t>Motivationssprüche</a:t>
+            </a:r>
+          </a:p>
+        </p:txBody>
+      </p:sp>
+      <p:sp>
+        <p:nvSpPr>
+          <p:cNvPr id="3" name="Inhaltsplatzhalter 2">
+            <a:extLst>
+              <a:ext uri="{FF2B5EF4-FFF2-40B4-BE49-F238E27FC236}">
+                <a16:creationId xmlns:a16="http://schemas.microsoft.com/office/drawing/2014/main" id="{6AC05503-9040-43CE-B5E4-38A588B8D130}"/>
+              </a:ext>
+            </a:extLst>
+          </p:cNvPr>
+          <p:cNvSpPr>
+            <a:spLocks noGrp="1"/>
+          </p:cNvSpPr>
+          <p:nvPr>
+            <p:ph idx="1"/>
+          </p:nvPr>
+        </p:nvSpPr>
+        <p:spPr/>
+        <p:txBody>
+          <a:bodyPr>
+            <a:normAutofit/>
+          </a:bodyPr>
+          <a:lstStyle/>
+          <a:p>
+            <a:r>
+              <a:rPr lang="de-DE" sz="1400" dirty="0" err="1"/>
+              <a:t>Todo</a:t>
+            </a:r>
+            <a:endParaRPr lang="de-DE" sz="1400" dirty="0"/>
+          </a:p>
+          <a:p>
+            <a:pPr lvl="1"/>
+            <a:r>
+              <a:rPr lang="de-DE" sz="1000" dirty="0"/>
+              <a:t>Maximale Länge abklären</a:t>
+            </a:r>
+          </a:p>
+          <a:p>
+            <a:r>
+              <a:rPr lang="de-DE" sz="1400"/>
+              <a:t>1.</a:t>
+            </a:r>
+            <a:r>
+              <a:rPr lang="de-DE" sz="1400" dirty="0"/>
+              <a:t> </a:t>
+            </a:r>
+            <a:endParaRPr lang="de-DE" sz="1400"/>
+          </a:p>
+        </p:txBody>
+      </p:sp>
+      <p:sp>
+        <p:nvSpPr>
+          <p:cNvPr id="4" name="Textfeld 3">
+            <a:extLst>
+              <a:ext uri="{FF2B5EF4-FFF2-40B4-BE49-F238E27FC236}">
+                <a16:creationId xmlns:a16="http://schemas.microsoft.com/office/drawing/2014/main" id="{2A271BFA-43B5-44B0-AC47-61A738DD6FF5}"/>
+              </a:ext>
+            </a:extLst>
+          </p:cNvPr>
+          <p:cNvSpPr txBox="1"/>
+          <p:nvPr/>
+        </p:nvSpPr>
+        <p:spPr>
+          <a:xfrm>
+            <a:off x="9436963" y="230819"/>
+            <a:ext cx="2556769" cy="600164"/>
+          </a:xfrm>
+          <a:prstGeom prst="rect">
+            <a:avLst/>
+          </a:prstGeom>
+          <a:noFill/>
+        </p:spPr>
+        <p:txBody>
+          <a:bodyPr wrap="square" rtlCol="0">
+            <a:spAutoFit/>
+          </a:bodyPr>
+          <a:lstStyle/>
+          <a:p>
+            <a:r>
+              <a:rPr lang="de-DE" sz="1100" dirty="0"/>
+              <a:t>Aufschreiben von Motivationen, die jeden Tag oder pro </a:t>
+            </a:r>
+            <a:r>
+              <a:rPr lang="de-DE" sz="1100" dirty="0" err="1"/>
+              <a:t>Appaufruf</a:t>
+            </a:r>
+            <a:r>
+              <a:rPr lang="de-DE" sz="1100" dirty="0"/>
+              <a:t> zufällig ausgewählt werden.</a:t>
+            </a:r>
+          </a:p>
+        </p:txBody>
+      </p:sp>
+    </p:spTree>
+    <p:extLst>
+      <p:ext uri="{BB962C8B-B14F-4D97-AF65-F5344CB8AC3E}">
+        <p14:creationId xmlns:p14="http://schemas.microsoft.com/office/powerpoint/2010/main" val="248452350"/>
+      </p:ext>
+    </p:extLst>
+  </p:cSld>
+  <p:clrMapOvr>
+    <a:masterClrMapping/>
+  </p:clrMapOvr>
+</p:sld>
+</file>
+
+<file path=ppt/slides/slide9.xml><?xml version="1.0" encoding="utf-8"?>
+<p:sld xmlns:a="http://schemas.openxmlformats.org/drawingml/2006/main" xmlns:r="http://schemas.openxmlformats.org/officeDocument/2006/relationships" xmlns:p="http://schemas.openxmlformats.org/presentationml/2006/main">
+  <p:cSld>
+    <p:spTree>
+      <p:nvGrpSpPr>
+        <p:cNvPr id="1" name=""/>
+        <p:cNvGrpSpPr/>
+        <p:nvPr/>
+      </p:nvGrpSpPr>
+      <p:grpSpPr>
+        <a:xfrm>
+          <a:off x="0" y="0"/>
+          <a:ext cx="0" cy="0"/>
+          <a:chOff x="0" y="0"/>
+          <a:chExt cx="0" cy="0"/>
+        </a:xfrm>
+      </p:grpSpPr>
+      <p:sp>
+        <p:nvSpPr>
+          <p:cNvPr id="2" name="Titel 1">
+            <a:extLst>
+              <a:ext uri="{FF2B5EF4-FFF2-40B4-BE49-F238E27FC236}">
+                <a16:creationId xmlns:a16="http://schemas.microsoft.com/office/drawing/2014/main" id="{66FECF84-48B1-43D3-AC64-911443B6B541}"/>
+              </a:ext>
+            </a:extLst>
+          </p:cNvPr>
+          <p:cNvSpPr>
+            <a:spLocks noGrp="1"/>
+          </p:cNvSpPr>
+          <p:nvPr>
+            <p:ph type="title"/>
+          </p:nvPr>
+        </p:nvSpPr>
+        <p:spPr/>
+        <p:txBody>
+          <a:bodyPr/>
+          <a:lstStyle/>
+          <a:p>
+            <a:r>
+              <a:rPr lang="de-DE" dirty="0"/>
+              <a:t>Ideensammlung</a:t>
+            </a:r>
+          </a:p>
+        </p:txBody>
+      </p:sp>
+      <p:sp>
+        <p:nvSpPr>
+          <p:cNvPr id="3" name="Inhaltsplatzhalter 2">
+            <a:extLst>
+              <a:ext uri="{FF2B5EF4-FFF2-40B4-BE49-F238E27FC236}">
+                <a16:creationId xmlns:a16="http://schemas.microsoft.com/office/drawing/2014/main" id="{9BA52AA8-25D1-4A60-B34D-DE0884BCCDC6}"/>
+              </a:ext>
+            </a:extLst>
+          </p:cNvPr>
+          <p:cNvSpPr>
+            <a:spLocks noGrp="1"/>
+          </p:cNvSpPr>
+          <p:nvPr>
+            <p:ph idx="1"/>
+          </p:nvPr>
+        </p:nvSpPr>
+        <p:spPr/>
+        <p:txBody>
+          <a:bodyPr/>
+          <a:lstStyle/>
+          <a:p>
+            <a:r>
+              <a:rPr lang="de-DE" dirty="0"/>
+              <a:t>Fortschrittsbalken</a:t>
+            </a:r>
+          </a:p>
+          <a:p>
+            <a:pPr lvl="1"/>
+            <a:r>
+              <a:rPr lang="de-DE" dirty="0"/>
+              <a:t>Idee1: als Hintergrund von Prüfung 1</a:t>
+            </a:r>
+          </a:p>
+          <a:p>
+            <a:pPr lvl="1"/>
+            <a:r>
+              <a:rPr lang="de-DE" dirty="0"/>
+              <a:t>Idee2: als schmaler Balken unter Prüfung 1</a:t>
+            </a:r>
+          </a:p>
+          <a:p>
+            <a:r>
+              <a:rPr lang="de-DE" dirty="0"/>
+              <a:t>Motivationssprüche unter Infoleiste</a:t>
+            </a:r>
+          </a:p>
+        </p:txBody>
+      </p:sp>
+      <p:sp>
+        <p:nvSpPr>
+          <p:cNvPr id="4" name="Textfeld 3">
+            <a:extLst>
+              <a:ext uri="{FF2B5EF4-FFF2-40B4-BE49-F238E27FC236}">
+                <a16:creationId xmlns:a16="http://schemas.microsoft.com/office/drawing/2014/main" id="{9711843E-DB97-4F9E-9B56-663D4530A34A}"/>
+              </a:ext>
+            </a:extLst>
+          </p:cNvPr>
+          <p:cNvSpPr txBox="1"/>
+          <p:nvPr/>
+        </p:nvSpPr>
+        <p:spPr>
+          <a:xfrm>
+            <a:off x="9614516" y="226670"/>
+            <a:ext cx="2405849" cy="600164"/>
+          </a:xfrm>
+          <a:prstGeom prst="rect">
+            <a:avLst/>
+          </a:prstGeom>
+          <a:noFill/>
+        </p:spPr>
+        <p:txBody>
+          <a:bodyPr wrap="square" rtlCol="0">
+            <a:spAutoFit/>
+          </a:bodyPr>
+          <a:lstStyle/>
+          <a:p>
+            <a:r>
+              <a:rPr lang="de-DE" sz="1100" dirty="0"/>
+              <a:t>Spontane Ideen schnell aufschreiben</a:t>
+            </a:r>
+          </a:p>
+          <a:p>
+            <a:r>
+              <a:rPr lang="de-DE" sz="1100" dirty="0"/>
+              <a:t>Zunächst besprechen und abstimmen</a:t>
+            </a:r>
+          </a:p>
+          <a:p>
+            <a:r>
+              <a:rPr lang="de-DE" sz="1100" dirty="0"/>
+              <a:t>Anschließend Umsetzung ins Design</a:t>
+            </a:r>
+          </a:p>
+        </p:txBody>
+      </p:sp>
+    </p:spTree>
+    <p:extLst>
+      <p:ext uri="{BB962C8B-B14F-4D97-AF65-F5344CB8AC3E}">
+        <p14:creationId xmlns:p14="http://schemas.microsoft.com/office/powerpoint/2010/main" val="3309805435"/>
       </p:ext>
     </p:extLst>
   </p:cSld>

</xml_diff>

<commit_message>
added title to ppp
</commit_message>
<xml_diff>
--- a/Design plan.pptx
+++ b/Design plan.pptx
@@ -265,7 +265,7 @@
           <a:p>
             <a:fld id="{F5A5688D-1BD8-47D4-838D-2584F5FD8232}" type="datetimeFigureOut">
               <a:rPr lang="de-DE" smtClean="0"/>
-              <a:t>15.01.2021</a:t>
+              <a:t>16.01.2021</a:t>
             </a:fld>
             <a:endParaRPr lang="de-DE"/>
           </a:p>
@@ -463,7 +463,7 @@
           <a:p>
             <a:fld id="{F5A5688D-1BD8-47D4-838D-2584F5FD8232}" type="datetimeFigureOut">
               <a:rPr lang="de-DE" smtClean="0"/>
-              <a:t>15.01.2021</a:t>
+              <a:t>16.01.2021</a:t>
             </a:fld>
             <a:endParaRPr lang="de-DE"/>
           </a:p>
@@ -671,7 +671,7 @@
           <a:p>
             <a:fld id="{F5A5688D-1BD8-47D4-838D-2584F5FD8232}" type="datetimeFigureOut">
               <a:rPr lang="de-DE" smtClean="0"/>
-              <a:t>15.01.2021</a:t>
+              <a:t>16.01.2021</a:t>
             </a:fld>
             <a:endParaRPr lang="de-DE"/>
           </a:p>
@@ -869,7 +869,7 @@
           <a:p>
             <a:fld id="{F5A5688D-1BD8-47D4-838D-2584F5FD8232}" type="datetimeFigureOut">
               <a:rPr lang="de-DE" smtClean="0"/>
-              <a:t>15.01.2021</a:t>
+              <a:t>16.01.2021</a:t>
             </a:fld>
             <a:endParaRPr lang="de-DE"/>
           </a:p>
@@ -1144,7 +1144,7 @@
           <a:p>
             <a:fld id="{F5A5688D-1BD8-47D4-838D-2584F5FD8232}" type="datetimeFigureOut">
               <a:rPr lang="de-DE" smtClean="0"/>
-              <a:t>15.01.2021</a:t>
+              <a:t>16.01.2021</a:t>
             </a:fld>
             <a:endParaRPr lang="de-DE"/>
           </a:p>
@@ -1409,7 +1409,7 @@
           <a:p>
             <a:fld id="{F5A5688D-1BD8-47D4-838D-2584F5FD8232}" type="datetimeFigureOut">
               <a:rPr lang="de-DE" smtClean="0"/>
-              <a:t>15.01.2021</a:t>
+              <a:t>16.01.2021</a:t>
             </a:fld>
             <a:endParaRPr lang="de-DE"/>
           </a:p>
@@ -1821,7 +1821,7 @@
           <a:p>
             <a:fld id="{F5A5688D-1BD8-47D4-838D-2584F5FD8232}" type="datetimeFigureOut">
               <a:rPr lang="de-DE" smtClean="0"/>
-              <a:t>15.01.2021</a:t>
+              <a:t>16.01.2021</a:t>
             </a:fld>
             <a:endParaRPr lang="de-DE"/>
           </a:p>
@@ -1962,7 +1962,7 @@
           <a:p>
             <a:fld id="{F5A5688D-1BD8-47D4-838D-2584F5FD8232}" type="datetimeFigureOut">
               <a:rPr lang="de-DE" smtClean="0"/>
-              <a:t>15.01.2021</a:t>
+              <a:t>16.01.2021</a:t>
             </a:fld>
             <a:endParaRPr lang="de-DE"/>
           </a:p>
@@ -2075,7 +2075,7 @@
           <a:p>
             <a:fld id="{F5A5688D-1BD8-47D4-838D-2584F5FD8232}" type="datetimeFigureOut">
               <a:rPr lang="de-DE" smtClean="0"/>
-              <a:t>15.01.2021</a:t>
+              <a:t>16.01.2021</a:t>
             </a:fld>
             <a:endParaRPr lang="de-DE"/>
           </a:p>
@@ -2386,7 +2386,7 @@
           <a:p>
             <a:fld id="{F5A5688D-1BD8-47D4-838D-2584F5FD8232}" type="datetimeFigureOut">
               <a:rPr lang="de-DE" smtClean="0"/>
-              <a:t>15.01.2021</a:t>
+              <a:t>16.01.2021</a:t>
             </a:fld>
             <a:endParaRPr lang="de-DE"/>
           </a:p>
@@ -2674,7 +2674,7 @@
           <a:p>
             <a:fld id="{F5A5688D-1BD8-47D4-838D-2584F5FD8232}" type="datetimeFigureOut">
               <a:rPr lang="de-DE" smtClean="0"/>
-              <a:t>15.01.2021</a:t>
+              <a:t>16.01.2021</a:t>
             </a:fld>
             <a:endParaRPr lang="de-DE"/>
           </a:p>
@@ -2915,7 +2915,7 @@
           <a:p>
             <a:fld id="{F5A5688D-1BD8-47D4-838D-2584F5FD8232}" type="datetimeFigureOut">
               <a:rPr lang="de-DE" smtClean="0"/>
-              <a:t>15.01.2021</a:t>
+              <a:t>16.01.2021</a:t>
             </a:fld>
             <a:endParaRPr lang="de-DE"/>
           </a:p>
@@ -3353,7 +3353,11 @@
           <a:bodyPr/>
           <a:lstStyle/>
           <a:p>
-            <a:endParaRPr lang="de-DE"/>
+            <a:r>
+              <a:rPr lang="de-DE" dirty="0" err="1"/>
+              <a:t>ExamTracker</a:t>
+            </a:r>
+            <a:endParaRPr lang="de-DE" dirty="0"/>
           </a:p>
         </p:txBody>
       </p:sp>

</xml_diff>

<commit_message>
Add Button spezifische Einstellungen in Main Page
</commit_message>
<xml_diff>
--- a/Design plan.pptx
+++ b/Design plan.pptx
@@ -12,8 +12,9 @@
     <p:sldId id="262" r:id="rId6"/>
     <p:sldId id="264" r:id="rId7"/>
     <p:sldId id="263" r:id="rId8"/>
-    <p:sldId id="267" r:id="rId9"/>
-    <p:sldId id="266" r:id="rId10"/>
+    <p:sldId id="268" r:id="rId9"/>
+    <p:sldId id="267" r:id="rId10"/>
+    <p:sldId id="266" r:id="rId11"/>
   </p:sldIdLst>
   <p:sldSz cx="12192000" cy="6858000"/>
   <p:notesSz cx="6858000" cy="9144000"/>
@@ -3397,6 +3398,179 @@
 </p:sld>
 </file>
 
+<file path=ppt/slides/slide10.xml><?xml version="1.0" encoding="utf-8"?>
+<p:sld xmlns:a="http://schemas.openxmlformats.org/drawingml/2006/main" xmlns:r="http://schemas.openxmlformats.org/officeDocument/2006/relationships" xmlns:p="http://schemas.openxmlformats.org/presentationml/2006/main">
+  <p:cSld>
+    <p:spTree>
+      <p:nvGrpSpPr>
+        <p:cNvPr id="1" name=""/>
+        <p:cNvGrpSpPr/>
+        <p:nvPr/>
+      </p:nvGrpSpPr>
+      <p:grpSpPr>
+        <a:xfrm>
+          <a:off x="0" y="0"/>
+          <a:ext cx="0" cy="0"/>
+          <a:chOff x="0" y="0"/>
+          <a:chExt cx="0" cy="0"/>
+        </a:xfrm>
+      </p:grpSpPr>
+      <p:sp>
+        <p:nvSpPr>
+          <p:cNvPr id="2" name="Titel 1">
+            <a:extLst>
+              <a:ext uri="{FF2B5EF4-FFF2-40B4-BE49-F238E27FC236}">
+                <a16:creationId xmlns:a16="http://schemas.microsoft.com/office/drawing/2014/main" id="{66FECF84-48B1-43D3-AC64-911443B6B541}"/>
+              </a:ext>
+            </a:extLst>
+          </p:cNvPr>
+          <p:cNvSpPr>
+            <a:spLocks noGrp="1"/>
+          </p:cNvSpPr>
+          <p:nvPr>
+            <p:ph type="title"/>
+          </p:nvPr>
+        </p:nvSpPr>
+        <p:spPr/>
+        <p:txBody>
+          <a:bodyPr/>
+          <a:lstStyle/>
+          <a:p>
+            <a:r>
+              <a:rPr lang="de-DE" dirty="0"/>
+              <a:t>Ideensammlung</a:t>
+            </a:r>
+          </a:p>
+        </p:txBody>
+      </p:sp>
+      <p:sp>
+        <p:nvSpPr>
+          <p:cNvPr id="3" name="Inhaltsplatzhalter 2">
+            <a:extLst>
+              <a:ext uri="{FF2B5EF4-FFF2-40B4-BE49-F238E27FC236}">
+                <a16:creationId xmlns:a16="http://schemas.microsoft.com/office/drawing/2014/main" id="{9BA52AA8-25D1-4A60-B34D-DE0884BCCDC6}"/>
+              </a:ext>
+            </a:extLst>
+          </p:cNvPr>
+          <p:cNvSpPr>
+            <a:spLocks noGrp="1"/>
+          </p:cNvSpPr>
+          <p:nvPr>
+            <p:ph idx="1"/>
+          </p:nvPr>
+        </p:nvSpPr>
+        <p:spPr/>
+        <p:txBody>
+          <a:bodyPr/>
+          <a:lstStyle/>
+          <a:p>
+            <a:r>
+              <a:rPr lang="de-DE" dirty="0"/>
+              <a:t>Fortschrittsbalken</a:t>
+            </a:r>
+          </a:p>
+          <a:p>
+            <a:pPr lvl="1"/>
+            <a:r>
+              <a:rPr lang="de-DE" dirty="0"/>
+              <a:t>Idee1: als Hintergrund von Prüfung 1</a:t>
+            </a:r>
+          </a:p>
+          <a:p>
+            <a:pPr lvl="1"/>
+            <a:r>
+              <a:rPr lang="de-DE" dirty="0"/>
+              <a:t>Idee2: als schmaler Balken unter Prüfung 1</a:t>
+            </a:r>
+          </a:p>
+          <a:p>
+            <a:r>
+              <a:rPr lang="de-DE" dirty="0"/>
+              <a:t>Motivationssprüche unter Infoleiste</a:t>
+            </a:r>
+          </a:p>
+          <a:p>
+            <a:r>
+              <a:rPr lang="de-DE" dirty="0"/>
+              <a:t>Ab 10.000 Downloads auf Freemium umsteigen (Werbebalken unten)</a:t>
+            </a:r>
+          </a:p>
+          <a:p>
+            <a:r>
+              <a:rPr lang="de-DE" dirty="0"/>
+              <a:t>(Aufklappbares Menü zum Abchecken von </a:t>
+            </a:r>
+            <a:r>
+              <a:rPr lang="de-DE" dirty="0" err="1"/>
+              <a:t>Todos</a:t>
+            </a:r>
+            <a:r>
+              <a:rPr lang="de-DE" dirty="0"/>
+              <a:t>)</a:t>
+            </a:r>
+          </a:p>
+        </p:txBody>
+      </p:sp>
+      <p:sp>
+        <p:nvSpPr>
+          <p:cNvPr id="4" name="Textfeld 3">
+            <a:extLst>
+              <a:ext uri="{FF2B5EF4-FFF2-40B4-BE49-F238E27FC236}">
+                <a16:creationId xmlns:a16="http://schemas.microsoft.com/office/drawing/2014/main" id="{9711843E-DB97-4F9E-9B56-663D4530A34A}"/>
+              </a:ext>
+            </a:extLst>
+          </p:cNvPr>
+          <p:cNvSpPr txBox="1"/>
+          <p:nvPr/>
+        </p:nvSpPr>
+        <p:spPr>
+          <a:xfrm>
+            <a:off x="9614516" y="226670"/>
+            <a:ext cx="2405849" cy="600164"/>
+          </a:xfrm>
+          <a:prstGeom prst="rect">
+            <a:avLst/>
+          </a:prstGeom>
+          <a:noFill/>
+        </p:spPr>
+        <p:txBody>
+          <a:bodyPr wrap="square" rtlCol="0">
+            <a:spAutoFit/>
+          </a:bodyPr>
+          <a:lstStyle/>
+          <a:p>
+            <a:r>
+              <a:rPr lang="de-DE" sz="1100" dirty="0"/>
+              <a:t>Spontane Ideen schnell aufschreiben</a:t>
+            </a:r>
+          </a:p>
+          <a:p>
+            <a:r>
+              <a:rPr lang="de-DE" sz="1100" dirty="0"/>
+              <a:t>Zunächst besprechen und abstimmen</a:t>
+            </a:r>
+          </a:p>
+          <a:p>
+            <a:r>
+              <a:rPr lang="de-DE" sz="1100" dirty="0"/>
+              <a:t>Anschließend Umsetzung ins Design</a:t>
+            </a:r>
+          </a:p>
+        </p:txBody>
+      </p:sp>
+    </p:spTree>
+    <p:extLst>
+      <p:ext uri="{BB962C8B-B14F-4D97-AF65-F5344CB8AC3E}">
+        <p14:creationId xmlns:p14="http://schemas.microsoft.com/office/powerpoint/2010/main" val="3309805435"/>
+      </p:ext>
+    </p:extLst>
+  </p:cSld>
+  <p:clrMapOvr>
+    <a:masterClrMapping/>
+  </p:clrMapOvr>
+</p:sld>
+</file>
+
 <file path=ppt/slides/slide2.xml><?xml version="1.0" encoding="utf-8"?>
 <p:sld xmlns:a="http://schemas.openxmlformats.org/drawingml/2006/main" xmlns:r="http://schemas.openxmlformats.org/officeDocument/2006/relationships" xmlns:p="http://schemas.openxmlformats.org/presentationml/2006/main">
   <p:cSld>
@@ -3626,6 +3800,12 @@
           <a:p>
             <a:r>
               <a:rPr lang="de-DE" dirty="0"/>
+              <a:t>Button spezifische Einstellungen</a:t>
+            </a:r>
+          </a:p>
+          <a:p>
+            <a:r>
+              <a:rPr lang="de-DE" dirty="0"/>
               <a:t>Motivationssprüche</a:t>
             </a:r>
           </a:p>
@@ -3763,6 +3943,16 @@
             </a:pPr>
             <a:r>
               <a:rPr lang="de-DE" dirty="0"/>
+              <a:t>Spezifische Einstellungen</a:t>
+            </a:r>
+          </a:p>
+          <a:p>
+            <a:pPr marL="1200150" lvl="2" indent="-285750">
+              <a:buFont typeface="Arial" panose="020B0604020202020204" pitchFamily="34" charset="0"/>
+              <a:buChar char="•"/>
+            </a:pPr>
+            <a:r>
+              <a:rPr lang="de-DE" dirty="0"/>
               <a:t>Prüfung 1</a:t>
             </a:r>
           </a:p>
@@ -3785,832 +3975,889 @@
           </a:p>
         </p:txBody>
       </p:sp>
-      <p:grpSp>
-        <p:nvGrpSpPr>
-          <p:cNvPr id="45" name="Gruppieren 44">
-            <a:extLst>
-              <a:ext uri="{FF2B5EF4-FFF2-40B4-BE49-F238E27FC236}">
-                <a16:creationId xmlns:a16="http://schemas.microsoft.com/office/drawing/2014/main" id="{5CC86D33-55B8-4E41-B6A8-7B98B4CD51E5}"/>
-              </a:ext>
-            </a:extLst>
-          </p:cNvPr>
-          <p:cNvGrpSpPr/>
+      <p:pic>
+        <p:nvPicPr>
+          <p:cNvPr id="32" name="Bildplatzhalter 5">
+            <a:extLst>
+              <a:ext uri="{FF2B5EF4-FFF2-40B4-BE49-F238E27FC236}">
+                <a16:creationId xmlns:a16="http://schemas.microsoft.com/office/drawing/2014/main" id="{145FB0E9-6E2B-4B3E-AB5B-E1A807A67EDD}"/>
+              </a:ext>
+            </a:extLst>
+          </p:cNvPr>
+          <p:cNvPicPr>
+            <a:picLocks noChangeAspect="1"/>
+          </p:cNvPicPr>
           <p:nvPr/>
-        </p:nvGrpSpPr>
-        <p:grpSpPr>
+        </p:nvPicPr>
+        <p:blipFill rotWithShape="1">
+          <a:blip r:embed="rId2">
+            <a:extLst>
+              <a:ext uri="{28A0092B-C50C-407E-A947-70E740481C1C}">
+                <a14:useLocalDpi xmlns:a14="http://schemas.microsoft.com/office/drawing/2010/main" val="0"/>
+              </a:ext>
+            </a:extLst>
+          </a:blip>
+          <a:srcRect l="32105" t="4630" r="31726" b="4139"/>
+          <a:stretch/>
+        </p:blipFill>
+        <p:spPr>
           <a:xfrm>
-            <a:off x="7699484" y="69574"/>
+            <a:off x="7665578" y="107245"/>
             <a:ext cx="3551583" cy="6718852"/>
-            <a:chOff x="2497169" y="1108332"/>
-            <a:chExt cx="3551583" cy="6718852"/>
           </a:xfrm>
-        </p:grpSpPr>
-        <p:pic>
-          <p:nvPicPr>
-            <p:cNvPr id="32" name="Bildplatzhalter 5">
-              <a:extLst>
-                <a:ext uri="{FF2B5EF4-FFF2-40B4-BE49-F238E27FC236}">
-                  <a16:creationId xmlns:a16="http://schemas.microsoft.com/office/drawing/2014/main" id="{145FB0E9-6E2B-4B3E-AB5B-E1A807A67EDD}"/>
-                </a:ext>
-              </a:extLst>
-            </p:cNvPr>
-            <p:cNvPicPr>
-              <a:picLocks noChangeAspect="1"/>
-            </p:cNvPicPr>
-            <p:nvPr/>
-          </p:nvPicPr>
-          <p:blipFill rotWithShape="1">
-            <a:blip r:embed="rId2">
-              <a:extLst>
-                <a:ext uri="{28A0092B-C50C-407E-A947-70E740481C1C}">
-                  <a14:useLocalDpi xmlns:a14="http://schemas.microsoft.com/office/drawing/2010/main" val="0"/>
-                </a:ext>
-              </a:extLst>
-            </a:blip>
-            <a:srcRect l="32105" t="4630" r="31726" b="4139"/>
-            <a:stretch/>
-          </p:blipFill>
-          <p:spPr>
-            <a:xfrm>
-              <a:off x="2497169" y="1108332"/>
-              <a:ext cx="3551583" cy="6718852"/>
-            </a:xfrm>
-            <a:prstGeom prst="rect">
-              <a:avLst/>
-            </a:prstGeom>
-          </p:spPr>
-        </p:pic>
-        <p:sp>
-          <p:nvSpPr>
-            <p:cNvPr id="7" name="Textfeld 6">
-              <a:extLst>
-                <a:ext uri="{FF2B5EF4-FFF2-40B4-BE49-F238E27FC236}">
-                  <a16:creationId xmlns:a16="http://schemas.microsoft.com/office/drawing/2014/main" id="{BBE16BAE-C80E-43A1-B01A-AAEDC86E5408}"/>
-                </a:ext>
-              </a:extLst>
-            </p:cNvPr>
-            <p:cNvSpPr txBox="1"/>
-            <p:nvPr/>
-          </p:nvSpPr>
-          <p:spPr>
-            <a:xfrm>
-              <a:off x="2805906" y="1524436"/>
-              <a:ext cx="1326750" cy="338554"/>
-            </a:xfrm>
-            <a:prstGeom prst="rect">
-              <a:avLst/>
-            </a:prstGeom>
-            <a:noFill/>
-          </p:spPr>
-          <p:txBody>
-            <a:bodyPr wrap="square" rtlCol="0">
-              <a:spAutoFit/>
-            </a:bodyPr>
-            <a:lstStyle/>
-            <a:p>
-              <a:r>
-                <a:rPr lang="de-DE" sz="1600" b="1" dirty="0" err="1"/>
-                <a:t>Examstracker</a:t>
-              </a:r>
-              <a:endParaRPr lang="de-DE" sz="1600" b="1" dirty="0"/>
-            </a:p>
-          </p:txBody>
-        </p:sp>
-        <p:sp>
-          <p:nvSpPr>
-            <p:cNvPr id="10" name="Textfeld 9">
-              <a:extLst>
-                <a:ext uri="{FF2B5EF4-FFF2-40B4-BE49-F238E27FC236}">
-                  <a16:creationId xmlns:a16="http://schemas.microsoft.com/office/drawing/2014/main" id="{7C5EFC70-CEBD-4715-A6E9-2BA21D6342A5}"/>
-                </a:ext>
-              </a:extLst>
-            </p:cNvPr>
-            <p:cNvSpPr txBox="1"/>
-            <p:nvPr/>
-          </p:nvSpPr>
-          <p:spPr>
-            <a:xfrm>
-              <a:off x="3994003" y="1524436"/>
-              <a:ext cx="1210418" cy="338554"/>
-            </a:xfrm>
-            <a:prstGeom prst="rect">
-              <a:avLst/>
-            </a:prstGeom>
-            <a:noFill/>
-          </p:spPr>
-          <p:txBody>
-            <a:bodyPr wrap="square" rtlCol="0">
-              <a:spAutoFit/>
-            </a:bodyPr>
-            <a:lstStyle/>
-            <a:p>
-              <a:r>
-                <a:rPr lang="de-DE" sz="1600" dirty="0"/>
-                <a:t>Fr., 15.01.21</a:t>
-              </a:r>
-            </a:p>
-          </p:txBody>
-        </p:sp>
-        <p:sp>
-          <p:nvSpPr>
-            <p:cNvPr id="15" name="Textfeld 14">
-              <a:extLst>
-                <a:ext uri="{FF2B5EF4-FFF2-40B4-BE49-F238E27FC236}">
-                  <a16:creationId xmlns:a16="http://schemas.microsoft.com/office/drawing/2014/main" id="{E8195513-EC03-4BBB-85BB-E3B68E8E1670}"/>
-                </a:ext>
-              </a:extLst>
-            </p:cNvPr>
-            <p:cNvSpPr txBox="1"/>
-            <p:nvPr/>
-          </p:nvSpPr>
-          <p:spPr>
-            <a:xfrm>
-              <a:off x="3366032" y="2614048"/>
-              <a:ext cx="992904" cy="338554"/>
-            </a:xfrm>
-            <a:prstGeom prst="rect">
-              <a:avLst/>
-            </a:prstGeom>
-            <a:noFill/>
-          </p:spPr>
-          <p:txBody>
-            <a:bodyPr wrap="square" rtlCol="0">
-              <a:spAutoFit/>
-            </a:bodyPr>
-            <a:lstStyle/>
-            <a:p>
-              <a:r>
-                <a:rPr lang="de-DE" sz="1600" dirty="0"/>
-                <a:t>Prüfung 1</a:t>
-              </a:r>
-            </a:p>
-          </p:txBody>
-        </p:sp>
-        <p:sp>
-          <p:nvSpPr>
-            <p:cNvPr id="16" name="Textfeld 15">
-              <a:extLst>
-                <a:ext uri="{FF2B5EF4-FFF2-40B4-BE49-F238E27FC236}">
-                  <a16:creationId xmlns:a16="http://schemas.microsoft.com/office/drawing/2014/main" id="{843C554E-E64A-498F-BB18-DD1E4017BE79}"/>
-                </a:ext>
-              </a:extLst>
-            </p:cNvPr>
-            <p:cNvSpPr txBox="1"/>
-            <p:nvPr/>
-          </p:nvSpPr>
-          <p:spPr>
-            <a:xfrm>
-              <a:off x="3360062" y="3132969"/>
-              <a:ext cx="998874" cy="338554"/>
-            </a:xfrm>
-            <a:prstGeom prst="rect">
-              <a:avLst/>
-            </a:prstGeom>
-            <a:noFill/>
-          </p:spPr>
-          <p:txBody>
-            <a:bodyPr wrap="square" rtlCol="0">
-              <a:spAutoFit/>
-            </a:bodyPr>
-            <a:lstStyle/>
-            <a:p>
-              <a:r>
-                <a:rPr lang="de-DE" sz="1600" dirty="0"/>
-                <a:t>Prüfung 2</a:t>
-              </a:r>
-            </a:p>
-          </p:txBody>
-        </p:sp>
-        <p:pic>
-          <p:nvPicPr>
-            <p:cNvPr id="17" name="Grafik 16" descr="Bücher">
-              <a:extLst>
-                <a:ext uri="{FF2B5EF4-FFF2-40B4-BE49-F238E27FC236}">
-                  <a16:creationId xmlns:a16="http://schemas.microsoft.com/office/drawing/2014/main" id="{1F84D36E-7285-4303-93C2-835AD1DB5AAA}"/>
-                </a:ext>
-              </a:extLst>
-            </p:cNvPr>
-            <p:cNvPicPr>
-              <a:picLocks noChangeAspect="1"/>
-            </p:cNvPicPr>
-            <p:nvPr/>
-          </p:nvPicPr>
-          <p:blipFill>
-            <a:blip r:embed="rId3">
-              <a:extLst>
-                <a:ext uri="{28A0092B-C50C-407E-A947-70E740481C1C}">
-                  <a14:useLocalDpi xmlns:a14="http://schemas.microsoft.com/office/drawing/2010/main" val="0"/>
-                </a:ext>
-                <a:ext uri="{96DAC541-7B7A-43D3-8B79-37D633B846F1}">
-                  <asvg:svgBlip xmlns:asvg="http://schemas.microsoft.com/office/drawing/2016/SVG/main" r:embed="rId4"/>
-                </a:ext>
-              </a:extLst>
-            </a:blip>
-            <a:stretch>
-              <a:fillRect/>
-            </a:stretch>
-          </p:blipFill>
-          <p:spPr>
-            <a:xfrm>
-              <a:off x="4579682" y="2152510"/>
-              <a:ext cx="270441" cy="270441"/>
-            </a:xfrm>
-            <a:prstGeom prst="rect">
-              <a:avLst/>
-            </a:prstGeom>
-          </p:spPr>
-        </p:pic>
-        <p:pic>
-          <p:nvPicPr>
-            <p:cNvPr id="18" name="Grafik 17" descr="Videokamera">
-              <a:extLst>
-                <a:ext uri="{FF2B5EF4-FFF2-40B4-BE49-F238E27FC236}">
-                  <a16:creationId xmlns:a16="http://schemas.microsoft.com/office/drawing/2014/main" id="{BFE638E9-2665-4536-9E74-1EE3493EFB07}"/>
-                </a:ext>
-              </a:extLst>
-            </p:cNvPr>
-            <p:cNvPicPr>
-              <a:picLocks noChangeAspect="1"/>
-            </p:cNvPicPr>
-            <p:nvPr/>
-          </p:nvPicPr>
-          <p:blipFill>
-            <a:blip r:embed="rId5">
-              <a:extLst>
-                <a:ext uri="{28A0092B-C50C-407E-A947-70E740481C1C}">
-                  <a14:useLocalDpi xmlns:a14="http://schemas.microsoft.com/office/drawing/2010/main" val="0"/>
-                </a:ext>
-                <a:ext uri="{96DAC541-7B7A-43D3-8B79-37D633B846F1}">
-                  <asvg:svgBlip xmlns:asvg="http://schemas.microsoft.com/office/drawing/2016/SVG/main" r:embed="rId6"/>
-                </a:ext>
-              </a:extLst>
-            </a:blip>
-            <a:stretch>
-              <a:fillRect/>
-            </a:stretch>
-          </p:blipFill>
-          <p:spPr>
-            <a:xfrm>
-              <a:off x="4916236" y="2096950"/>
-              <a:ext cx="364288" cy="364288"/>
-            </a:xfrm>
-            <a:prstGeom prst="rect">
-              <a:avLst/>
-            </a:prstGeom>
-          </p:spPr>
-        </p:pic>
-        <p:pic>
-          <p:nvPicPr>
-            <p:cNvPr id="23" name="Grafik 22" descr="Zahnrad">
-              <a:extLst>
-                <a:ext uri="{FF2B5EF4-FFF2-40B4-BE49-F238E27FC236}">
-                  <a16:creationId xmlns:a16="http://schemas.microsoft.com/office/drawing/2014/main" id="{69B1D54A-69EB-4FD5-81C3-6947EEDC3BBF}"/>
-                </a:ext>
-              </a:extLst>
-            </p:cNvPr>
-            <p:cNvPicPr>
-              <a:picLocks noChangeAspect="1"/>
-            </p:cNvPicPr>
-            <p:nvPr/>
-          </p:nvPicPr>
-          <p:blipFill>
-            <a:blip r:embed="rId7">
-              <a:extLst>
-                <a:ext uri="{28A0092B-C50C-407E-A947-70E740481C1C}">
-                  <a14:useLocalDpi xmlns:a14="http://schemas.microsoft.com/office/drawing/2010/main" val="0"/>
-                </a:ext>
-                <a:ext uri="{96DAC541-7B7A-43D3-8B79-37D633B846F1}">
-                  <asvg:svgBlip xmlns:asvg="http://schemas.microsoft.com/office/drawing/2016/SVG/main" r:embed="rId8"/>
-                </a:ext>
-              </a:extLst>
-            </a:blip>
-            <a:stretch>
-              <a:fillRect/>
-            </a:stretch>
-          </p:blipFill>
-          <p:spPr>
-            <a:xfrm>
-              <a:off x="5158005" y="1424532"/>
-              <a:ext cx="438458" cy="438458"/>
-            </a:xfrm>
-            <a:prstGeom prst="rect">
-              <a:avLst/>
-            </a:prstGeom>
-          </p:spPr>
-        </p:pic>
-        <p:sp>
-          <p:nvSpPr>
-            <p:cNvPr id="24" name="Rechteck: abgerundete Ecken 23">
-              <a:extLst>
-                <a:ext uri="{FF2B5EF4-FFF2-40B4-BE49-F238E27FC236}">
-                  <a16:creationId xmlns:a16="http://schemas.microsoft.com/office/drawing/2014/main" id="{96EF937E-EB20-43FC-A05B-FB26C8594883}"/>
-                </a:ext>
-              </a:extLst>
-            </p:cNvPr>
-            <p:cNvSpPr/>
-            <p:nvPr/>
-          </p:nvSpPr>
-          <p:spPr>
-            <a:xfrm>
-              <a:off x="3360062" y="6558183"/>
-              <a:ext cx="1957669" cy="336790"/>
-            </a:xfrm>
-            <a:prstGeom prst="roundRect">
-              <a:avLst/>
-            </a:prstGeom>
-          </p:spPr>
-          <p:style>
-            <a:lnRef idx="2">
-              <a:schemeClr val="accent1">
-                <a:shade val="50000"/>
-              </a:schemeClr>
-            </a:lnRef>
-            <a:fillRef idx="1">
-              <a:schemeClr val="accent1"/>
-            </a:fillRef>
-            <a:effectRef idx="0">
-              <a:schemeClr val="accent1"/>
-            </a:effectRef>
-            <a:fontRef idx="minor">
-              <a:schemeClr val="lt1"/>
-            </a:fontRef>
-          </p:style>
-          <p:txBody>
-            <a:bodyPr rtlCol="0" anchor="ctr"/>
-            <a:lstStyle/>
-            <a:p>
-              <a:pPr algn="ctr"/>
-              <a:endParaRPr lang="de-DE"/>
-            </a:p>
-          </p:txBody>
-        </p:sp>
-        <p:sp>
-          <p:nvSpPr>
-            <p:cNvPr id="25" name="Textfeld 24">
-              <a:extLst>
-                <a:ext uri="{FF2B5EF4-FFF2-40B4-BE49-F238E27FC236}">
-                  <a16:creationId xmlns:a16="http://schemas.microsoft.com/office/drawing/2014/main" id="{47BC3FEE-C79A-45BE-B867-A133142D89C3}"/>
-                </a:ext>
-              </a:extLst>
-            </p:cNvPr>
-            <p:cNvSpPr txBox="1"/>
-            <p:nvPr/>
-          </p:nvSpPr>
-          <p:spPr>
-            <a:xfrm>
-              <a:off x="3320428" y="6525641"/>
-              <a:ext cx="2036936" cy="369332"/>
-            </a:xfrm>
-            <a:prstGeom prst="rect">
-              <a:avLst/>
-            </a:prstGeom>
-            <a:noFill/>
-          </p:spPr>
-          <p:txBody>
-            <a:bodyPr wrap="square" rtlCol="0">
-              <a:spAutoFit/>
-            </a:bodyPr>
-            <a:lstStyle/>
-            <a:p>
-              <a:r>
-                <a:rPr lang="de-DE" dirty="0"/>
-                <a:t>Prüfung hinzufügen</a:t>
-              </a:r>
-            </a:p>
-          </p:txBody>
-        </p:sp>
-        <p:pic>
-          <p:nvPicPr>
-            <p:cNvPr id="26" name="Grafik 25" descr="Liste">
-              <a:extLst>
-                <a:ext uri="{FF2B5EF4-FFF2-40B4-BE49-F238E27FC236}">
-                  <a16:creationId xmlns:a16="http://schemas.microsoft.com/office/drawing/2014/main" id="{D25F34EA-812E-4323-9A9A-1C83BD80A7A7}"/>
-                </a:ext>
-              </a:extLst>
-            </p:cNvPr>
-            <p:cNvPicPr>
-              <a:picLocks noChangeAspect="1"/>
-            </p:cNvPicPr>
-            <p:nvPr/>
-          </p:nvPicPr>
-          <p:blipFill>
-            <a:blip r:embed="rId9">
-              <a:extLst>
-                <a:ext uri="{28A0092B-C50C-407E-A947-70E740481C1C}">
-                  <a14:useLocalDpi xmlns:a14="http://schemas.microsoft.com/office/drawing/2010/main" val="0"/>
-                </a:ext>
-                <a:ext uri="{96DAC541-7B7A-43D3-8B79-37D633B846F1}">
-                  <asvg:svgBlip xmlns:asvg="http://schemas.microsoft.com/office/drawing/2016/SVG/main" r:embed="rId10"/>
-                </a:ext>
-              </a:extLst>
-            </a:blip>
-            <a:stretch>
-              <a:fillRect/>
-            </a:stretch>
-          </p:blipFill>
-          <p:spPr>
-            <a:xfrm>
-              <a:off x="5316047" y="2134317"/>
-              <a:ext cx="332462" cy="306826"/>
-            </a:xfrm>
-            <a:prstGeom prst="rect">
-              <a:avLst/>
-            </a:prstGeom>
-          </p:spPr>
-        </p:pic>
-        <p:sp>
-          <p:nvSpPr>
-            <p:cNvPr id="33" name="Ellipse 32">
-              <a:extLst>
-                <a:ext uri="{FF2B5EF4-FFF2-40B4-BE49-F238E27FC236}">
-                  <a16:creationId xmlns:a16="http://schemas.microsoft.com/office/drawing/2014/main" id="{07808052-FA38-4325-9036-A1E2BD863D6E}"/>
-                </a:ext>
-              </a:extLst>
-            </p:cNvPr>
-            <p:cNvSpPr/>
-            <p:nvPr/>
-          </p:nvSpPr>
-          <p:spPr>
-            <a:xfrm>
-              <a:off x="2944770" y="2628602"/>
-              <a:ext cx="324000" cy="324000"/>
-            </a:xfrm>
-            <a:prstGeom prst="ellipse">
-              <a:avLst/>
-            </a:prstGeom>
+          <a:prstGeom prst="rect">
+            <a:avLst/>
+          </a:prstGeom>
+        </p:spPr>
+      </p:pic>
+      <p:sp>
+        <p:nvSpPr>
+          <p:cNvPr id="7" name="Textfeld 6">
+            <a:extLst>
+              <a:ext uri="{FF2B5EF4-FFF2-40B4-BE49-F238E27FC236}">
+                <a16:creationId xmlns:a16="http://schemas.microsoft.com/office/drawing/2014/main" id="{BBE16BAE-C80E-43A1-B01A-AAEDC86E5408}"/>
+              </a:ext>
+            </a:extLst>
+          </p:cNvPr>
+          <p:cNvSpPr txBox="1"/>
+          <p:nvPr/>
+        </p:nvSpPr>
+        <p:spPr>
+          <a:xfrm>
+            <a:off x="8008221" y="485678"/>
+            <a:ext cx="1326750" cy="338554"/>
+          </a:xfrm>
+          <a:prstGeom prst="rect">
+            <a:avLst/>
+          </a:prstGeom>
+          <a:noFill/>
+        </p:spPr>
+        <p:txBody>
+          <a:bodyPr wrap="square" rtlCol="0">
+            <a:spAutoFit/>
+          </a:bodyPr>
+          <a:lstStyle/>
+          <a:p>
+            <a:r>
+              <a:rPr lang="de-DE" sz="1600" b="1" dirty="0" err="1"/>
+              <a:t>Examstracker</a:t>
+            </a:r>
+            <a:endParaRPr lang="de-DE" sz="1600" b="1" dirty="0"/>
+          </a:p>
+        </p:txBody>
+      </p:sp>
+      <p:sp>
+        <p:nvSpPr>
+          <p:cNvPr id="10" name="Textfeld 9">
+            <a:extLst>
+              <a:ext uri="{FF2B5EF4-FFF2-40B4-BE49-F238E27FC236}">
+                <a16:creationId xmlns:a16="http://schemas.microsoft.com/office/drawing/2014/main" id="{7C5EFC70-CEBD-4715-A6E9-2BA21D6342A5}"/>
+              </a:ext>
+            </a:extLst>
+          </p:cNvPr>
+          <p:cNvSpPr txBox="1"/>
+          <p:nvPr/>
+        </p:nvSpPr>
+        <p:spPr>
+          <a:xfrm>
+            <a:off x="9196318" y="485678"/>
+            <a:ext cx="1210418" cy="338554"/>
+          </a:xfrm>
+          <a:prstGeom prst="rect">
+            <a:avLst/>
+          </a:prstGeom>
+          <a:noFill/>
+        </p:spPr>
+        <p:txBody>
+          <a:bodyPr wrap="square" rtlCol="0">
+            <a:spAutoFit/>
+          </a:bodyPr>
+          <a:lstStyle/>
+          <a:p>
+            <a:r>
+              <a:rPr lang="de-DE" sz="1600" dirty="0"/>
+              <a:t>Fr., 15.01.21</a:t>
+            </a:r>
+          </a:p>
+        </p:txBody>
+      </p:sp>
+      <p:sp>
+        <p:nvSpPr>
+          <p:cNvPr id="15" name="Textfeld 14">
+            <a:extLst>
+              <a:ext uri="{FF2B5EF4-FFF2-40B4-BE49-F238E27FC236}">
+                <a16:creationId xmlns:a16="http://schemas.microsoft.com/office/drawing/2014/main" id="{E8195513-EC03-4BBB-85BB-E3B68E8E1670}"/>
+              </a:ext>
+            </a:extLst>
+          </p:cNvPr>
+          <p:cNvSpPr txBox="1"/>
+          <p:nvPr/>
+        </p:nvSpPr>
+        <p:spPr>
+          <a:xfrm>
+            <a:off x="8484975" y="1585182"/>
+            <a:ext cx="992904" cy="338554"/>
+          </a:xfrm>
+          <a:prstGeom prst="rect">
+            <a:avLst/>
+          </a:prstGeom>
+          <a:noFill/>
+        </p:spPr>
+        <p:txBody>
+          <a:bodyPr wrap="square" rtlCol="0">
+            <a:spAutoFit/>
+          </a:bodyPr>
+          <a:lstStyle/>
+          <a:p>
+            <a:r>
+              <a:rPr lang="de-DE" sz="1600" dirty="0"/>
+              <a:t>Prüfung 1</a:t>
+            </a:r>
+          </a:p>
+        </p:txBody>
+      </p:sp>
+      <p:sp>
+        <p:nvSpPr>
+          <p:cNvPr id="16" name="Textfeld 15">
+            <a:extLst>
+              <a:ext uri="{FF2B5EF4-FFF2-40B4-BE49-F238E27FC236}">
+                <a16:creationId xmlns:a16="http://schemas.microsoft.com/office/drawing/2014/main" id="{843C554E-E64A-498F-BB18-DD1E4017BE79}"/>
+              </a:ext>
+            </a:extLst>
+          </p:cNvPr>
+          <p:cNvSpPr txBox="1"/>
+          <p:nvPr/>
+        </p:nvSpPr>
+        <p:spPr>
+          <a:xfrm>
+            <a:off x="8484975" y="2099334"/>
+            <a:ext cx="998874" cy="338554"/>
+          </a:xfrm>
+          <a:prstGeom prst="rect">
+            <a:avLst/>
+          </a:prstGeom>
+          <a:noFill/>
+        </p:spPr>
+        <p:txBody>
+          <a:bodyPr wrap="square" rtlCol="0">
+            <a:spAutoFit/>
+          </a:bodyPr>
+          <a:lstStyle/>
+          <a:p>
+            <a:r>
+              <a:rPr lang="de-DE" sz="1600" dirty="0"/>
+              <a:t>Prüfung 2</a:t>
+            </a:r>
+          </a:p>
+        </p:txBody>
+      </p:sp>
+      <p:pic>
+        <p:nvPicPr>
+          <p:cNvPr id="17" name="Grafik 16" descr="Bücher">
+            <a:extLst>
+              <a:ext uri="{FF2B5EF4-FFF2-40B4-BE49-F238E27FC236}">
+                <a16:creationId xmlns:a16="http://schemas.microsoft.com/office/drawing/2014/main" id="{1F84D36E-7285-4303-93C2-835AD1DB5AAA}"/>
+              </a:ext>
+            </a:extLst>
+          </p:cNvPr>
+          <p:cNvPicPr>
+            <a:picLocks noChangeAspect="1"/>
+          </p:cNvPicPr>
+          <p:nvPr/>
+        </p:nvPicPr>
+        <p:blipFill>
+          <a:blip r:embed="rId3">
+            <a:extLst>
+              <a:ext uri="{28A0092B-C50C-407E-A947-70E740481C1C}">
+                <a14:useLocalDpi xmlns:a14="http://schemas.microsoft.com/office/drawing/2010/main" val="0"/>
+              </a:ext>
+              <a:ext uri="{96DAC541-7B7A-43D3-8B79-37D633B846F1}">
+                <asvg:svgBlip xmlns:asvg="http://schemas.microsoft.com/office/drawing/2016/SVG/main" r:embed="rId4"/>
+              </a:ext>
+            </a:extLst>
+          </a:blip>
+          <a:stretch>
+            <a:fillRect/>
+          </a:stretch>
+        </p:blipFill>
+        <p:spPr>
+          <a:xfrm>
+            <a:off x="9523292" y="1122327"/>
+            <a:ext cx="270441" cy="270441"/>
+          </a:xfrm>
+          <a:prstGeom prst="rect">
+            <a:avLst/>
+          </a:prstGeom>
+        </p:spPr>
+      </p:pic>
+      <p:pic>
+        <p:nvPicPr>
+          <p:cNvPr id="18" name="Grafik 17" descr="Videokamera">
+            <a:extLst>
+              <a:ext uri="{FF2B5EF4-FFF2-40B4-BE49-F238E27FC236}">
+                <a16:creationId xmlns:a16="http://schemas.microsoft.com/office/drawing/2014/main" id="{BFE638E9-2665-4536-9E74-1EE3493EFB07}"/>
+              </a:ext>
+            </a:extLst>
+          </p:cNvPr>
+          <p:cNvPicPr>
+            <a:picLocks noChangeAspect="1"/>
+          </p:cNvPicPr>
+          <p:nvPr/>
+        </p:nvPicPr>
+        <p:blipFill>
+          <a:blip r:embed="rId5">
+            <a:extLst>
+              <a:ext uri="{28A0092B-C50C-407E-A947-70E740481C1C}">
+                <a14:useLocalDpi xmlns:a14="http://schemas.microsoft.com/office/drawing/2010/main" val="0"/>
+              </a:ext>
+              <a:ext uri="{96DAC541-7B7A-43D3-8B79-37D633B846F1}">
+                <asvg:svgBlip xmlns:asvg="http://schemas.microsoft.com/office/drawing/2016/SVG/main" r:embed="rId6"/>
+              </a:ext>
+            </a:extLst>
+          </a:blip>
+          <a:stretch>
+            <a:fillRect/>
+          </a:stretch>
+        </p:blipFill>
+        <p:spPr>
+          <a:xfrm>
+            <a:off x="9859846" y="1066767"/>
+            <a:ext cx="364288" cy="364288"/>
+          </a:xfrm>
+          <a:prstGeom prst="rect">
+            <a:avLst/>
+          </a:prstGeom>
+        </p:spPr>
+      </p:pic>
+      <p:pic>
+        <p:nvPicPr>
+          <p:cNvPr id="23" name="Grafik 22" descr="Zahnrad">
+            <a:extLst>
+              <a:ext uri="{FF2B5EF4-FFF2-40B4-BE49-F238E27FC236}">
+                <a16:creationId xmlns:a16="http://schemas.microsoft.com/office/drawing/2014/main" id="{69B1D54A-69EB-4FD5-81C3-6947EEDC3BBF}"/>
+              </a:ext>
+            </a:extLst>
+          </p:cNvPr>
+          <p:cNvPicPr>
+            <a:picLocks noChangeAspect="1"/>
+          </p:cNvPicPr>
+          <p:nvPr/>
+        </p:nvPicPr>
+        <p:blipFill>
+          <a:blip r:embed="rId7">
+            <a:extLst>
+              <a:ext uri="{28A0092B-C50C-407E-A947-70E740481C1C}">
+                <a14:useLocalDpi xmlns:a14="http://schemas.microsoft.com/office/drawing/2010/main" val="0"/>
+              </a:ext>
+              <a:ext uri="{96DAC541-7B7A-43D3-8B79-37D633B846F1}">
+                <asvg:svgBlip xmlns:asvg="http://schemas.microsoft.com/office/drawing/2016/SVG/main" r:embed="rId8"/>
+              </a:ext>
+            </a:extLst>
+          </a:blip>
+          <a:stretch>
+            <a:fillRect/>
+          </a:stretch>
+        </p:blipFill>
+        <p:spPr>
+          <a:xfrm>
+            <a:off x="10360320" y="385774"/>
+            <a:ext cx="438458" cy="438458"/>
+          </a:xfrm>
+          <a:prstGeom prst="rect">
+            <a:avLst/>
+          </a:prstGeom>
+        </p:spPr>
+      </p:pic>
+      <p:sp>
+        <p:nvSpPr>
+          <p:cNvPr id="24" name="Rechteck: abgerundete Ecken 23">
+            <a:extLst>
+              <a:ext uri="{FF2B5EF4-FFF2-40B4-BE49-F238E27FC236}">
+                <a16:creationId xmlns:a16="http://schemas.microsoft.com/office/drawing/2014/main" id="{96EF937E-EB20-43FC-A05B-FB26C8594883}"/>
+              </a:ext>
+            </a:extLst>
+          </p:cNvPr>
+          <p:cNvSpPr/>
+          <p:nvPr/>
+        </p:nvSpPr>
+        <p:spPr>
+          <a:xfrm>
+            <a:off x="8562377" y="5519425"/>
+            <a:ext cx="1957669" cy="336790"/>
+          </a:xfrm>
+          <a:prstGeom prst="roundRect">
+            <a:avLst/>
+          </a:prstGeom>
+        </p:spPr>
+        <p:style>
+          <a:lnRef idx="2">
+            <a:schemeClr val="accent1">
+              <a:shade val="50000"/>
+            </a:schemeClr>
+          </a:lnRef>
+          <a:fillRef idx="1">
+            <a:schemeClr val="accent1"/>
+          </a:fillRef>
+          <a:effectRef idx="0">
+            <a:schemeClr val="accent1"/>
+          </a:effectRef>
+          <a:fontRef idx="minor">
+            <a:schemeClr val="lt1"/>
+          </a:fontRef>
+        </p:style>
+        <p:txBody>
+          <a:bodyPr rtlCol="0" anchor="ctr"/>
+          <a:lstStyle/>
+          <a:p>
+            <a:pPr algn="ctr"/>
+            <a:endParaRPr lang="de-DE"/>
+          </a:p>
+        </p:txBody>
+      </p:sp>
+      <p:sp>
+        <p:nvSpPr>
+          <p:cNvPr id="25" name="Textfeld 24">
+            <a:extLst>
+              <a:ext uri="{FF2B5EF4-FFF2-40B4-BE49-F238E27FC236}">
+                <a16:creationId xmlns:a16="http://schemas.microsoft.com/office/drawing/2014/main" id="{47BC3FEE-C79A-45BE-B867-A133142D89C3}"/>
+              </a:ext>
+            </a:extLst>
+          </p:cNvPr>
+          <p:cNvSpPr txBox="1"/>
+          <p:nvPr/>
+        </p:nvSpPr>
+        <p:spPr>
+          <a:xfrm>
+            <a:off x="8522743" y="5486883"/>
+            <a:ext cx="2036936" cy="369332"/>
+          </a:xfrm>
+          <a:prstGeom prst="rect">
+            <a:avLst/>
+          </a:prstGeom>
+          <a:noFill/>
+        </p:spPr>
+        <p:txBody>
+          <a:bodyPr wrap="square" rtlCol="0">
+            <a:spAutoFit/>
+          </a:bodyPr>
+          <a:lstStyle/>
+          <a:p>
+            <a:r>
+              <a:rPr lang="de-DE" dirty="0"/>
+              <a:t>Prüfung hinzufügen</a:t>
+            </a:r>
+          </a:p>
+        </p:txBody>
+      </p:sp>
+      <p:pic>
+        <p:nvPicPr>
+          <p:cNvPr id="26" name="Grafik 25" descr="Liste">
+            <a:extLst>
+              <a:ext uri="{FF2B5EF4-FFF2-40B4-BE49-F238E27FC236}">
+                <a16:creationId xmlns:a16="http://schemas.microsoft.com/office/drawing/2014/main" id="{D25F34EA-812E-4323-9A9A-1C83BD80A7A7}"/>
+              </a:ext>
+            </a:extLst>
+          </p:cNvPr>
+          <p:cNvPicPr>
+            <a:picLocks noChangeAspect="1"/>
+          </p:cNvPicPr>
+          <p:nvPr/>
+        </p:nvPicPr>
+        <p:blipFill>
+          <a:blip r:embed="rId9">
+            <a:extLst>
+              <a:ext uri="{28A0092B-C50C-407E-A947-70E740481C1C}">
+                <a14:useLocalDpi xmlns:a14="http://schemas.microsoft.com/office/drawing/2010/main" val="0"/>
+              </a:ext>
+              <a:ext uri="{96DAC541-7B7A-43D3-8B79-37D633B846F1}">
+                <asvg:svgBlip xmlns:asvg="http://schemas.microsoft.com/office/drawing/2016/SVG/main" r:embed="rId10"/>
+              </a:ext>
+            </a:extLst>
+          </a:blip>
+          <a:stretch>
+            <a:fillRect/>
+          </a:stretch>
+        </p:blipFill>
+        <p:spPr>
+          <a:xfrm>
+            <a:off x="10259657" y="1104134"/>
+            <a:ext cx="332462" cy="306826"/>
+          </a:xfrm>
+          <a:prstGeom prst="rect">
+            <a:avLst/>
+          </a:prstGeom>
+        </p:spPr>
+      </p:pic>
+      <p:sp>
+        <p:nvSpPr>
+          <p:cNvPr id="33" name="Ellipse 32">
+            <a:extLst>
+              <a:ext uri="{FF2B5EF4-FFF2-40B4-BE49-F238E27FC236}">
+                <a16:creationId xmlns:a16="http://schemas.microsoft.com/office/drawing/2014/main" id="{07808052-FA38-4325-9036-A1E2BD863D6E}"/>
+              </a:ext>
+            </a:extLst>
+          </p:cNvPr>
+          <p:cNvSpPr/>
+          <p:nvPr/>
+        </p:nvSpPr>
+        <p:spPr>
+          <a:xfrm>
+            <a:off x="8147085" y="1589844"/>
+            <a:ext cx="324000" cy="324000"/>
+          </a:xfrm>
+          <a:prstGeom prst="ellipse">
+            <a:avLst/>
+          </a:prstGeom>
+          <a:solidFill>
+            <a:schemeClr val="bg2">
+              <a:lumMod val="90000"/>
+            </a:schemeClr>
+          </a:solidFill>
+          <a:ln>
             <a:solidFill>
-              <a:schemeClr val="bg2">
-                <a:lumMod val="90000"/>
-              </a:schemeClr>
+              <a:schemeClr val="bg1"/>
             </a:solidFill>
-            <a:ln>
-              <a:solidFill>
-                <a:schemeClr val="bg1"/>
-              </a:solidFill>
-            </a:ln>
-          </p:spPr>
-          <p:style>
-            <a:lnRef idx="2">
-              <a:schemeClr val="accent1">
-                <a:shade val="50000"/>
-              </a:schemeClr>
-            </a:lnRef>
-            <a:fillRef idx="1">
-              <a:schemeClr val="accent1"/>
-            </a:fillRef>
-            <a:effectRef idx="0">
-              <a:schemeClr val="accent1"/>
-            </a:effectRef>
-            <a:fontRef idx="minor">
-              <a:schemeClr val="lt1"/>
-            </a:fontRef>
-          </p:style>
-          <p:txBody>
-            <a:bodyPr rtlCol="0" anchor="ctr"/>
-            <a:lstStyle/>
-            <a:p>
-              <a:pPr algn="ctr"/>
-              <a:endParaRPr lang="de-DE"/>
-            </a:p>
-          </p:txBody>
-        </p:sp>
-        <p:sp>
-          <p:nvSpPr>
-            <p:cNvPr id="34" name="Ellipse 33">
-              <a:extLst>
-                <a:ext uri="{FF2B5EF4-FFF2-40B4-BE49-F238E27FC236}">
-                  <a16:creationId xmlns:a16="http://schemas.microsoft.com/office/drawing/2014/main" id="{2002BFD4-2F89-49DF-B1DD-E7D385538FEE}"/>
-                </a:ext>
-              </a:extLst>
-            </p:cNvPr>
-            <p:cNvSpPr/>
-            <p:nvPr/>
-          </p:nvSpPr>
-          <p:spPr>
-            <a:xfrm>
-              <a:off x="2949940" y="3143294"/>
-              <a:ext cx="324000" cy="324000"/>
-            </a:xfrm>
-            <a:prstGeom prst="ellipse">
-              <a:avLst/>
-            </a:prstGeom>
+          </a:ln>
+        </p:spPr>
+        <p:style>
+          <a:lnRef idx="2">
+            <a:schemeClr val="accent1">
+              <a:shade val="50000"/>
+            </a:schemeClr>
+          </a:lnRef>
+          <a:fillRef idx="1">
+            <a:schemeClr val="accent1"/>
+          </a:fillRef>
+          <a:effectRef idx="0">
+            <a:schemeClr val="accent1"/>
+          </a:effectRef>
+          <a:fontRef idx="minor">
+            <a:schemeClr val="lt1"/>
+          </a:fontRef>
+        </p:style>
+        <p:txBody>
+          <a:bodyPr rtlCol="0" anchor="ctr"/>
+          <a:lstStyle/>
+          <a:p>
+            <a:pPr algn="ctr"/>
+            <a:endParaRPr lang="de-DE"/>
+          </a:p>
+        </p:txBody>
+      </p:sp>
+      <p:sp>
+        <p:nvSpPr>
+          <p:cNvPr id="34" name="Ellipse 33">
+            <a:extLst>
+              <a:ext uri="{FF2B5EF4-FFF2-40B4-BE49-F238E27FC236}">
+                <a16:creationId xmlns:a16="http://schemas.microsoft.com/office/drawing/2014/main" id="{2002BFD4-2F89-49DF-B1DD-E7D385538FEE}"/>
+              </a:ext>
+            </a:extLst>
+          </p:cNvPr>
+          <p:cNvSpPr/>
+          <p:nvPr/>
+        </p:nvSpPr>
+        <p:spPr>
+          <a:xfrm>
+            <a:off x="8152255" y="2104536"/>
+            <a:ext cx="324000" cy="324000"/>
+          </a:xfrm>
+          <a:prstGeom prst="ellipse">
+            <a:avLst/>
+          </a:prstGeom>
+          <a:solidFill>
+            <a:schemeClr val="bg2">
+              <a:lumMod val="90000"/>
+            </a:schemeClr>
+          </a:solidFill>
+          <a:ln>
             <a:solidFill>
-              <a:schemeClr val="bg2">
-                <a:lumMod val="90000"/>
-              </a:schemeClr>
+              <a:schemeClr val="bg1"/>
             </a:solidFill>
-            <a:ln>
-              <a:solidFill>
-                <a:schemeClr val="bg1"/>
-              </a:solidFill>
-            </a:ln>
-          </p:spPr>
-          <p:style>
-            <a:lnRef idx="2">
-              <a:schemeClr val="accent1">
-                <a:shade val="50000"/>
-              </a:schemeClr>
-            </a:lnRef>
-            <a:fillRef idx="1">
-              <a:schemeClr val="accent1"/>
-            </a:fillRef>
-            <a:effectRef idx="0">
-              <a:schemeClr val="accent1"/>
-            </a:effectRef>
-            <a:fontRef idx="minor">
-              <a:schemeClr val="lt1"/>
-            </a:fontRef>
-          </p:style>
-          <p:txBody>
-            <a:bodyPr rtlCol="0" anchor="ctr"/>
-            <a:lstStyle/>
-            <a:p>
-              <a:pPr algn="ctr"/>
-              <a:endParaRPr lang="de-DE"/>
-            </a:p>
-          </p:txBody>
-        </p:sp>
-        <p:sp>
-          <p:nvSpPr>
-            <p:cNvPr id="35" name="Textfeld 34">
-              <a:extLst>
-                <a:ext uri="{FF2B5EF4-FFF2-40B4-BE49-F238E27FC236}">
-                  <a16:creationId xmlns:a16="http://schemas.microsoft.com/office/drawing/2014/main" id="{4ED5F13F-28F6-4D7E-B359-F1284DF477E5}"/>
-                </a:ext>
-              </a:extLst>
-            </p:cNvPr>
-            <p:cNvSpPr txBox="1"/>
-            <p:nvPr/>
-          </p:nvSpPr>
-          <p:spPr>
-            <a:xfrm>
-              <a:off x="2973605" y="2624373"/>
-              <a:ext cx="266330" cy="338554"/>
-            </a:xfrm>
-            <a:prstGeom prst="rect">
-              <a:avLst/>
-            </a:prstGeom>
-            <a:noFill/>
-          </p:spPr>
-          <p:txBody>
-            <a:bodyPr wrap="square" rtlCol="0">
-              <a:spAutoFit/>
-            </a:bodyPr>
-            <a:lstStyle/>
-            <a:p>
-              <a:r>
-                <a:rPr lang="de-DE" sz="1600" dirty="0"/>
-                <a:t>7</a:t>
-              </a:r>
-            </a:p>
-          </p:txBody>
-        </p:sp>
-        <p:sp>
-          <p:nvSpPr>
-            <p:cNvPr id="36" name="Textfeld 35">
-              <a:extLst>
-                <a:ext uri="{FF2B5EF4-FFF2-40B4-BE49-F238E27FC236}">
-                  <a16:creationId xmlns:a16="http://schemas.microsoft.com/office/drawing/2014/main" id="{6D987787-D4C1-4776-9932-1641A4054E08}"/>
-                </a:ext>
-              </a:extLst>
-            </p:cNvPr>
-            <p:cNvSpPr txBox="1"/>
-            <p:nvPr/>
-          </p:nvSpPr>
-          <p:spPr>
-            <a:xfrm>
-              <a:off x="2925057" y="3132969"/>
-              <a:ext cx="435005" cy="338554"/>
-            </a:xfrm>
-            <a:prstGeom prst="rect">
-              <a:avLst/>
-            </a:prstGeom>
-            <a:noFill/>
-          </p:spPr>
-          <p:txBody>
-            <a:bodyPr wrap="square" rtlCol="0">
-              <a:spAutoFit/>
-            </a:bodyPr>
-            <a:lstStyle/>
-            <a:p>
-              <a:r>
-                <a:rPr lang="de-DE" sz="1600" dirty="0"/>
-                <a:t>12</a:t>
-              </a:r>
-            </a:p>
-          </p:txBody>
-        </p:sp>
-        <p:sp>
-          <p:nvSpPr>
-            <p:cNvPr id="37" name="Textfeld 36">
-              <a:extLst>
-                <a:ext uri="{FF2B5EF4-FFF2-40B4-BE49-F238E27FC236}">
-                  <a16:creationId xmlns:a16="http://schemas.microsoft.com/office/drawing/2014/main" id="{9A903D83-F129-4542-9782-AD67225DE3DE}"/>
-                </a:ext>
-              </a:extLst>
-            </p:cNvPr>
-            <p:cNvSpPr txBox="1"/>
-            <p:nvPr/>
-          </p:nvSpPr>
-          <p:spPr>
-            <a:xfrm>
-              <a:off x="5330814" y="2583270"/>
-              <a:ext cx="265649" cy="369332"/>
-            </a:xfrm>
-            <a:prstGeom prst="rect">
-              <a:avLst/>
-            </a:prstGeom>
-            <a:noFill/>
-          </p:spPr>
-          <p:txBody>
-            <a:bodyPr wrap="square" rtlCol="0">
-              <a:spAutoFit/>
-            </a:bodyPr>
-            <a:lstStyle/>
-            <a:p>
-              <a:r>
-                <a:rPr lang="de-DE" dirty="0"/>
-                <a:t>3</a:t>
-              </a:r>
-            </a:p>
-          </p:txBody>
-        </p:sp>
-        <p:sp>
-          <p:nvSpPr>
-            <p:cNvPr id="38" name="Textfeld 37">
-              <a:extLst>
-                <a:ext uri="{FF2B5EF4-FFF2-40B4-BE49-F238E27FC236}">
-                  <a16:creationId xmlns:a16="http://schemas.microsoft.com/office/drawing/2014/main" id="{685229C3-4F07-4856-A34F-80719B266EE6}"/>
-                </a:ext>
-              </a:extLst>
-            </p:cNvPr>
-            <p:cNvSpPr txBox="1"/>
-            <p:nvPr/>
-          </p:nvSpPr>
-          <p:spPr>
-            <a:xfrm>
-              <a:off x="4548437" y="3097962"/>
-              <a:ext cx="301686" cy="369332"/>
-            </a:xfrm>
-            <a:prstGeom prst="rect">
-              <a:avLst/>
-            </a:prstGeom>
-            <a:noFill/>
-          </p:spPr>
-          <p:txBody>
-            <a:bodyPr wrap="none" rtlCol="0">
-              <a:spAutoFit/>
-            </a:bodyPr>
-            <a:lstStyle/>
-            <a:p>
-              <a:r>
-                <a:rPr lang="de-DE" dirty="0"/>
-                <a:t>5</a:t>
-              </a:r>
-            </a:p>
-          </p:txBody>
-        </p:sp>
-        <p:sp>
-          <p:nvSpPr>
-            <p:cNvPr id="39" name="Textfeld 38">
-              <a:extLst>
-                <a:ext uri="{FF2B5EF4-FFF2-40B4-BE49-F238E27FC236}">
-                  <a16:creationId xmlns:a16="http://schemas.microsoft.com/office/drawing/2014/main" id="{2FEB113D-3827-4608-9EDA-0756492C150D}"/>
-                </a:ext>
-              </a:extLst>
-            </p:cNvPr>
-            <p:cNvSpPr txBox="1"/>
-            <p:nvPr/>
-          </p:nvSpPr>
-          <p:spPr>
-            <a:xfrm>
-              <a:off x="4942948" y="2583703"/>
-              <a:ext cx="301686" cy="369332"/>
-            </a:xfrm>
-            <a:prstGeom prst="rect">
-              <a:avLst/>
-            </a:prstGeom>
-            <a:noFill/>
-          </p:spPr>
-          <p:txBody>
-            <a:bodyPr wrap="none" rtlCol="0">
-              <a:spAutoFit/>
-            </a:bodyPr>
-            <a:lstStyle/>
-            <a:p>
-              <a:r>
-                <a:rPr lang="de-DE" dirty="0"/>
-                <a:t>3</a:t>
-              </a:r>
-            </a:p>
-          </p:txBody>
-        </p:sp>
-        <p:sp>
-          <p:nvSpPr>
-            <p:cNvPr id="40" name="Textfeld 39">
-              <a:extLst>
-                <a:ext uri="{FF2B5EF4-FFF2-40B4-BE49-F238E27FC236}">
-                  <a16:creationId xmlns:a16="http://schemas.microsoft.com/office/drawing/2014/main" id="{5A748C76-68A3-4605-B0C9-94725566CEEA}"/>
-                </a:ext>
-              </a:extLst>
-            </p:cNvPr>
-            <p:cNvSpPr txBox="1"/>
-            <p:nvPr/>
-          </p:nvSpPr>
-          <p:spPr>
-            <a:xfrm>
-              <a:off x="4626841" y="2583270"/>
-              <a:ext cx="45719" cy="369332"/>
-            </a:xfrm>
-            <a:prstGeom prst="rect">
-              <a:avLst/>
-            </a:prstGeom>
-            <a:noFill/>
-          </p:spPr>
-          <p:txBody>
-            <a:bodyPr wrap="square" rtlCol="0">
-              <a:spAutoFit/>
-            </a:bodyPr>
-            <a:lstStyle/>
-            <a:p>
-              <a:r>
-                <a:rPr lang="de-DE" dirty="0"/>
-                <a:t>1</a:t>
-              </a:r>
-            </a:p>
-          </p:txBody>
-        </p:sp>
-        <p:sp>
-          <p:nvSpPr>
-            <p:cNvPr id="41" name="Textfeld 40">
-              <a:extLst>
-                <a:ext uri="{FF2B5EF4-FFF2-40B4-BE49-F238E27FC236}">
-                  <a16:creationId xmlns:a16="http://schemas.microsoft.com/office/drawing/2014/main" id="{50258C72-5A71-4151-BC5A-EE39B6752B52}"/>
-                </a:ext>
-              </a:extLst>
-            </p:cNvPr>
-            <p:cNvSpPr txBox="1"/>
-            <p:nvPr/>
-          </p:nvSpPr>
-          <p:spPr>
-            <a:xfrm>
-              <a:off x="4942948" y="3097962"/>
-              <a:ext cx="301686" cy="369332"/>
-            </a:xfrm>
-            <a:prstGeom prst="rect">
-              <a:avLst/>
-            </a:prstGeom>
-            <a:noFill/>
-          </p:spPr>
-          <p:txBody>
-            <a:bodyPr wrap="none" rtlCol="0">
-              <a:spAutoFit/>
-            </a:bodyPr>
-            <a:lstStyle/>
-            <a:p>
-              <a:r>
-                <a:rPr lang="de-DE" dirty="0"/>
-                <a:t>5</a:t>
-              </a:r>
-            </a:p>
-          </p:txBody>
-        </p:sp>
-        <p:sp>
-          <p:nvSpPr>
-            <p:cNvPr id="44" name="Textfeld 43">
-              <a:extLst>
-                <a:ext uri="{FF2B5EF4-FFF2-40B4-BE49-F238E27FC236}">
-                  <a16:creationId xmlns:a16="http://schemas.microsoft.com/office/drawing/2014/main" id="{A7E20937-6FF4-4D4B-8891-FF884F89504E}"/>
-                </a:ext>
-              </a:extLst>
-            </p:cNvPr>
-            <p:cNvSpPr txBox="1"/>
-            <p:nvPr/>
-          </p:nvSpPr>
-          <p:spPr>
-            <a:xfrm>
-              <a:off x="5316047" y="3097962"/>
-              <a:ext cx="301686" cy="369332"/>
-            </a:xfrm>
-            <a:prstGeom prst="rect">
-              <a:avLst/>
-            </a:prstGeom>
-            <a:noFill/>
-          </p:spPr>
-          <p:txBody>
-            <a:bodyPr wrap="none" rtlCol="0">
-              <a:spAutoFit/>
-            </a:bodyPr>
-            <a:lstStyle/>
-            <a:p>
-              <a:r>
-                <a:rPr lang="de-DE" dirty="0"/>
-                <a:t>5</a:t>
-              </a:r>
-            </a:p>
-          </p:txBody>
-        </p:sp>
-      </p:grpSp>
+          </a:ln>
+        </p:spPr>
+        <p:style>
+          <a:lnRef idx="2">
+            <a:schemeClr val="accent1">
+              <a:shade val="50000"/>
+            </a:schemeClr>
+          </a:lnRef>
+          <a:fillRef idx="1">
+            <a:schemeClr val="accent1"/>
+          </a:fillRef>
+          <a:effectRef idx="0">
+            <a:schemeClr val="accent1"/>
+          </a:effectRef>
+          <a:fontRef idx="minor">
+            <a:schemeClr val="lt1"/>
+          </a:fontRef>
+        </p:style>
+        <p:txBody>
+          <a:bodyPr rtlCol="0" anchor="ctr"/>
+          <a:lstStyle/>
+          <a:p>
+            <a:pPr algn="ctr"/>
+            <a:endParaRPr lang="de-DE"/>
+          </a:p>
+        </p:txBody>
+      </p:sp>
+      <p:sp>
+        <p:nvSpPr>
+          <p:cNvPr id="35" name="Textfeld 34">
+            <a:extLst>
+              <a:ext uri="{FF2B5EF4-FFF2-40B4-BE49-F238E27FC236}">
+                <a16:creationId xmlns:a16="http://schemas.microsoft.com/office/drawing/2014/main" id="{4ED5F13F-28F6-4D7E-B359-F1284DF477E5}"/>
+              </a:ext>
+            </a:extLst>
+          </p:cNvPr>
+          <p:cNvSpPr txBox="1"/>
+          <p:nvPr/>
+        </p:nvSpPr>
+        <p:spPr>
+          <a:xfrm>
+            <a:off x="8175920" y="1585615"/>
+            <a:ext cx="266330" cy="338554"/>
+          </a:xfrm>
+          <a:prstGeom prst="rect">
+            <a:avLst/>
+          </a:prstGeom>
+          <a:noFill/>
+        </p:spPr>
+        <p:txBody>
+          <a:bodyPr wrap="square" rtlCol="0">
+            <a:spAutoFit/>
+          </a:bodyPr>
+          <a:lstStyle/>
+          <a:p>
+            <a:r>
+              <a:rPr lang="de-DE" sz="1600" dirty="0"/>
+              <a:t>7</a:t>
+            </a:r>
+          </a:p>
+        </p:txBody>
+      </p:sp>
+      <p:sp>
+        <p:nvSpPr>
+          <p:cNvPr id="36" name="Textfeld 35">
+            <a:extLst>
+              <a:ext uri="{FF2B5EF4-FFF2-40B4-BE49-F238E27FC236}">
+                <a16:creationId xmlns:a16="http://schemas.microsoft.com/office/drawing/2014/main" id="{6D987787-D4C1-4776-9932-1641A4054E08}"/>
+              </a:ext>
+            </a:extLst>
+          </p:cNvPr>
+          <p:cNvSpPr txBox="1"/>
+          <p:nvPr/>
+        </p:nvSpPr>
+        <p:spPr>
+          <a:xfrm>
+            <a:off x="8127372" y="2094211"/>
+            <a:ext cx="435005" cy="338554"/>
+          </a:xfrm>
+          <a:prstGeom prst="rect">
+            <a:avLst/>
+          </a:prstGeom>
+          <a:noFill/>
+        </p:spPr>
+        <p:txBody>
+          <a:bodyPr wrap="square" rtlCol="0">
+            <a:spAutoFit/>
+          </a:bodyPr>
+          <a:lstStyle/>
+          <a:p>
+            <a:r>
+              <a:rPr lang="de-DE" sz="1600" dirty="0"/>
+              <a:t>12</a:t>
+            </a:r>
+          </a:p>
+        </p:txBody>
+      </p:sp>
+      <p:sp>
+        <p:nvSpPr>
+          <p:cNvPr id="37" name="Textfeld 36">
+            <a:extLst>
+              <a:ext uri="{FF2B5EF4-FFF2-40B4-BE49-F238E27FC236}">
+                <a16:creationId xmlns:a16="http://schemas.microsoft.com/office/drawing/2014/main" id="{9A903D83-F129-4542-9782-AD67225DE3DE}"/>
+              </a:ext>
+            </a:extLst>
+          </p:cNvPr>
+          <p:cNvSpPr txBox="1"/>
+          <p:nvPr/>
+        </p:nvSpPr>
+        <p:spPr>
+          <a:xfrm>
+            <a:off x="10247712" y="1585182"/>
+            <a:ext cx="265649" cy="338554"/>
+          </a:xfrm>
+          <a:prstGeom prst="rect">
+            <a:avLst/>
+          </a:prstGeom>
+          <a:noFill/>
+        </p:spPr>
+        <p:txBody>
+          <a:bodyPr wrap="square" rtlCol="0">
+            <a:spAutoFit/>
+          </a:bodyPr>
+          <a:lstStyle/>
+          <a:p>
+            <a:r>
+              <a:rPr lang="de-DE" sz="1600" dirty="0"/>
+              <a:t>3</a:t>
+            </a:r>
+          </a:p>
+        </p:txBody>
+      </p:sp>
+      <p:sp>
+        <p:nvSpPr>
+          <p:cNvPr id="38" name="Textfeld 37">
+            <a:extLst>
+              <a:ext uri="{FF2B5EF4-FFF2-40B4-BE49-F238E27FC236}">
+                <a16:creationId xmlns:a16="http://schemas.microsoft.com/office/drawing/2014/main" id="{685229C3-4F07-4856-A34F-80719B266EE6}"/>
+              </a:ext>
+            </a:extLst>
+          </p:cNvPr>
+          <p:cNvSpPr txBox="1"/>
+          <p:nvPr/>
+        </p:nvSpPr>
+        <p:spPr>
+          <a:xfrm>
+            <a:off x="9465335" y="2099874"/>
+            <a:ext cx="301686" cy="338554"/>
+          </a:xfrm>
+          <a:prstGeom prst="rect">
+            <a:avLst/>
+          </a:prstGeom>
+          <a:noFill/>
+        </p:spPr>
+        <p:txBody>
+          <a:bodyPr wrap="square" rtlCol="0">
+            <a:spAutoFit/>
+          </a:bodyPr>
+          <a:lstStyle/>
+          <a:p>
+            <a:r>
+              <a:rPr lang="de-DE" sz="1600" dirty="0"/>
+              <a:t>5</a:t>
+            </a:r>
+          </a:p>
+        </p:txBody>
+      </p:sp>
+      <p:sp>
+        <p:nvSpPr>
+          <p:cNvPr id="39" name="Textfeld 38">
+            <a:extLst>
+              <a:ext uri="{FF2B5EF4-FFF2-40B4-BE49-F238E27FC236}">
+                <a16:creationId xmlns:a16="http://schemas.microsoft.com/office/drawing/2014/main" id="{2FEB113D-3827-4608-9EDA-0756492C150D}"/>
+              </a:ext>
+            </a:extLst>
+          </p:cNvPr>
+          <p:cNvSpPr txBox="1"/>
+          <p:nvPr/>
+        </p:nvSpPr>
+        <p:spPr>
+          <a:xfrm>
+            <a:off x="9859846" y="1585615"/>
+            <a:ext cx="301686" cy="338554"/>
+          </a:xfrm>
+          <a:prstGeom prst="rect">
+            <a:avLst/>
+          </a:prstGeom>
+          <a:noFill/>
+        </p:spPr>
+        <p:txBody>
+          <a:bodyPr wrap="square" rtlCol="0">
+            <a:spAutoFit/>
+          </a:bodyPr>
+          <a:lstStyle/>
+          <a:p>
+            <a:r>
+              <a:rPr lang="de-DE" sz="1600" dirty="0"/>
+              <a:t>3</a:t>
+            </a:r>
+          </a:p>
+        </p:txBody>
+      </p:sp>
+      <p:sp>
+        <p:nvSpPr>
+          <p:cNvPr id="40" name="Textfeld 39">
+            <a:extLst>
+              <a:ext uri="{FF2B5EF4-FFF2-40B4-BE49-F238E27FC236}">
+                <a16:creationId xmlns:a16="http://schemas.microsoft.com/office/drawing/2014/main" id="{5A748C76-68A3-4605-B0C9-94725566CEEA}"/>
+              </a:ext>
+            </a:extLst>
+          </p:cNvPr>
+          <p:cNvSpPr txBox="1"/>
+          <p:nvPr/>
+        </p:nvSpPr>
+        <p:spPr>
+          <a:xfrm>
+            <a:off x="9548867" y="1585182"/>
+            <a:ext cx="45719" cy="338554"/>
+          </a:xfrm>
+          <a:prstGeom prst="rect">
+            <a:avLst/>
+          </a:prstGeom>
+          <a:noFill/>
+        </p:spPr>
+        <p:txBody>
+          <a:bodyPr wrap="square" rtlCol="0">
+            <a:spAutoFit/>
+          </a:bodyPr>
+          <a:lstStyle/>
+          <a:p>
+            <a:r>
+              <a:rPr lang="de-DE" sz="1600" dirty="0"/>
+              <a:t>1</a:t>
+            </a:r>
+          </a:p>
+        </p:txBody>
+      </p:sp>
+      <p:sp>
+        <p:nvSpPr>
+          <p:cNvPr id="41" name="Textfeld 40">
+            <a:extLst>
+              <a:ext uri="{FF2B5EF4-FFF2-40B4-BE49-F238E27FC236}">
+                <a16:creationId xmlns:a16="http://schemas.microsoft.com/office/drawing/2014/main" id="{50258C72-5A71-4151-BC5A-EE39B6752B52}"/>
+              </a:ext>
+            </a:extLst>
+          </p:cNvPr>
+          <p:cNvSpPr txBox="1"/>
+          <p:nvPr/>
+        </p:nvSpPr>
+        <p:spPr>
+          <a:xfrm>
+            <a:off x="9859846" y="2099874"/>
+            <a:ext cx="301686" cy="338554"/>
+          </a:xfrm>
+          <a:prstGeom prst="rect">
+            <a:avLst/>
+          </a:prstGeom>
+          <a:noFill/>
+        </p:spPr>
+        <p:txBody>
+          <a:bodyPr wrap="square" rtlCol="0">
+            <a:spAutoFit/>
+          </a:bodyPr>
+          <a:lstStyle/>
+          <a:p>
+            <a:r>
+              <a:rPr lang="de-DE" sz="1600" dirty="0"/>
+              <a:t>5</a:t>
+            </a:r>
+          </a:p>
+        </p:txBody>
+      </p:sp>
+      <p:sp>
+        <p:nvSpPr>
+          <p:cNvPr id="44" name="Textfeld 43">
+            <a:extLst>
+              <a:ext uri="{FF2B5EF4-FFF2-40B4-BE49-F238E27FC236}">
+                <a16:creationId xmlns:a16="http://schemas.microsoft.com/office/drawing/2014/main" id="{A7E20937-6FF4-4D4B-8891-FF884F89504E}"/>
+              </a:ext>
+            </a:extLst>
+          </p:cNvPr>
+          <p:cNvSpPr txBox="1"/>
+          <p:nvPr/>
+        </p:nvSpPr>
+        <p:spPr>
+          <a:xfrm>
+            <a:off x="10232945" y="2099874"/>
+            <a:ext cx="301686" cy="338554"/>
+          </a:xfrm>
+          <a:prstGeom prst="rect">
+            <a:avLst/>
+          </a:prstGeom>
+          <a:noFill/>
+        </p:spPr>
+        <p:txBody>
+          <a:bodyPr wrap="square" rtlCol="0">
+            <a:spAutoFit/>
+          </a:bodyPr>
+          <a:lstStyle/>
+          <a:p>
+            <a:r>
+              <a:rPr lang="de-DE" sz="1600" dirty="0"/>
+              <a:t>5</a:t>
+            </a:r>
+          </a:p>
+        </p:txBody>
+      </p:sp>
+      <p:pic>
+        <p:nvPicPr>
+          <p:cNvPr id="6" name="Grafik 5" descr="Zahnräder">
+            <a:extLst>
+              <a:ext uri="{FF2B5EF4-FFF2-40B4-BE49-F238E27FC236}">
+                <a16:creationId xmlns:a16="http://schemas.microsoft.com/office/drawing/2014/main" id="{1522834B-FF2C-406C-B4D4-84796ABD6558}"/>
+              </a:ext>
+            </a:extLst>
+          </p:cNvPr>
+          <p:cNvPicPr>
+            <a:picLocks noChangeAspect="1"/>
+          </p:cNvPicPr>
+          <p:nvPr/>
+        </p:nvPicPr>
+        <p:blipFill>
+          <a:blip r:embed="rId11">
+            <a:extLst>
+              <a:ext uri="{28A0092B-C50C-407E-A947-70E740481C1C}">
+                <a14:useLocalDpi xmlns:a14="http://schemas.microsoft.com/office/drawing/2010/main" val="0"/>
+              </a:ext>
+              <a:ext uri="{96DAC541-7B7A-43D3-8B79-37D633B846F1}">
+                <asvg:svgBlip xmlns:asvg="http://schemas.microsoft.com/office/drawing/2016/SVG/main" r:embed="rId12"/>
+              </a:ext>
+            </a:extLst>
+          </a:blip>
+          <a:stretch>
+            <a:fillRect/>
+          </a:stretch>
+        </p:blipFill>
+        <p:spPr>
+          <a:xfrm>
+            <a:off x="10579549" y="1648731"/>
+            <a:ext cx="206226" cy="206226"/>
+          </a:xfrm>
+          <a:prstGeom prst="rect">
+            <a:avLst/>
+          </a:prstGeom>
+        </p:spPr>
+      </p:pic>
+      <p:pic>
+        <p:nvPicPr>
+          <p:cNvPr id="31" name="Grafik 30" descr="Zahnräder">
+            <a:extLst>
+              <a:ext uri="{FF2B5EF4-FFF2-40B4-BE49-F238E27FC236}">
+                <a16:creationId xmlns:a16="http://schemas.microsoft.com/office/drawing/2014/main" id="{35212977-AA86-48B4-9126-8483B0BB6F26}"/>
+              </a:ext>
+            </a:extLst>
+          </p:cNvPr>
+          <p:cNvPicPr>
+            <a:picLocks noChangeAspect="1"/>
+          </p:cNvPicPr>
+          <p:nvPr/>
+        </p:nvPicPr>
+        <p:blipFill>
+          <a:blip r:embed="rId11">
+            <a:extLst>
+              <a:ext uri="{28A0092B-C50C-407E-A947-70E740481C1C}">
+                <a14:useLocalDpi xmlns:a14="http://schemas.microsoft.com/office/drawing/2010/main" val="0"/>
+              </a:ext>
+              <a:ext uri="{96DAC541-7B7A-43D3-8B79-37D633B846F1}">
+                <asvg:svgBlip xmlns:asvg="http://schemas.microsoft.com/office/drawing/2016/SVG/main" r:embed="rId12"/>
+              </a:ext>
+            </a:extLst>
+          </a:blip>
+          <a:stretch>
+            <a:fillRect/>
+          </a:stretch>
+        </p:blipFill>
+        <p:spPr>
+          <a:xfrm>
+            <a:off x="10579549" y="2160375"/>
+            <a:ext cx="206226" cy="206226"/>
+          </a:xfrm>
+          <a:prstGeom prst="rect">
+            <a:avLst/>
+          </a:prstGeom>
+        </p:spPr>
+      </p:pic>
     </p:spTree>
     <p:extLst>
       <p:ext uri="{BB962C8B-B14F-4D97-AF65-F5344CB8AC3E}">
@@ -5583,7 +5830,7 @@
           <a:p>
             <a:r>
               <a:rPr lang="de-DE" dirty="0"/>
-              <a:t>Button Allgemeine Einstellungen</a:t>
+              <a:t>Button allgemeine Einstellungen</a:t>
             </a:r>
           </a:p>
         </p:txBody>
@@ -5916,7 +6163,7 @@
           <p:cNvPr id="2" name="Titel 1">
             <a:extLst>
               <a:ext uri="{FF2B5EF4-FFF2-40B4-BE49-F238E27FC236}">
-                <a16:creationId xmlns:a16="http://schemas.microsoft.com/office/drawing/2014/main" id="{62C6F701-D41B-4475-A9DB-F8B4525AE063}"/>
+                <a16:creationId xmlns:a16="http://schemas.microsoft.com/office/drawing/2014/main" id="{6334C8DA-8CC1-433B-9298-AAFBF636E749}"/>
               </a:ext>
             </a:extLst>
           </p:cNvPr>
@@ -5926,115 +6173,288 @@
           <p:nvPr>
             <p:ph type="title"/>
           </p:nvPr>
-        </p:nvSpPr>
-        <p:spPr/>
-        <p:txBody>
-          <a:bodyPr/>
-          <a:lstStyle/>
-          <a:p>
-            <a:r>
-              <a:rPr lang="de-DE" dirty="0"/>
-              <a:t>Motivationssprüche</a:t>
-            </a:r>
-          </a:p>
-        </p:txBody>
-      </p:sp>
-      <p:sp>
-        <p:nvSpPr>
-          <p:cNvPr id="3" name="Inhaltsplatzhalter 2">
-            <a:extLst>
-              <a:ext uri="{FF2B5EF4-FFF2-40B4-BE49-F238E27FC236}">
-                <a16:creationId xmlns:a16="http://schemas.microsoft.com/office/drawing/2014/main" id="{6AC05503-9040-43CE-B5E4-38A588B8D130}"/>
-              </a:ext>
-            </a:extLst>
-          </p:cNvPr>
-          <p:cNvSpPr>
-            <a:spLocks noGrp="1"/>
-          </p:cNvSpPr>
-          <p:nvPr>
-            <p:ph idx="1"/>
-          </p:nvPr>
-        </p:nvSpPr>
-        <p:spPr/>
-        <p:txBody>
-          <a:bodyPr>
-            <a:normAutofit/>
-          </a:bodyPr>
-          <a:lstStyle/>
-          <a:p>
-            <a:r>
-              <a:rPr lang="de-DE" sz="1400" dirty="0" err="1"/>
-              <a:t>Todo</a:t>
-            </a:r>
-            <a:endParaRPr lang="de-DE" sz="1400" dirty="0"/>
-          </a:p>
-          <a:p>
-            <a:pPr lvl="1"/>
-            <a:r>
-              <a:rPr lang="de-DE" sz="1000" dirty="0"/>
-              <a:t>Maximale Länge abklären</a:t>
-            </a:r>
-          </a:p>
-          <a:p>
-            <a:r>
-              <a:rPr lang="de-DE" sz="1400"/>
-              <a:t>1.</a:t>
-            </a:r>
-            <a:r>
-              <a:rPr lang="de-DE" sz="1400" dirty="0"/>
-              <a:t> </a:t>
-            </a:r>
-            <a:endParaRPr lang="de-DE" sz="1400"/>
-          </a:p>
-        </p:txBody>
-      </p:sp>
-      <p:sp>
-        <p:nvSpPr>
-          <p:cNvPr id="4" name="Textfeld 3">
-            <a:extLst>
-              <a:ext uri="{FF2B5EF4-FFF2-40B4-BE49-F238E27FC236}">
-                <a16:creationId xmlns:a16="http://schemas.microsoft.com/office/drawing/2014/main" id="{2A271BFA-43B5-44B0-AC47-61A738DD6FF5}"/>
-              </a:ext>
-            </a:extLst>
-          </p:cNvPr>
-          <p:cNvSpPr txBox="1"/>
-          <p:nvPr/>
         </p:nvSpPr>
         <p:spPr>
           <a:xfrm>
-            <a:off x="9436963" y="230819"/>
-            <a:ext cx="2556769" cy="600164"/>
+            <a:off x="839788" y="457200"/>
+            <a:ext cx="5256212" cy="531812"/>
           </a:xfrm>
-          <a:prstGeom prst="rect">
-            <a:avLst/>
-          </a:prstGeom>
-          <a:noFill/>
         </p:spPr>
         <p:txBody>
-          <a:bodyPr wrap="square" rtlCol="0">
-            <a:spAutoFit/>
+          <a:bodyPr>
+            <a:normAutofit fontScale="90000"/>
           </a:bodyPr>
           <a:lstStyle/>
           <a:p>
             <a:r>
-              <a:rPr lang="de-DE" sz="1100" dirty="0"/>
-              <a:t>Aufschreiben von Motivationen, die jeden Tag oder pro </a:t>
-            </a:r>
-            <a:r>
-              <a:rPr lang="de-DE" sz="1100" dirty="0" err="1"/>
-              <a:t>Appaufruf</a:t>
-            </a:r>
-            <a:r>
-              <a:rPr lang="de-DE" sz="1100" dirty="0"/>
-              <a:t> zufällig ausgewählt werden.</a:t>
-            </a:r>
-          </a:p>
-        </p:txBody>
-      </p:sp>
+              <a:rPr lang="de-DE" dirty="0"/>
+              <a:t>Button spezifische Einstellungen</a:t>
+            </a:r>
+          </a:p>
+        </p:txBody>
+      </p:sp>
+      <p:sp>
+        <p:nvSpPr>
+          <p:cNvPr id="4" name="Textplatzhalter 3">
+            <a:extLst>
+              <a:ext uri="{FF2B5EF4-FFF2-40B4-BE49-F238E27FC236}">
+                <a16:creationId xmlns:a16="http://schemas.microsoft.com/office/drawing/2014/main" id="{ADA8C5A8-81F8-4CA8-97E7-912C5395D1E9}"/>
+              </a:ext>
+            </a:extLst>
+          </p:cNvPr>
+          <p:cNvSpPr>
+            <a:spLocks noGrp="1"/>
+          </p:cNvSpPr>
+          <p:nvPr>
+            <p:ph type="body" sz="half" idx="2"/>
+          </p:nvPr>
+        </p:nvSpPr>
+        <p:spPr>
+          <a:xfrm>
+            <a:off x="839788" y="989012"/>
+            <a:ext cx="3932237" cy="4879976"/>
+          </a:xfrm>
+        </p:spPr>
+        <p:txBody>
+          <a:bodyPr/>
+          <a:lstStyle/>
+          <a:p>
+            <a:pPr marL="285750" indent="-285750">
+              <a:buFont typeface="Arial" panose="020B0604020202020204" pitchFamily="34" charset="0"/>
+              <a:buChar char="•"/>
+            </a:pPr>
+            <a:r>
+              <a:rPr lang="de-DE" dirty="0"/>
+              <a:t>Neues Fenster</a:t>
+            </a:r>
+          </a:p>
+          <a:p>
+            <a:pPr marL="285750" indent="-285750">
+              <a:buFont typeface="Arial" panose="020B0604020202020204" pitchFamily="34" charset="0"/>
+              <a:buChar char="•"/>
+            </a:pPr>
+            <a:r>
+              <a:rPr lang="de-DE" dirty="0" err="1"/>
+              <a:t>Functions</a:t>
+            </a:r>
+            <a:endParaRPr lang="de-DE" dirty="0"/>
+          </a:p>
+          <a:p>
+            <a:pPr marL="742950" lvl="1" indent="-285750">
+              <a:buFont typeface="Arial" panose="020B0604020202020204" pitchFamily="34" charset="0"/>
+              <a:buChar char="•"/>
+            </a:pPr>
+            <a:r>
+              <a:rPr lang="de-DE" dirty="0"/>
+              <a:t>Input</a:t>
+            </a:r>
+          </a:p>
+          <a:p>
+            <a:pPr marL="742950" lvl="1" indent="-285750">
+              <a:buFont typeface="Arial" panose="020B0604020202020204" pitchFamily="34" charset="0"/>
+              <a:buChar char="•"/>
+            </a:pPr>
+            <a:r>
+              <a:rPr lang="de-DE" dirty="0"/>
+              <a:t>Buttons</a:t>
+            </a:r>
+          </a:p>
+          <a:p>
+            <a:pPr marL="285750" indent="-285750">
+              <a:buFont typeface="Arial" panose="020B0604020202020204" pitchFamily="34" charset="0"/>
+              <a:buChar char="•"/>
+            </a:pPr>
+            <a:r>
+              <a:rPr lang="de-DE" dirty="0"/>
+              <a:t>Labels</a:t>
+            </a:r>
+          </a:p>
+          <a:p>
+            <a:pPr marL="742950" lvl="1" indent="-285750">
+              <a:buFont typeface="Arial" panose="020B0604020202020204" pitchFamily="34" charset="0"/>
+              <a:buChar char="•"/>
+            </a:pPr>
+            <a:endParaRPr lang="de-DE" dirty="0"/>
+          </a:p>
+          <a:p>
+            <a:pPr marL="285750" indent="-285750">
+              <a:buFont typeface="Arial" panose="020B0604020202020204" pitchFamily="34" charset="0"/>
+              <a:buChar char="•"/>
+            </a:pPr>
+            <a:endParaRPr lang="de-DE" dirty="0"/>
+          </a:p>
+        </p:txBody>
+      </p:sp>
+      <p:grpSp>
+        <p:nvGrpSpPr>
+          <p:cNvPr id="27" name="Gruppieren 26">
+            <a:extLst>
+              <a:ext uri="{FF2B5EF4-FFF2-40B4-BE49-F238E27FC236}">
+                <a16:creationId xmlns:a16="http://schemas.microsoft.com/office/drawing/2014/main" id="{46D71D41-2579-4818-A47F-9B4AB962A5D8}"/>
+              </a:ext>
+            </a:extLst>
+          </p:cNvPr>
+          <p:cNvGrpSpPr/>
+          <p:nvPr/>
+        </p:nvGrpSpPr>
+        <p:grpSpPr>
+          <a:xfrm>
+            <a:off x="7722979" y="69574"/>
+            <a:ext cx="3551583" cy="6718852"/>
+            <a:chOff x="2497169" y="1108332"/>
+            <a:chExt cx="3551583" cy="6718852"/>
+          </a:xfrm>
+        </p:grpSpPr>
+        <p:pic>
+          <p:nvPicPr>
+            <p:cNvPr id="28" name="Bildplatzhalter 5">
+              <a:extLst>
+                <a:ext uri="{FF2B5EF4-FFF2-40B4-BE49-F238E27FC236}">
+                  <a16:creationId xmlns:a16="http://schemas.microsoft.com/office/drawing/2014/main" id="{B1475AA2-30FC-4E50-AB9E-7B64C039BB57}"/>
+                </a:ext>
+              </a:extLst>
+            </p:cNvPr>
+            <p:cNvPicPr>
+              <a:picLocks noChangeAspect="1"/>
+            </p:cNvPicPr>
+            <p:nvPr/>
+          </p:nvPicPr>
+          <p:blipFill rotWithShape="1">
+            <a:blip r:embed="rId2">
+              <a:extLst>
+                <a:ext uri="{28A0092B-C50C-407E-A947-70E740481C1C}">
+                  <a14:useLocalDpi xmlns:a14="http://schemas.microsoft.com/office/drawing/2010/main" val="0"/>
+                </a:ext>
+              </a:extLst>
+            </a:blip>
+            <a:srcRect l="32105" t="4630" r="31726" b="4139"/>
+            <a:stretch/>
+          </p:blipFill>
+          <p:spPr>
+            <a:xfrm>
+              <a:off x="2497169" y="1108332"/>
+              <a:ext cx="3551583" cy="6718852"/>
+            </a:xfrm>
+            <a:prstGeom prst="rect">
+              <a:avLst/>
+            </a:prstGeom>
+          </p:spPr>
+        </p:pic>
+        <p:sp>
+          <p:nvSpPr>
+            <p:cNvPr id="29" name="Textfeld 28">
+              <a:extLst>
+                <a:ext uri="{FF2B5EF4-FFF2-40B4-BE49-F238E27FC236}">
+                  <a16:creationId xmlns:a16="http://schemas.microsoft.com/office/drawing/2014/main" id="{16CAFE2E-D106-4067-B27B-448C6FDB4785}"/>
+                </a:ext>
+              </a:extLst>
+            </p:cNvPr>
+            <p:cNvSpPr txBox="1"/>
+            <p:nvPr/>
+          </p:nvSpPr>
+          <p:spPr>
+            <a:xfrm>
+              <a:off x="2805906" y="1524436"/>
+              <a:ext cx="1326750" cy="338554"/>
+            </a:xfrm>
+            <a:prstGeom prst="rect">
+              <a:avLst/>
+            </a:prstGeom>
+            <a:noFill/>
+          </p:spPr>
+          <p:txBody>
+            <a:bodyPr wrap="square" rtlCol="0">
+              <a:spAutoFit/>
+            </a:bodyPr>
+            <a:lstStyle/>
+            <a:p>
+              <a:r>
+                <a:rPr lang="de-DE" sz="1600" b="1" dirty="0" err="1"/>
+                <a:t>Examstracker</a:t>
+              </a:r>
+              <a:endParaRPr lang="de-DE" sz="1600" b="1" dirty="0"/>
+            </a:p>
+          </p:txBody>
+        </p:sp>
+        <p:sp>
+          <p:nvSpPr>
+            <p:cNvPr id="30" name="Textfeld 29">
+              <a:extLst>
+                <a:ext uri="{FF2B5EF4-FFF2-40B4-BE49-F238E27FC236}">
+                  <a16:creationId xmlns:a16="http://schemas.microsoft.com/office/drawing/2014/main" id="{09E1B27C-882E-42E7-AB5F-6015C4FD617E}"/>
+                </a:ext>
+              </a:extLst>
+            </p:cNvPr>
+            <p:cNvSpPr txBox="1"/>
+            <p:nvPr/>
+          </p:nvSpPr>
+          <p:spPr>
+            <a:xfrm>
+              <a:off x="3994003" y="1524436"/>
+              <a:ext cx="1210418" cy="338554"/>
+            </a:xfrm>
+            <a:prstGeom prst="rect">
+              <a:avLst/>
+            </a:prstGeom>
+            <a:noFill/>
+          </p:spPr>
+          <p:txBody>
+            <a:bodyPr wrap="square" rtlCol="0">
+              <a:spAutoFit/>
+            </a:bodyPr>
+            <a:lstStyle/>
+            <a:p>
+              <a:r>
+                <a:rPr lang="de-DE" sz="1600" dirty="0"/>
+                <a:t>Fr., 15.01.21</a:t>
+              </a:r>
+            </a:p>
+          </p:txBody>
+        </p:sp>
+        <p:pic>
+          <p:nvPicPr>
+            <p:cNvPr id="43" name="Grafik 42" descr="Zahnrad">
+              <a:extLst>
+                <a:ext uri="{FF2B5EF4-FFF2-40B4-BE49-F238E27FC236}">
+                  <a16:creationId xmlns:a16="http://schemas.microsoft.com/office/drawing/2014/main" id="{61F2208A-A3F8-4A3C-A884-31971E1A859E}"/>
+                </a:ext>
+              </a:extLst>
+            </p:cNvPr>
+            <p:cNvPicPr>
+              <a:picLocks noChangeAspect="1"/>
+            </p:cNvPicPr>
+            <p:nvPr/>
+          </p:nvPicPr>
+          <p:blipFill>
+            <a:blip r:embed="rId3">
+              <a:extLst>
+                <a:ext uri="{28A0092B-C50C-407E-A947-70E740481C1C}">
+                  <a14:useLocalDpi xmlns:a14="http://schemas.microsoft.com/office/drawing/2010/main" val="0"/>
+                </a:ext>
+                <a:ext uri="{96DAC541-7B7A-43D3-8B79-37D633B846F1}">
+                  <asvg:svgBlip xmlns:asvg="http://schemas.microsoft.com/office/drawing/2016/SVG/main" r:embed="rId4"/>
+                </a:ext>
+              </a:extLst>
+            </a:blip>
+            <a:stretch>
+              <a:fillRect/>
+            </a:stretch>
+          </p:blipFill>
+          <p:spPr>
+            <a:xfrm>
+              <a:off x="5158005" y="1424532"/>
+              <a:ext cx="438458" cy="438458"/>
+            </a:xfrm>
+            <a:prstGeom prst="rect">
+              <a:avLst/>
+            </a:prstGeom>
+          </p:spPr>
+        </p:pic>
+      </p:grpSp>
     </p:spTree>
     <p:extLst>
       <p:ext uri="{BB962C8B-B14F-4D97-AF65-F5344CB8AC3E}">
-        <p14:creationId xmlns:p14="http://schemas.microsoft.com/office/powerpoint/2010/main" val="248452350"/>
+        <p14:creationId xmlns:p14="http://schemas.microsoft.com/office/powerpoint/2010/main" val="1594796214"/>
       </p:ext>
     </p:extLst>
   </p:cSld>
@@ -6066,7 +6486,7 @@
           <p:cNvPr id="2" name="Titel 1">
             <a:extLst>
               <a:ext uri="{FF2B5EF4-FFF2-40B4-BE49-F238E27FC236}">
-                <a16:creationId xmlns:a16="http://schemas.microsoft.com/office/drawing/2014/main" id="{66FECF84-48B1-43D3-AC64-911443B6B541}"/>
+                <a16:creationId xmlns:a16="http://schemas.microsoft.com/office/drawing/2014/main" id="{62C6F701-D41B-4475-A9DB-F8B4525AE063}"/>
               </a:ext>
             </a:extLst>
           </p:cNvPr>
@@ -6084,7 +6504,7 @@
           <a:p>
             <a:r>
               <a:rPr lang="de-DE" dirty="0"/>
-              <a:t>Ideensammlung</a:t>
+              <a:t>Motivationssprüche</a:t>
             </a:r>
           </a:p>
         </p:txBody>
@@ -6094,7 +6514,7 @@
           <p:cNvPr id="3" name="Inhaltsplatzhalter 2">
             <a:extLst>
               <a:ext uri="{FF2B5EF4-FFF2-40B4-BE49-F238E27FC236}">
-                <a16:creationId xmlns:a16="http://schemas.microsoft.com/office/drawing/2014/main" id="{9BA52AA8-25D1-4A60-B34D-DE0884BCCDC6}"/>
+                <a16:creationId xmlns:a16="http://schemas.microsoft.com/office/drawing/2014/main" id="{6AC05503-9040-43CE-B5E4-38A588B8D130}"/>
               </a:ext>
             </a:extLst>
           </p:cNvPr>
@@ -6107,53 +6527,34 @@
         </p:nvSpPr>
         <p:spPr/>
         <p:txBody>
-          <a:bodyPr/>
-          <a:lstStyle/>
-          <a:p>
-            <a:r>
-              <a:rPr lang="de-DE" dirty="0"/>
-              <a:t>Fortschrittsbalken</a:t>
-            </a:r>
+          <a:bodyPr>
+            <a:normAutofit/>
+          </a:bodyPr>
+          <a:lstStyle/>
+          <a:p>
+            <a:r>
+              <a:rPr lang="de-DE" sz="1400" dirty="0" err="1"/>
+              <a:t>Todo</a:t>
+            </a:r>
+            <a:endParaRPr lang="de-DE" sz="1400" dirty="0"/>
           </a:p>
           <a:p>
             <a:pPr lvl="1"/>
             <a:r>
-              <a:rPr lang="de-DE" dirty="0"/>
-              <a:t>Idee1: als Hintergrund von Prüfung 1</a:t>
-            </a:r>
-          </a:p>
-          <a:p>
-            <a:pPr lvl="1"/>
-            <a:r>
-              <a:rPr lang="de-DE" dirty="0"/>
-              <a:t>Idee2: als schmaler Balken unter Prüfung 1</a:t>
-            </a:r>
-          </a:p>
-          <a:p>
-            <a:r>
-              <a:rPr lang="de-DE" dirty="0"/>
-              <a:t>Motivationssprüche unter Infoleiste</a:t>
-            </a:r>
-          </a:p>
-          <a:p>
-            <a:r>
-              <a:rPr lang="de-DE" dirty="0"/>
-              <a:t>Ab 10.000 Downloads auf Freemium umsteigen (Werbebalken unten)</a:t>
-            </a:r>
-          </a:p>
-          <a:p>
-            <a:r>
-              <a:rPr lang="de-DE" dirty="0"/>
-              <a:t>(Aufklappbares Menü zum Abchecken von </a:t>
-            </a:r>
-            <a:r>
-              <a:rPr lang="de-DE" dirty="0" err="1"/>
-              <a:t>Todos</a:t>
-            </a:r>
-            <a:r>
-              <a:rPr lang="de-DE" dirty="0"/>
-              <a:t>)</a:t>
-            </a:r>
+              <a:rPr lang="de-DE" sz="1000" dirty="0"/>
+              <a:t>Maximale Länge abklären</a:t>
+            </a:r>
+          </a:p>
+          <a:p>
+            <a:r>
+              <a:rPr lang="de-DE" sz="1400"/>
+              <a:t>1.</a:t>
+            </a:r>
+            <a:r>
+              <a:rPr lang="de-DE" sz="1400" dirty="0"/>
+              <a:t> </a:t>
+            </a:r>
+            <a:endParaRPr lang="de-DE" sz="1400"/>
           </a:p>
         </p:txBody>
       </p:sp>
@@ -6162,7 +6563,7 @@
           <p:cNvPr id="4" name="Textfeld 3">
             <a:extLst>
               <a:ext uri="{FF2B5EF4-FFF2-40B4-BE49-F238E27FC236}">
-                <a16:creationId xmlns:a16="http://schemas.microsoft.com/office/drawing/2014/main" id="{9711843E-DB97-4F9E-9B56-663D4530A34A}"/>
+                <a16:creationId xmlns:a16="http://schemas.microsoft.com/office/drawing/2014/main" id="{2A271BFA-43B5-44B0-AC47-61A738DD6FF5}"/>
               </a:ext>
             </a:extLst>
           </p:cNvPr>
@@ -6171,8 +6572,8 @@
         </p:nvSpPr>
         <p:spPr>
           <a:xfrm>
-            <a:off x="9614516" y="226670"/>
-            <a:ext cx="2405849" cy="600164"/>
+            <a:off x="9436963" y="230819"/>
+            <a:ext cx="2556769" cy="600164"/>
           </a:xfrm>
           <a:prstGeom prst="rect">
             <a:avLst/>
@@ -6187,19 +6588,15 @@
           <a:p>
             <a:r>
               <a:rPr lang="de-DE" sz="1100" dirty="0"/>
-              <a:t>Spontane Ideen schnell aufschreiben</a:t>
-            </a:r>
-          </a:p>
-          <a:p>
+              <a:t>Aufschreiben von Motivationen, die jeden Tag oder pro </a:t>
+            </a:r>
+            <a:r>
+              <a:rPr lang="de-DE" sz="1100" dirty="0" err="1"/>
+              <a:t>Appaufruf</a:t>
+            </a:r>
             <a:r>
               <a:rPr lang="de-DE" sz="1100" dirty="0"/>
-              <a:t>Zunächst besprechen und abstimmen</a:t>
-            </a:r>
-          </a:p>
-          <a:p>
-            <a:r>
-              <a:rPr lang="de-DE" sz="1100" dirty="0"/>
-              <a:t>Anschließend Umsetzung ins Design</a:t>
+              <a:t> zufällig ausgewählt werden.</a:t>
             </a:r>
           </a:p>
         </p:txBody>
@@ -6207,7 +6604,7 @@
     </p:spTree>
     <p:extLst>
       <p:ext uri="{BB962C8B-B14F-4D97-AF65-F5344CB8AC3E}">
-        <p14:creationId xmlns:p14="http://schemas.microsoft.com/office/powerpoint/2010/main" val="3309805435"/>
+        <p14:creationId xmlns:p14="http://schemas.microsoft.com/office/powerpoint/2010/main" val="248452350"/>
       </p:ext>
     </p:extLst>
   </p:cSld>

</xml_diff>

<commit_message>
added basic UI/UX fragments
</commit_message>
<xml_diff>
--- a/Design plan.pptx
+++ b/Design plan.pptx
@@ -268,7 +268,7 @@
           <a:p>
             <a:fld id="{F5A5688D-1BD8-47D4-838D-2584F5FD8232}" type="datetimeFigureOut">
               <a:rPr lang="de-DE" smtClean="0"/>
-              <a:t>16.01.2021</a:t>
+              <a:t>25.01.2021</a:t>
             </a:fld>
             <a:endParaRPr lang="de-DE"/>
           </a:p>
@@ -466,7 +466,7 @@
           <a:p>
             <a:fld id="{F5A5688D-1BD8-47D4-838D-2584F5FD8232}" type="datetimeFigureOut">
               <a:rPr lang="de-DE" smtClean="0"/>
-              <a:t>16.01.2021</a:t>
+              <a:t>25.01.2021</a:t>
             </a:fld>
             <a:endParaRPr lang="de-DE"/>
           </a:p>
@@ -674,7 +674,7 @@
           <a:p>
             <a:fld id="{F5A5688D-1BD8-47D4-838D-2584F5FD8232}" type="datetimeFigureOut">
               <a:rPr lang="de-DE" smtClean="0"/>
-              <a:t>16.01.2021</a:t>
+              <a:t>25.01.2021</a:t>
             </a:fld>
             <a:endParaRPr lang="de-DE"/>
           </a:p>
@@ -872,7 +872,7 @@
           <a:p>
             <a:fld id="{F5A5688D-1BD8-47D4-838D-2584F5FD8232}" type="datetimeFigureOut">
               <a:rPr lang="de-DE" smtClean="0"/>
-              <a:t>16.01.2021</a:t>
+              <a:t>25.01.2021</a:t>
             </a:fld>
             <a:endParaRPr lang="de-DE"/>
           </a:p>
@@ -1147,7 +1147,7 @@
           <a:p>
             <a:fld id="{F5A5688D-1BD8-47D4-838D-2584F5FD8232}" type="datetimeFigureOut">
               <a:rPr lang="de-DE" smtClean="0"/>
-              <a:t>16.01.2021</a:t>
+              <a:t>25.01.2021</a:t>
             </a:fld>
             <a:endParaRPr lang="de-DE"/>
           </a:p>
@@ -1412,7 +1412,7 @@
           <a:p>
             <a:fld id="{F5A5688D-1BD8-47D4-838D-2584F5FD8232}" type="datetimeFigureOut">
               <a:rPr lang="de-DE" smtClean="0"/>
-              <a:t>16.01.2021</a:t>
+              <a:t>25.01.2021</a:t>
             </a:fld>
             <a:endParaRPr lang="de-DE"/>
           </a:p>
@@ -1824,7 +1824,7 @@
           <a:p>
             <a:fld id="{F5A5688D-1BD8-47D4-838D-2584F5FD8232}" type="datetimeFigureOut">
               <a:rPr lang="de-DE" smtClean="0"/>
-              <a:t>16.01.2021</a:t>
+              <a:t>25.01.2021</a:t>
             </a:fld>
             <a:endParaRPr lang="de-DE"/>
           </a:p>
@@ -1965,7 +1965,7 @@
           <a:p>
             <a:fld id="{F5A5688D-1BD8-47D4-838D-2584F5FD8232}" type="datetimeFigureOut">
               <a:rPr lang="de-DE" smtClean="0"/>
-              <a:t>16.01.2021</a:t>
+              <a:t>25.01.2021</a:t>
             </a:fld>
             <a:endParaRPr lang="de-DE"/>
           </a:p>
@@ -2078,7 +2078,7 @@
           <a:p>
             <a:fld id="{F5A5688D-1BD8-47D4-838D-2584F5FD8232}" type="datetimeFigureOut">
               <a:rPr lang="de-DE" smtClean="0"/>
-              <a:t>16.01.2021</a:t>
+              <a:t>25.01.2021</a:t>
             </a:fld>
             <a:endParaRPr lang="de-DE"/>
           </a:p>
@@ -2389,7 +2389,7 @@
           <a:p>
             <a:fld id="{F5A5688D-1BD8-47D4-838D-2584F5FD8232}" type="datetimeFigureOut">
               <a:rPr lang="de-DE" smtClean="0"/>
-              <a:t>16.01.2021</a:t>
+              <a:t>25.01.2021</a:t>
             </a:fld>
             <a:endParaRPr lang="de-DE"/>
           </a:p>
@@ -2677,7 +2677,7 @@
           <a:p>
             <a:fld id="{F5A5688D-1BD8-47D4-838D-2584F5FD8232}" type="datetimeFigureOut">
               <a:rPr lang="de-DE" smtClean="0"/>
-              <a:t>16.01.2021</a:t>
+              <a:t>25.01.2021</a:t>
             </a:fld>
             <a:endParaRPr lang="de-DE"/>
           </a:p>
@@ -2918,7 +2918,7 @@
           <a:p>
             <a:fld id="{F5A5688D-1BD8-47D4-838D-2584F5FD8232}" type="datetimeFigureOut">
               <a:rPr lang="de-DE" smtClean="0"/>
-              <a:t>16.01.2021</a:t>
+              <a:t>25.01.2021</a:t>
             </a:fld>
             <a:endParaRPr lang="de-DE"/>
           </a:p>
@@ -3509,6 +3509,31 @@
               <a:t>)</a:t>
             </a:r>
           </a:p>
+          <a:p>
+            <a:r>
+              <a:rPr lang="de-DE" dirty="0"/>
+              <a:t>„Focus“ Checkbox bei </a:t>
+            </a:r>
+            <a:r>
+              <a:rPr lang="de-DE" dirty="0" err="1"/>
+              <a:t>add_exam</a:t>
+            </a:r>
+            <a:r>
+              <a:rPr lang="de-DE" dirty="0"/>
+              <a:t> </a:t>
+            </a:r>
+            <a:r>
+              <a:rPr lang="de-DE" dirty="0" err="1"/>
+              <a:t>fragment</a:t>
+            </a:r>
+            <a:r>
+              <a:rPr lang="de-DE" dirty="0"/>
+              <a:t> (für diese Klausur soll sich ausschließlich morgens vorbereitet werden)</a:t>
+            </a:r>
+          </a:p>
+          <a:p>
+            <a:endParaRPr lang="de-DE" dirty="0"/>
+          </a:p>
         </p:txBody>
       </p:sp>
       <p:sp>
@@ -5470,6 +5495,28 @@
               <a:rPr lang="de-DE" dirty="0"/>
               <a:t>Dasselbe Fenster wie Prüfung hinzufügen?</a:t>
             </a:r>
+          </a:p>
+          <a:p>
+            <a:pPr marL="285750" indent="-285750">
+              <a:buFont typeface="Arial" panose="020B0604020202020204" pitchFamily="34" charset="0"/>
+              <a:buChar char="•"/>
+            </a:pPr>
+            <a:r>
+              <a:rPr lang="de-DE" dirty="0"/>
+              <a:t>Bei Datum: __ . __ . ____ Format und nur </a:t>
+            </a:r>
+            <a:r>
+              <a:rPr lang="de-DE" dirty="0" err="1"/>
+              <a:t>Nummereingabe</a:t>
+            </a:r>
+            <a:endParaRPr lang="de-DE" dirty="0"/>
+          </a:p>
+          <a:p>
+            <a:pPr marL="285750" indent="-285750">
+              <a:buFont typeface="Arial" panose="020B0604020202020204" pitchFamily="34" charset="0"/>
+              <a:buChar char="•"/>
+            </a:pPr>
+            <a:endParaRPr lang="de-DE" dirty="0"/>
           </a:p>
           <a:p>
             <a:pPr marL="742950" lvl="1" indent="-285750">

</xml_diff>